<commit_message>
[Knockout.js] Finalize first version of presentation
</commit_message>
<xml_diff>
--- a/knockout.js/knockout.js.pptx
+++ b/knockout.js/knockout.js.pptx
@@ -5,16 +5,20 @@
     <p:sldMasterId id="2147483648" r:id="rId1"/>
   </p:sldMasterIdLst>
   <p:notesMasterIdLst>
-    <p:notesMasterId r:id="rId9"/>
+    <p:notesMasterId r:id="rId13"/>
   </p:notesMasterIdLst>
   <p:sldIdLst>
     <p:sldId id="256" r:id="rId2"/>
     <p:sldId id="257" r:id="rId3"/>
-    <p:sldId id="258" r:id="rId4"/>
-    <p:sldId id="259" r:id="rId5"/>
-    <p:sldId id="260" r:id="rId6"/>
-    <p:sldId id="261" r:id="rId7"/>
-    <p:sldId id="262" r:id="rId8"/>
+    <p:sldId id="263" r:id="rId4"/>
+    <p:sldId id="258" r:id="rId5"/>
+    <p:sldId id="259" r:id="rId6"/>
+    <p:sldId id="260" r:id="rId7"/>
+    <p:sldId id="261" r:id="rId8"/>
+    <p:sldId id="264" r:id="rId9"/>
+    <p:sldId id="265" r:id="rId10"/>
+    <p:sldId id="262" r:id="rId11"/>
+    <p:sldId id="266" r:id="rId12"/>
   </p:sldIdLst>
   <p:sldSz cx="12192000" cy="6858000"/>
   <p:notesSz cx="6858000" cy="9144000"/>
@@ -120,14 +124,21 @@
           <p14:sldIdLst>
             <p14:sldId id="256"/>
             <p14:sldId id="257"/>
+            <p14:sldId id="263"/>
             <p14:sldId id="258"/>
             <p14:sldId id="259"/>
             <p14:sldId id="260"/>
             <p14:sldId id="261"/>
+            <p14:sldId id="264"/>
+            <p14:sldId id="265"/>
             <p14:sldId id="262"/>
+            <p14:sldId id="266"/>
           </p14:sldIdLst>
         </p14:section>
       </p14:sectionLst>
+    </p:ext>
+    <p:ext uri="{EFAFB233-063F-42B5-8137-9DF3F51BA10A}">
+      <p15:sldGuideLst xmlns:p15="http://schemas.microsoft.com/office/powerpoint/2012/main"/>
     </p:ext>
   </p:extLst>
 </p:presentation>
@@ -215,7 +226,7 @@
           <a:p>
             <a:fld id="{C5154B15-60D3-4535-B029-4D100D89B8DD}" type="datetimeFigureOut">
               <a:rPr lang="fr-FR" smtClean="0"/>
-              <a:t>16/10/2013</a:t>
+              <a:t>17/10/2013</a:t>
             </a:fld>
             <a:endParaRPr lang="fr-FR"/>
           </a:p>
@@ -574,7 +585,7 @@
           <a:p>
             <a:fld id="{1EBCEF40-0E7B-404D-832C-DC6E08B53B2B}" type="slidenum">
               <a:rPr lang="fr-FR" smtClean="0"/>
-              <a:t>4</a:t>
+              <a:t>5</a:t>
             </a:fld>
             <a:endParaRPr lang="fr-FR"/>
           </a:p>
@@ -637,31 +648,9 @@
           <a:bodyPr/>
           <a:lstStyle/>
           <a:p>
-            <a:pPr marL="171450" indent="-171450">
+            <a:pPr marL="0" indent="0">
               <a:buFontTx/>
-              <a:buChar char="-"/>
-            </a:pPr>
-            <a:r>
-              <a:rPr lang="en-CA" noProof="0" dirty="0" smtClean="0"/>
-              <a:t>Presenter could be a </a:t>
-            </a:r>
-            <a:r>
-              <a:rPr lang="en-CA" noProof="0" dirty="0" err="1" smtClean="0"/>
-              <a:t>javascript</a:t>
-            </a:r>
-            <a:r>
-              <a:rPr lang="en-CA" noProof="0" dirty="0" smtClean="0"/>
-              <a:t> object with state</a:t>
-            </a:r>
-            <a:r>
-              <a:rPr lang="en-CA" baseline="0" noProof="0" dirty="0" smtClean="0"/>
-              <a:t> fields that interact with view by events (fields are DOM event listeners)</a:t>
-            </a:r>
-          </a:p>
-          <a:p>
-            <a:pPr marL="171450" indent="-171450">
-              <a:buFontTx/>
-              <a:buChar char="-"/>
+              <a:buNone/>
             </a:pPr>
             <a:endParaRPr lang="en-CA" noProof="0" dirty="0"/>
           </a:p>
@@ -684,7 +673,7 @@
           <a:p>
             <a:fld id="{1EBCEF40-0E7B-404D-832C-DC6E08B53B2B}" type="slidenum">
               <a:rPr lang="fr-FR" smtClean="0"/>
-              <a:t>5</a:t>
+              <a:t>6</a:t>
             </a:fld>
             <a:endParaRPr lang="fr-FR"/>
           </a:p>
@@ -747,31 +736,9 @@
           <a:bodyPr/>
           <a:lstStyle/>
           <a:p>
-            <a:pPr marL="171450" indent="-171450">
+            <a:pPr marL="0" indent="0">
               <a:buFontTx/>
-              <a:buChar char="-"/>
-            </a:pPr>
-            <a:r>
-              <a:rPr lang="en-CA" noProof="0" dirty="0" smtClean="0"/>
-              <a:t>Presenter could be a </a:t>
-            </a:r>
-            <a:r>
-              <a:rPr lang="en-CA" noProof="0" dirty="0" err="1" smtClean="0"/>
-              <a:t>javascript</a:t>
-            </a:r>
-            <a:r>
-              <a:rPr lang="en-CA" noProof="0" dirty="0" smtClean="0"/>
-              <a:t> object with state</a:t>
-            </a:r>
-            <a:r>
-              <a:rPr lang="en-CA" baseline="0" noProof="0" dirty="0" smtClean="0"/>
-              <a:t> fields that interact with view by events (fields are DOM event listeners)</a:t>
-            </a:r>
-          </a:p>
-          <a:p>
-            <a:pPr marL="171450" indent="-171450">
-              <a:buFontTx/>
-              <a:buChar char="-"/>
+              <a:buNone/>
             </a:pPr>
             <a:endParaRPr lang="en-CA" noProof="0" dirty="0"/>
           </a:p>
@@ -794,7 +761,7 @@
           <a:p>
             <a:fld id="{1EBCEF40-0E7B-404D-832C-DC6E08B53B2B}" type="slidenum">
               <a:rPr lang="fr-FR" smtClean="0"/>
-              <a:t>6</a:t>
+              <a:t>7</a:t>
             </a:fld>
             <a:endParaRPr lang="fr-FR"/>
           </a:p>
@@ -857,25 +824,116 @@
           <a:bodyPr/>
           <a:lstStyle/>
           <a:p>
+            <a:pPr marL="0" indent="0">
+              <a:buFontTx/>
+              <a:buNone/>
+            </a:pPr>
+            <a:endParaRPr lang="en-CA" noProof="0" dirty="0"/>
+          </a:p>
+        </p:txBody>
+      </p:sp>
+      <p:sp>
+        <p:nvSpPr>
+          <p:cNvPr id="4" name="Slide Number Placeholder 3"/>
+          <p:cNvSpPr>
+            <a:spLocks noGrp="1"/>
+          </p:cNvSpPr>
+          <p:nvPr>
+            <p:ph type="sldNum" sz="quarter" idx="10"/>
+          </p:nvPr>
+        </p:nvSpPr>
+        <p:spPr/>
+        <p:txBody>
+          <a:bodyPr/>
+          <a:lstStyle/>
+          <a:p>
+            <a:fld id="{1EBCEF40-0E7B-404D-832C-DC6E08B53B2B}" type="slidenum">
+              <a:rPr lang="fr-FR" smtClean="0"/>
+              <a:t>8</a:t>
+            </a:fld>
+            <a:endParaRPr lang="fr-FR"/>
+          </a:p>
+        </p:txBody>
+      </p:sp>
+    </p:spTree>
+    <p:extLst>
+      <p:ext uri="{BB962C8B-B14F-4D97-AF65-F5344CB8AC3E}">
+        <p14:creationId xmlns:p14="http://schemas.microsoft.com/office/powerpoint/2010/main" val="3466668436"/>
+      </p:ext>
+    </p:extLst>
+  </p:cSld>
+  <p:clrMapOvr>
+    <a:masterClrMapping/>
+  </p:clrMapOvr>
+</p:notes>
+</file>
+
+<file path=ppt/notesSlides/notesSlide5.xml><?xml version="1.0" encoding="utf-8"?>
+<p:notes xmlns:a="http://schemas.openxmlformats.org/drawingml/2006/main" xmlns:r="http://schemas.openxmlformats.org/officeDocument/2006/relationships" xmlns:p="http://schemas.openxmlformats.org/presentationml/2006/main">
+  <p:cSld>
+    <p:spTree>
+      <p:nvGrpSpPr>
+        <p:cNvPr id="1" name=""/>
+        <p:cNvGrpSpPr/>
+        <p:nvPr/>
+      </p:nvGrpSpPr>
+      <p:grpSpPr>
+        <a:xfrm>
+          <a:off x="0" y="0"/>
+          <a:ext cx="0" cy="0"/>
+          <a:chOff x="0" y="0"/>
+          <a:chExt cx="0" cy="0"/>
+        </a:xfrm>
+      </p:grpSpPr>
+      <p:sp>
+        <p:nvSpPr>
+          <p:cNvPr id="2" name="Slide Image Placeholder 1"/>
+          <p:cNvSpPr>
+            <a:spLocks noGrp="1" noRot="1" noChangeAspect="1"/>
+          </p:cNvSpPr>
+          <p:nvPr>
+            <p:ph type="sldImg"/>
+          </p:nvPr>
+        </p:nvSpPr>
+        <p:spPr/>
+      </p:sp>
+      <p:sp>
+        <p:nvSpPr>
+          <p:cNvPr id="3" name="Notes Placeholder 2"/>
+          <p:cNvSpPr>
+            <a:spLocks noGrp="1"/>
+          </p:cNvSpPr>
+          <p:nvPr>
+            <p:ph type="body" idx="1"/>
+          </p:nvPr>
+        </p:nvSpPr>
+        <p:spPr/>
+        <p:txBody>
+          <a:bodyPr/>
+          <a:lstStyle/>
+          <a:p>
+            <a:pPr marL="0" indent="0">
+              <a:buFontTx/>
+              <a:buNone/>
+            </a:pPr>
+            <a:endParaRPr lang="en-CA" baseline="0" noProof="0" dirty="0" smtClean="0"/>
+          </a:p>
+          <a:p>
             <a:pPr marL="171450" indent="-171450">
               <a:buFontTx/>
               <a:buChar char="-"/>
             </a:pPr>
             <a:r>
-              <a:rPr lang="en-CA" noProof="0" dirty="0" smtClean="0"/>
-              <a:t>Presenter could be a </a:t>
-            </a:r>
-            <a:r>
-              <a:rPr lang="en-CA" noProof="0" dirty="0" err="1" smtClean="0"/>
-              <a:t>javascript</a:t>
-            </a:r>
-            <a:r>
-              <a:rPr lang="en-CA" noProof="0" dirty="0" smtClean="0"/>
-              <a:t> object with state</a:t>
-            </a:r>
-            <a:r>
-              <a:rPr lang="en-CA" baseline="0" noProof="0" dirty="0" smtClean="0"/>
-              <a:t> fields that interact with view by events (fields are DOM event listeners)</a:t>
+              <a:rPr lang="en-US" sz="1200" b="0" i="0" kern="1200" dirty="0" smtClean="0">
+                <a:solidFill>
+                  <a:schemeClr val="tx1"/>
+                </a:solidFill>
+                <a:effectLst/>
+                <a:latin typeface="+mn-lt"/>
+                <a:ea typeface="+mn-ea"/>
+                <a:cs typeface="+mn-cs"/>
+              </a:rPr>
+              <a:t>automatically updates the right parts of your UI whenever your data model changes.</a:t>
             </a:r>
           </a:p>
           <a:p>
@@ -883,6 +941,189 @@
               <a:buFontTx/>
               <a:buChar char="-"/>
             </a:pPr>
+            <a:r>
+              <a:rPr lang="en-US" sz="1200" b="0" i="0" kern="1200" dirty="0" smtClean="0">
+                <a:solidFill>
+                  <a:schemeClr val="tx1"/>
+                </a:solidFill>
+                <a:effectLst/>
+                <a:latin typeface="+mn-lt"/>
+                <a:ea typeface="+mn-ea"/>
+                <a:cs typeface="+mn-cs"/>
+              </a:rPr>
+              <a:t>a simple and obvious way to connect parts of your UI to your data model. You can construct a complex dynamic UIs easily using arbitrarily nested binding contexts</a:t>
+            </a:r>
+          </a:p>
+          <a:p>
+            <a:pPr marL="171450" indent="-171450">
+              <a:buFontTx/>
+              <a:buChar char="-"/>
+            </a:pPr>
+            <a:r>
+              <a:rPr lang="en-US" sz="1200" b="0" i="0" kern="1200" dirty="0" smtClean="0">
+                <a:solidFill>
+                  <a:schemeClr val="tx1"/>
+                </a:solidFill>
+                <a:effectLst/>
+                <a:latin typeface="+mn-lt"/>
+                <a:ea typeface="+mn-ea"/>
+                <a:cs typeface="+mn-cs"/>
+              </a:rPr>
+              <a:t>implement custom behaviors as new declarative bindings for easy reuse in just a few lines of code.</a:t>
+            </a:r>
+          </a:p>
+          <a:p>
+            <a:pPr marL="171450" indent="-171450">
+              <a:buFontTx/>
+              <a:buChar char="-"/>
+            </a:pPr>
+            <a:r>
+              <a:rPr lang="en-US" sz="1200" b="0" i="0" kern="1200" dirty="0" smtClean="0">
+                <a:solidFill>
+                  <a:schemeClr val="tx1"/>
+                </a:solidFill>
+                <a:effectLst/>
+                <a:latin typeface="+mn-lt"/>
+                <a:ea typeface="+mn-ea"/>
+                <a:cs typeface="+mn-cs"/>
+              </a:rPr>
+              <a:t>works with any server or client-side technology</a:t>
+            </a:r>
+          </a:p>
+          <a:p>
+            <a:pPr marL="171450" indent="-171450">
+              <a:buFontTx/>
+              <a:buChar char="-"/>
+            </a:pPr>
+            <a:r>
+              <a:rPr lang="en-US" sz="1200" b="0" i="0" kern="1200" dirty="0" smtClean="0">
+                <a:solidFill>
+                  <a:schemeClr val="tx1"/>
+                </a:solidFill>
+                <a:effectLst/>
+                <a:latin typeface="+mn-lt"/>
+                <a:ea typeface="+mn-ea"/>
+                <a:cs typeface="+mn-cs"/>
+              </a:rPr>
+              <a:t>without requiring major architectural changes</a:t>
+            </a:r>
+          </a:p>
+          <a:p>
+            <a:pPr marL="171450" indent="-171450">
+              <a:buFontTx/>
+              <a:buChar char="-"/>
+            </a:pPr>
+            <a:r>
+              <a:rPr lang="fr-FR" sz="1200" b="0" i="0" kern="1200" dirty="0" err="1" smtClean="0">
+                <a:solidFill>
+                  <a:schemeClr val="tx1"/>
+                </a:solidFill>
+                <a:effectLst/>
+                <a:latin typeface="+mn-lt"/>
+                <a:ea typeface="+mn-ea"/>
+                <a:cs typeface="+mn-cs"/>
+              </a:rPr>
+              <a:t>around</a:t>
+            </a:r>
+            <a:r>
+              <a:rPr lang="fr-FR" sz="1200" b="0" i="0" kern="1200" dirty="0" smtClean="0">
+                <a:solidFill>
+                  <a:schemeClr val="tx1"/>
+                </a:solidFill>
+                <a:effectLst/>
+                <a:latin typeface="+mn-lt"/>
+                <a:ea typeface="+mn-ea"/>
+                <a:cs typeface="+mn-cs"/>
+              </a:rPr>
+              <a:t> 13kb </a:t>
+            </a:r>
+            <a:r>
+              <a:rPr lang="fr-FR" sz="1200" b="0" i="0" kern="1200" dirty="0" err="1" smtClean="0">
+                <a:solidFill>
+                  <a:schemeClr val="tx1"/>
+                </a:solidFill>
+                <a:effectLst/>
+                <a:latin typeface="+mn-lt"/>
+                <a:ea typeface="+mn-ea"/>
+                <a:cs typeface="+mn-cs"/>
+              </a:rPr>
+              <a:t>after</a:t>
+            </a:r>
+            <a:r>
+              <a:rPr lang="fr-FR" sz="1200" b="0" i="0" kern="1200" dirty="0" smtClean="0">
+                <a:solidFill>
+                  <a:schemeClr val="tx1"/>
+                </a:solidFill>
+                <a:effectLst/>
+                <a:latin typeface="+mn-lt"/>
+                <a:ea typeface="+mn-ea"/>
+                <a:cs typeface="+mn-cs"/>
+              </a:rPr>
+              <a:t> </a:t>
+            </a:r>
+            <a:r>
+              <a:rPr lang="fr-FR" sz="1200" b="0" i="0" kern="1200" dirty="0" err="1" smtClean="0">
+                <a:solidFill>
+                  <a:schemeClr val="tx1"/>
+                </a:solidFill>
+                <a:effectLst/>
+                <a:latin typeface="+mn-lt"/>
+                <a:ea typeface="+mn-ea"/>
+                <a:cs typeface="+mn-cs"/>
+              </a:rPr>
+              <a:t>gzipping</a:t>
+            </a:r>
+            <a:endParaRPr lang="fr-FR" sz="1200" b="0" i="0" kern="1200" dirty="0" smtClean="0">
+              <a:solidFill>
+                <a:schemeClr val="tx1"/>
+              </a:solidFill>
+              <a:effectLst/>
+              <a:latin typeface="+mn-lt"/>
+              <a:ea typeface="+mn-ea"/>
+              <a:cs typeface="+mn-cs"/>
+            </a:endParaRPr>
+          </a:p>
+          <a:p>
+            <a:pPr marL="171450" indent="-171450">
+              <a:buFontTx/>
+              <a:buChar char="-"/>
+            </a:pPr>
+            <a:r>
+              <a:rPr lang="en-CA" noProof="0" dirty="0" smtClean="0"/>
+              <a:t>browsers</a:t>
+            </a:r>
+          </a:p>
+          <a:p>
+            <a:pPr marL="171450" indent="-171450">
+              <a:buFontTx/>
+              <a:buChar char="-"/>
+            </a:pPr>
+            <a:r>
+              <a:rPr lang="en-CA" noProof="0" dirty="0" smtClean="0"/>
+              <a:t>pseudo</a:t>
+            </a:r>
+            <a:r>
+              <a:rPr lang="en-CA" baseline="0" noProof="0" dirty="0" smtClean="0"/>
+              <a:t> browsers</a:t>
+            </a:r>
+          </a:p>
+          <a:p>
+            <a:pPr marL="171450" indent="-171450">
+              <a:buFontTx/>
+              <a:buChar char="-"/>
+            </a:pPr>
+            <a:r>
+              <a:rPr lang="en-US" sz="1200" b="0" i="0" kern="1200" dirty="0" smtClean="0">
+                <a:solidFill>
+                  <a:schemeClr val="tx1"/>
+                </a:solidFill>
+                <a:effectLst/>
+                <a:latin typeface="+mn-lt"/>
+                <a:ea typeface="+mn-ea"/>
+                <a:cs typeface="+mn-cs"/>
+              </a:rPr>
+              <a:t>(developed BDD-style) means its correct functioning can easily be verified on new browsers and platforms</a:t>
+            </a:r>
             <a:endParaRPr lang="en-CA" noProof="0" dirty="0"/>
           </a:p>
         </p:txBody>
@@ -904,7 +1145,95 @@
           <a:p>
             <a:fld id="{1EBCEF40-0E7B-404D-832C-DC6E08B53B2B}" type="slidenum">
               <a:rPr lang="fr-FR" smtClean="0"/>
-              <a:t>7</a:t>
+              <a:t>9</a:t>
+            </a:fld>
+            <a:endParaRPr lang="fr-FR"/>
+          </a:p>
+        </p:txBody>
+      </p:sp>
+    </p:spTree>
+    <p:extLst>
+      <p:ext uri="{BB962C8B-B14F-4D97-AF65-F5344CB8AC3E}">
+        <p14:creationId xmlns:p14="http://schemas.microsoft.com/office/powerpoint/2010/main" val="4080475317"/>
+      </p:ext>
+    </p:extLst>
+  </p:cSld>
+  <p:clrMapOvr>
+    <a:masterClrMapping/>
+  </p:clrMapOvr>
+</p:notes>
+</file>
+
+<file path=ppt/notesSlides/notesSlide6.xml><?xml version="1.0" encoding="utf-8"?>
+<p:notes xmlns:a="http://schemas.openxmlformats.org/drawingml/2006/main" xmlns:r="http://schemas.openxmlformats.org/officeDocument/2006/relationships" xmlns:p="http://schemas.openxmlformats.org/presentationml/2006/main">
+  <p:cSld>
+    <p:spTree>
+      <p:nvGrpSpPr>
+        <p:cNvPr id="1" name=""/>
+        <p:cNvGrpSpPr/>
+        <p:nvPr/>
+      </p:nvGrpSpPr>
+      <p:grpSpPr>
+        <a:xfrm>
+          <a:off x="0" y="0"/>
+          <a:ext cx="0" cy="0"/>
+          <a:chOff x="0" y="0"/>
+          <a:chExt cx="0" cy="0"/>
+        </a:xfrm>
+      </p:grpSpPr>
+      <p:sp>
+        <p:nvSpPr>
+          <p:cNvPr id="2" name="Slide Image Placeholder 1"/>
+          <p:cNvSpPr>
+            <a:spLocks noGrp="1" noRot="1" noChangeAspect="1"/>
+          </p:cNvSpPr>
+          <p:nvPr>
+            <p:ph type="sldImg"/>
+          </p:nvPr>
+        </p:nvSpPr>
+        <p:spPr/>
+      </p:sp>
+      <p:sp>
+        <p:nvSpPr>
+          <p:cNvPr id="3" name="Notes Placeholder 2"/>
+          <p:cNvSpPr>
+            <a:spLocks noGrp="1"/>
+          </p:cNvSpPr>
+          <p:nvPr>
+            <p:ph type="body" idx="1"/>
+          </p:nvPr>
+        </p:nvSpPr>
+        <p:spPr/>
+        <p:txBody>
+          <a:bodyPr/>
+          <a:lstStyle/>
+          <a:p>
+            <a:pPr marL="0" indent="0">
+              <a:buFontTx/>
+              <a:buNone/>
+            </a:pPr>
+            <a:endParaRPr lang="en-CA" noProof="0" dirty="0"/>
+          </a:p>
+        </p:txBody>
+      </p:sp>
+      <p:sp>
+        <p:nvSpPr>
+          <p:cNvPr id="4" name="Slide Number Placeholder 3"/>
+          <p:cNvSpPr>
+            <a:spLocks noGrp="1"/>
+          </p:cNvSpPr>
+          <p:nvPr>
+            <p:ph type="sldNum" sz="quarter" idx="10"/>
+          </p:nvPr>
+        </p:nvSpPr>
+        <p:spPr/>
+        <p:txBody>
+          <a:bodyPr/>
+          <a:lstStyle/>
+          <a:p>
+            <a:fld id="{1EBCEF40-0E7B-404D-832C-DC6E08B53B2B}" type="slidenum">
+              <a:rPr lang="fr-FR" smtClean="0"/>
+              <a:t>10</a:t>
             </a:fld>
             <a:endParaRPr lang="fr-FR"/>
           </a:p>
@@ -914,6 +1243,94 @@
     <p:extLst>
       <p:ext uri="{BB962C8B-B14F-4D97-AF65-F5344CB8AC3E}">
         <p14:creationId xmlns:p14="http://schemas.microsoft.com/office/powerpoint/2010/main" val="3538081368"/>
+      </p:ext>
+    </p:extLst>
+  </p:cSld>
+  <p:clrMapOvr>
+    <a:masterClrMapping/>
+  </p:clrMapOvr>
+</p:notes>
+</file>
+
+<file path=ppt/notesSlides/notesSlide7.xml><?xml version="1.0" encoding="utf-8"?>
+<p:notes xmlns:a="http://schemas.openxmlformats.org/drawingml/2006/main" xmlns:r="http://schemas.openxmlformats.org/officeDocument/2006/relationships" xmlns:p="http://schemas.openxmlformats.org/presentationml/2006/main">
+  <p:cSld>
+    <p:spTree>
+      <p:nvGrpSpPr>
+        <p:cNvPr id="1" name=""/>
+        <p:cNvGrpSpPr/>
+        <p:nvPr/>
+      </p:nvGrpSpPr>
+      <p:grpSpPr>
+        <a:xfrm>
+          <a:off x="0" y="0"/>
+          <a:ext cx="0" cy="0"/>
+          <a:chOff x="0" y="0"/>
+          <a:chExt cx="0" cy="0"/>
+        </a:xfrm>
+      </p:grpSpPr>
+      <p:sp>
+        <p:nvSpPr>
+          <p:cNvPr id="2" name="Slide Image Placeholder 1"/>
+          <p:cNvSpPr>
+            <a:spLocks noGrp="1" noRot="1" noChangeAspect="1"/>
+          </p:cNvSpPr>
+          <p:nvPr>
+            <p:ph type="sldImg"/>
+          </p:nvPr>
+        </p:nvSpPr>
+        <p:spPr/>
+      </p:sp>
+      <p:sp>
+        <p:nvSpPr>
+          <p:cNvPr id="3" name="Notes Placeholder 2"/>
+          <p:cNvSpPr>
+            <a:spLocks noGrp="1"/>
+          </p:cNvSpPr>
+          <p:nvPr>
+            <p:ph type="body" idx="1"/>
+          </p:nvPr>
+        </p:nvSpPr>
+        <p:spPr/>
+        <p:txBody>
+          <a:bodyPr/>
+          <a:lstStyle/>
+          <a:p>
+            <a:pPr marL="0" indent="0">
+              <a:buFontTx/>
+              <a:buNone/>
+            </a:pPr>
+            <a:endParaRPr lang="en-CA" noProof="0" dirty="0"/>
+          </a:p>
+        </p:txBody>
+      </p:sp>
+      <p:sp>
+        <p:nvSpPr>
+          <p:cNvPr id="4" name="Slide Number Placeholder 3"/>
+          <p:cNvSpPr>
+            <a:spLocks noGrp="1"/>
+          </p:cNvSpPr>
+          <p:nvPr>
+            <p:ph type="sldNum" sz="quarter" idx="10"/>
+          </p:nvPr>
+        </p:nvSpPr>
+        <p:spPr/>
+        <p:txBody>
+          <a:bodyPr/>
+          <a:lstStyle/>
+          <a:p>
+            <a:fld id="{1EBCEF40-0E7B-404D-832C-DC6E08B53B2B}" type="slidenum">
+              <a:rPr lang="fr-FR" smtClean="0"/>
+              <a:t>11</a:t>
+            </a:fld>
+            <a:endParaRPr lang="fr-FR"/>
+          </a:p>
+        </p:txBody>
+      </p:sp>
+    </p:spTree>
+    <p:extLst>
+      <p:ext uri="{BB962C8B-B14F-4D97-AF65-F5344CB8AC3E}">
+        <p14:creationId xmlns:p14="http://schemas.microsoft.com/office/powerpoint/2010/main" val="2393688506"/>
       </p:ext>
     </p:extLst>
   </p:cSld>
@@ -1054,7 +1471,7 @@
           <a:p>
             <a:fld id="{9B0E7100-CB1C-4906-903B-B0AA84BE9C13}" type="datetimeFigureOut">
               <a:rPr lang="fr-FR" smtClean="0"/>
-              <a:t>16/10/2013</a:t>
+              <a:t>17/10/2013</a:t>
             </a:fld>
             <a:endParaRPr lang="fr-FR"/>
           </a:p>
@@ -1224,7 +1641,7 @@
           <a:p>
             <a:fld id="{9B0E7100-CB1C-4906-903B-B0AA84BE9C13}" type="datetimeFigureOut">
               <a:rPr lang="fr-FR" smtClean="0"/>
-              <a:t>16/10/2013</a:t>
+              <a:t>17/10/2013</a:t>
             </a:fld>
             <a:endParaRPr lang="fr-FR"/>
           </a:p>
@@ -1404,7 +1821,7 @@
           <a:p>
             <a:fld id="{9B0E7100-CB1C-4906-903B-B0AA84BE9C13}" type="datetimeFigureOut">
               <a:rPr lang="fr-FR" smtClean="0"/>
-              <a:t>16/10/2013</a:t>
+              <a:t>17/10/2013</a:t>
             </a:fld>
             <a:endParaRPr lang="fr-FR"/>
           </a:p>
@@ -1574,7 +1991,7 @@
           <a:p>
             <a:fld id="{9B0E7100-CB1C-4906-903B-B0AA84BE9C13}" type="datetimeFigureOut">
               <a:rPr lang="fr-FR" smtClean="0"/>
-              <a:t>16/10/2013</a:t>
+              <a:t>17/10/2013</a:t>
             </a:fld>
             <a:endParaRPr lang="fr-FR"/>
           </a:p>
@@ -1820,7 +2237,7 @@
           <a:p>
             <a:fld id="{9B0E7100-CB1C-4906-903B-B0AA84BE9C13}" type="datetimeFigureOut">
               <a:rPr lang="fr-FR" smtClean="0"/>
-              <a:t>16/10/2013</a:t>
+              <a:t>17/10/2013</a:t>
             </a:fld>
             <a:endParaRPr lang="fr-FR"/>
           </a:p>
@@ -2052,7 +2469,7 @@
           <a:p>
             <a:fld id="{9B0E7100-CB1C-4906-903B-B0AA84BE9C13}" type="datetimeFigureOut">
               <a:rPr lang="fr-FR" smtClean="0"/>
-              <a:t>16/10/2013</a:t>
+              <a:t>17/10/2013</a:t>
             </a:fld>
             <a:endParaRPr lang="fr-FR"/>
           </a:p>
@@ -2419,7 +2836,7 @@
           <a:p>
             <a:fld id="{9B0E7100-CB1C-4906-903B-B0AA84BE9C13}" type="datetimeFigureOut">
               <a:rPr lang="fr-FR" smtClean="0"/>
-              <a:t>16/10/2013</a:t>
+              <a:t>17/10/2013</a:t>
             </a:fld>
             <a:endParaRPr lang="fr-FR"/>
           </a:p>
@@ -2537,7 +2954,7 @@
           <a:p>
             <a:fld id="{9B0E7100-CB1C-4906-903B-B0AA84BE9C13}" type="datetimeFigureOut">
               <a:rPr lang="fr-FR" smtClean="0"/>
-              <a:t>16/10/2013</a:t>
+              <a:t>17/10/2013</a:t>
             </a:fld>
             <a:endParaRPr lang="fr-FR"/>
           </a:p>
@@ -2632,7 +3049,7 @@
           <a:p>
             <a:fld id="{9B0E7100-CB1C-4906-903B-B0AA84BE9C13}" type="datetimeFigureOut">
               <a:rPr lang="fr-FR" smtClean="0"/>
-              <a:t>16/10/2013</a:t>
+              <a:t>17/10/2013</a:t>
             </a:fld>
             <a:endParaRPr lang="fr-FR"/>
           </a:p>
@@ -2909,7 +3326,7 @@
           <a:p>
             <a:fld id="{9B0E7100-CB1C-4906-903B-B0AA84BE9C13}" type="datetimeFigureOut">
               <a:rPr lang="fr-FR" smtClean="0"/>
-              <a:t>16/10/2013</a:t>
+              <a:t>17/10/2013</a:t>
             </a:fld>
             <a:endParaRPr lang="fr-FR"/>
           </a:p>
@@ -3162,7 +3579,7 @@
           <a:p>
             <a:fld id="{9B0E7100-CB1C-4906-903B-B0AA84BE9C13}" type="datetimeFigureOut">
               <a:rPr lang="fr-FR" smtClean="0"/>
-              <a:t>16/10/2013</a:t>
+              <a:t>17/10/2013</a:t>
             </a:fld>
             <a:endParaRPr lang="fr-FR"/>
           </a:p>
@@ -3375,7 +3792,7 @@
           <a:p>
             <a:fld id="{9B0E7100-CB1C-4906-903B-B0AA84BE9C13}" type="datetimeFigureOut">
               <a:rPr lang="fr-FR" smtClean="0"/>
-              <a:t>16/10/2013</a:t>
+              <a:t>17/10/2013</a:t>
             </a:fld>
             <a:endParaRPr lang="fr-FR"/>
           </a:p>
@@ -3871,6 +4288,542 @@
 </p:sld>
 </file>
 
+<file path=ppt/slides/slide10.xml><?xml version="1.0" encoding="utf-8"?>
+<p:sld xmlns:a="http://schemas.openxmlformats.org/drawingml/2006/main" xmlns:r="http://schemas.openxmlformats.org/officeDocument/2006/relationships" xmlns:p="http://schemas.openxmlformats.org/presentationml/2006/main">
+  <p:cSld>
+    <p:spTree>
+      <p:nvGrpSpPr>
+        <p:cNvPr id="1" name=""/>
+        <p:cNvGrpSpPr/>
+        <p:nvPr/>
+      </p:nvGrpSpPr>
+      <p:grpSpPr>
+        <a:xfrm>
+          <a:off x="0" y="0"/>
+          <a:ext cx="0" cy="0"/>
+          <a:chOff x="0" y="0"/>
+          <a:chExt cx="0" cy="0"/>
+        </a:xfrm>
+      </p:grpSpPr>
+      <p:sp>
+        <p:nvSpPr>
+          <p:cNvPr id="2" name="Title 1"/>
+          <p:cNvSpPr>
+            <a:spLocks noGrp="1"/>
+          </p:cNvSpPr>
+          <p:nvPr>
+            <p:ph type="title"/>
+          </p:nvPr>
+        </p:nvSpPr>
+        <p:spPr>
+          <a:xfrm>
+            <a:off x="838200" y="365125"/>
+            <a:ext cx="10515600" cy="682137"/>
+          </a:xfrm>
+        </p:spPr>
+        <p:txBody>
+          <a:bodyPr>
+            <a:normAutofit fontScale="90000"/>
+          </a:bodyPr>
+          <a:lstStyle/>
+          <a:p>
+            <a:r>
+              <a:rPr lang="en-CA" dirty="0" smtClean="0">
+                <a:latin typeface="Ubuntu Condensed" panose="020B0506030602030204" pitchFamily="34" charset="0"/>
+              </a:rPr>
+              <a:t>How it looks like</a:t>
+            </a:r>
+            <a:endParaRPr lang="en-CA" dirty="0">
+              <a:latin typeface="Ubuntu Condensed" panose="020B0506030602030204" pitchFamily="34" charset="0"/>
+            </a:endParaRPr>
+          </a:p>
+        </p:txBody>
+      </p:sp>
+      <p:sp>
+        <p:nvSpPr>
+          <p:cNvPr id="5" name="Content Placeholder 2"/>
+          <p:cNvSpPr txBox="1">
+            <a:spLocks/>
+          </p:cNvSpPr>
+          <p:nvPr/>
+        </p:nvSpPr>
+        <p:spPr>
+          <a:xfrm>
+            <a:off x="838200" y="1463040"/>
+            <a:ext cx="10515600" cy="4699221"/>
+          </a:xfrm>
+          <a:prstGeom prst="rect">
+            <a:avLst/>
+          </a:prstGeom>
+        </p:spPr>
+        <p:txBody>
+          <a:bodyPr vert="horz" lIns="91440" tIns="45720" rIns="91440" bIns="45720" rtlCol="0">
+            <a:normAutofit/>
+          </a:bodyPr>
+          <a:lstStyle>
+            <a:lvl1pPr marL="228600" indent="-228600" algn="l" defTabSz="914400" rtl="0" eaLnBrk="1" latinLnBrk="0" hangingPunct="1">
+              <a:lnSpc>
+                <a:spcPct val="90000"/>
+              </a:lnSpc>
+              <a:spcBef>
+                <a:spcPts val="1000"/>
+              </a:spcBef>
+              <a:buFont typeface="Arial" panose="020B0604020202020204" pitchFamily="34" charset="0"/>
+              <a:buChar char="•"/>
+              <a:defRPr sz="2800" kern="1200">
+                <a:solidFill>
+                  <a:schemeClr val="tx1"/>
+                </a:solidFill>
+                <a:latin typeface="+mn-lt"/>
+                <a:ea typeface="+mn-ea"/>
+                <a:cs typeface="+mn-cs"/>
+              </a:defRPr>
+            </a:lvl1pPr>
+            <a:lvl2pPr marL="685800" indent="-228600" algn="l" defTabSz="914400" rtl="0" eaLnBrk="1" latinLnBrk="0" hangingPunct="1">
+              <a:lnSpc>
+                <a:spcPct val="90000"/>
+              </a:lnSpc>
+              <a:spcBef>
+                <a:spcPts val="500"/>
+              </a:spcBef>
+              <a:buFont typeface="Arial" panose="020B0604020202020204" pitchFamily="34" charset="0"/>
+              <a:buChar char="•"/>
+              <a:defRPr sz="2400" kern="1200">
+                <a:solidFill>
+                  <a:schemeClr val="tx1"/>
+                </a:solidFill>
+                <a:latin typeface="+mn-lt"/>
+                <a:ea typeface="+mn-ea"/>
+                <a:cs typeface="+mn-cs"/>
+              </a:defRPr>
+            </a:lvl2pPr>
+            <a:lvl3pPr marL="1143000" indent="-228600" algn="l" defTabSz="914400" rtl="0" eaLnBrk="1" latinLnBrk="0" hangingPunct="1">
+              <a:lnSpc>
+                <a:spcPct val="90000"/>
+              </a:lnSpc>
+              <a:spcBef>
+                <a:spcPts val="500"/>
+              </a:spcBef>
+              <a:buFont typeface="Arial" panose="020B0604020202020204" pitchFamily="34" charset="0"/>
+              <a:buChar char="•"/>
+              <a:defRPr sz="2000" kern="1200">
+                <a:solidFill>
+                  <a:schemeClr val="tx1"/>
+                </a:solidFill>
+                <a:latin typeface="+mn-lt"/>
+                <a:ea typeface="+mn-ea"/>
+                <a:cs typeface="+mn-cs"/>
+              </a:defRPr>
+            </a:lvl3pPr>
+            <a:lvl4pPr marL="1600200" indent="-228600" algn="l" defTabSz="914400" rtl="0" eaLnBrk="1" latinLnBrk="0" hangingPunct="1">
+              <a:lnSpc>
+                <a:spcPct val="90000"/>
+              </a:lnSpc>
+              <a:spcBef>
+                <a:spcPts val="500"/>
+              </a:spcBef>
+              <a:buFont typeface="Arial" panose="020B0604020202020204" pitchFamily="34" charset="0"/>
+              <a:buChar char="•"/>
+              <a:defRPr sz="1800" kern="1200">
+                <a:solidFill>
+                  <a:schemeClr val="tx1"/>
+                </a:solidFill>
+                <a:latin typeface="+mn-lt"/>
+                <a:ea typeface="+mn-ea"/>
+                <a:cs typeface="+mn-cs"/>
+              </a:defRPr>
+            </a:lvl4pPr>
+            <a:lvl5pPr marL="2057400" indent="-228600" algn="l" defTabSz="914400" rtl="0" eaLnBrk="1" latinLnBrk="0" hangingPunct="1">
+              <a:lnSpc>
+                <a:spcPct val="90000"/>
+              </a:lnSpc>
+              <a:spcBef>
+                <a:spcPts val="500"/>
+              </a:spcBef>
+              <a:buFont typeface="Arial" panose="020B0604020202020204" pitchFamily="34" charset="0"/>
+              <a:buChar char="•"/>
+              <a:defRPr sz="1800" kern="1200">
+                <a:solidFill>
+                  <a:schemeClr val="tx1"/>
+                </a:solidFill>
+                <a:latin typeface="+mn-lt"/>
+                <a:ea typeface="+mn-ea"/>
+                <a:cs typeface="+mn-cs"/>
+              </a:defRPr>
+            </a:lvl5pPr>
+            <a:lvl6pPr marL="2514600" indent="-228600" algn="l" defTabSz="914400" rtl="0" eaLnBrk="1" latinLnBrk="0" hangingPunct="1">
+              <a:lnSpc>
+                <a:spcPct val="90000"/>
+              </a:lnSpc>
+              <a:spcBef>
+                <a:spcPts val="500"/>
+              </a:spcBef>
+              <a:buFont typeface="Arial" panose="020B0604020202020204" pitchFamily="34" charset="0"/>
+              <a:buChar char="•"/>
+              <a:defRPr sz="1800" kern="1200">
+                <a:solidFill>
+                  <a:schemeClr val="tx1"/>
+                </a:solidFill>
+                <a:latin typeface="+mn-lt"/>
+                <a:ea typeface="+mn-ea"/>
+                <a:cs typeface="+mn-cs"/>
+              </a:defRPr>
+            </a:lvl6pPr>
+            <a:lvl7pPr marL="2971800" indent="-228600" algn="l" defTabSz="914400" rtl="0" eaLnBrk="1" latinLnBrk="0" hangingPunct="1">
+              <a:lnSpc>
+                <a:spcPct val="90000"/>
+              </a:lnSpc>
+              <a:spcBef>
+                <a:spcPts val="500"/>
+              </a:spcBef>
+              <a:buFont typeface="Arial" panose="020B0604020202020204" pitchFamily="34" charset="0"/>
+              <a:buChar char="•"/>
+              <a:defRPr sz="1800" kern="1200">
+                <a:solidFill>
+                  <a:schemeClr val="tx1"/>
+                </a:solidFill>
+                <a:latin typeface="+mn-lt"/>
+                <a:ea typeface="+mn-ea"/>
+                <a:cs typeface="+mn-cs"/>
+              </a:defRPr>
+            </a:lvl7pPr>
+            <a:lvl8pPr marL="3429000" indent="-228600" algn="l" defTabSz="914400" rtl="0" eaLnBrk="1" latinLnBrk="0" hangingPunct="1">
+              <a:lnSpc>
+                <a:spcPct val="90000"/>
+              </a:lnSpc>
+              <a:spcBef>
+                <a:spcPts val="500"/>
+              </a:spcBef>
+              <a:buFont typeface="Arial" panose="020B0604020202020204" pitchFamily="34" charset="0"/>
+              <a:buChar char="•"/>
+              <a:defRPr sz="1800" kern="1200">
+                <a:solidFill>
+                  <a:schemeClr val="tx1"/>
+                </a:solidFill>
+                <a:latin typeface="+mn-lt"/>
+                <a:ea typeface="+mn-ea"/>
+                <a:cs typeface="+mn-cs"/>
+              </a:defRPr>
+            </a:lvl8pPr>
+            <a:lvl9pPr marL="3886200" indent="-228600" algn="l" defTabSz="914400" rtl="0" eaLnBrk="1" latinLnBrk="0" hangingPunct="1">
+              <a:lnSpc>
+                <a:spcPct val="90000"/>
+              </a:lnSpc>
+              <a:spcBef>
+                <a:spcPts val="500"/>
+              </a:spcBef>
+              <a:buFont typeface="Arial" panose="020B0604020202020204" pitchFamily="34" charset="0"/>
+              <a:buChar char="•"/>
+              <a:defRPr sz="1800" kern="1200">
+                <a:solidFill>
+                  <a:schemeClr val="tx1"/>
+                </a:solidFill>
+                <a:latin typeface="+mn-lt"/>
+                <a:ea typeface="+mn-ea"/>
+                <a:cs typeface="+mn-cs"/>
+              </a:defRPr>
+            </a:lvl9pPr>
+          </a:lstStyle>
+          <a:p>
+            <a:pPr marL="0" indent="0">
+              <a:buNone/>
+            </a:pPr>
+            <a:r>
+              <a:rPr lang="en-GB" sz="2400" dirty="0" smtClean="0">
+                <a:latin typeface="Ubuntu Light" panose="020B0304030602030204" pitchFamily="34" charset="0"/>
+              </a:rPr>
+              <a:t>View</a:t>
+            </a:r>
+            <a:r>
+              <a:rPr lang="en-GB" sz="2000" dirty="0" smtClean="0">
+                <a:latin typeface="Ubuntu Light" panose="020B0304030602030204" pitchFamily="34" charset="0"/>
+              </a:rPr>
+              <a:t>:</a:t>
+            </a:r>
+          </a:p>
+          <a:p>
+            <a:pPr marL="0" indent="0">
+              <a:buNone/>
+            </a:pPr>
+            <a:r>
+              <a:rPr lang="en-US" sz="2000" dirty="0" smtClean="0">
+                <a:latin typeface="Ubuntu Mono" panose="020B0509030602030204" pitchFamily="49" charset="0"/>
+              </a:rPr>
+              <a:t>&lt;</a:t>
+            </a:r>
+            <a:r>
+              <a:rPr lang="en-US" sz="2000" dirty="0">
+                <a:latin typeface="Ubuntu Mono" panose="020B0509030602030204" pitchFamily="49" charset="0"/>
+              </a:rPr>
+              <a:t>div id=”</a:t>
+            </a:r>
+            <a:r>
+              <a:rPr lang="en-US" sz="2000" dirty="0" err="1">
+                <a:latin typeface="Ubuntu Mono" panose="020B0509030602030204" pitchFamily="49" charset="0"/>
+              </a:rPr>
+              <a:t>customerDetails</a:t>
+            </a:r>
+            <a:r>
+              <a:rPr lang="en-US" sz="2000" dirty="0">
+                <a:latin typeface="Ubuntu Mono" panose="020B0509030602030204" pitchFamily="49" charset="0"/>
+              </a:rPr>
+              <a:t>” </a:t>
+            </a:r>
+            <a:endParaRPr lang="en-US" sz="2000" dirty="0" smtClean="0">
+              <a:latin typeface="Ubuntu Mono" panose="020B0509030602030204" pitchFamily="49" charset="0"/>
+            </a:endParaRPr>
+          </a:p>
+          <a:p>
+            <a:pPr marL="0" indent="0">
+              <a:buNone/>
+            </a:pPr>
+            <a:r>
+              <a:rPr lang="en-US" sz="2000" dirty="0" smtClean="0">
+                <a:latin typeface="Ubuntu Mono" panose="020B0509030602030204" pitchFamily="49" charset="0"/>
+              </a:rPr>
+              <a:t>     data-bind</a:t>
+            </a:r>
+            <a:r>
+              <a:rPr lang="en-US" sz="2000" dirty="0">
+                <a:latin typeface="Ubuntu Mono" panose="020B0509030602030204" pitchFamily="49" charset="0"/>
+              </a:rPr>
+              <a:t>=”visible: </a:t>
+            </a:r>
+            <a:r>
+              <a:rPr lang="en-US" sz="2000" dirty="0" err="1">
+                <a:latin typeface="Ubuntu Mono" panose="020B0509030602030204" pitchFamily="49" charset="0"/>
+              </a:rPr>
+              <a:t>currentCustomer</a:t>
+            </a:r>
+            <a:r>
+              <a:rPr lang="en-US" sz="2000" dirty="0">
+                <a:latin typeface="Ubuntu Mono" panose="020B0509030602030204" pitchFamily="49" charset="0"/>
+              </a:rPr>
+              <a:t>() !== null</a:t>
+            </a:r>
+            <a:r>
+              <a:rPr lang="en-US" sz="2000" dirty="0" smtClean="0">
+                <a:latin typeface="Ubuntu Mono" panose="020B0509030602030204" pitchFamily="49" charset="0"/>
+              </a:rPr>
+              <a:t>”&gt;</a:t>
+            </a:r>
+          </a:p>
+          <a:p>
+            <a:pPr marL="0" indent="0">
+              <a:buNone/>
+            </a:pPr>
+            <a:endParaRPr lang="en-GB" sz="2400" dirty="0" smtClean="0">
+              <a:latin typeface="Ubuntu Light" panose="020B0304030602030204" pitchFamily="34" charset="0"/>
+            </a:endParaRPr>
+          </a:p>
+          <a:p>
+            <a:pPr marL="0" indent="0">
+              <a:buNone/>
+            </a:pPr>
+            <a:r>
+              <a:rPr lang="en-GB" sz="2400" dirty="0" err="1" smtClean="0">
+                <a:latin typeface="Ubuntu Light" panose="020B0304030602030204" pitchFamily="34" charset="0"/>
+              </a:rPr>
+              <a:t>ViewModel</a:t>
+            </a:r>
+            <a:r>
+              <a:rPr lang="en-GB" sz="2400" dirty="0" smtClean="0">
+                <a:latin typeface="Ubuntu Light" panose="020B0304030602030204" pitchFamily="34" charset="0"/>
+              </a:rPr>
+              <a:t>:</a:t>
+            </a:r>
+          </a:p>
+          <a:p>
+            <a:pPr marL="0" indent="0">
+              <a:buNone/>
+            </a:pPr>
+            <a:r>
+              <a:rPr lang="fr-FR" sz="2000" dirty="0">
+                <a:latin typeface="Ubuntu Mono" panose="020B0509030602030204" pitchFamily="49" charset="0"/>
+              </a:rPr>
+              <a:t>var </a:t>
+            </a:r>
+            <a:r>
+              <a:rPr lang="fr-FR" sz="2000" dirty="0" err="1">
+                <a:latin typeface="Ubuntu Mono" panose="020B0509030602030204" pitchFamily="49" charset="0"/>
+              </a:rPr>
+              <a:t>vewModel</a:t>
+            </a:r>
+            <a:r>
+              <a:rPr lang="fr-FR" sz="2000" dirty="0">
+                <a:latin typeface="Ubuntu Mono" panose="020B0509030602030204" pitchFamily="49" charset="0"/>
+              </a:rPr>
+              <a:t> = {</a:t>
+            </a:r>
+            <a:r>
+              <a:rPr lang="fr-FR" sz="2000" dirty="0" smtClean="0">
+                <a:latin typeface="Ubuntu Mono" panose="020B0509030602030204" pitchFamily="49" charset="0"/>
+              </a:rPr>
+              <a:t/>
+            </a:r>
+            <a:br>
+              <a:rPr lang="fr-FR" sz="2000" dirty="0" smtClean="0">
+                <a:latin typeface="Ubuntu Mono" panose="020B0509030602030204" pitchFamily="49" charset="0"/>
+              </a:rPr>
+            </a:br>
+            <a:r>
+              <a:rPr lang="fr-FR" sz="2000" dirty="0">
+                <a:latin typeface="Ubuntu Mono" panose="020B0509030602030204" pitchFamily="49" charset="0"/>
+              </a:rPr>
+              <a:t>  </a:t>
+            </a:r>
+            <a:r>
+              <a:rPr lang="fr-FR" sz="2000" dirty="0" err="1">
+                <a:latin typeface="Ubuntu Mono" panose="020B0509030602030204" pitchFamily="49" charset="0"/>
+              </a:rPr>
+              <a:t>currentCustomer</a:t>
+            </a:r>
+            <a:r>
+              <a:rPr lang="fr-FR" sz="2000" dirty="0">
+                <a:latin typeface="Ubuntu Mono" panose="020B0509030602030204" pitchFamily="49" charset="0"/>
+              </a:rPr>
+              <a:t>: </a:t>
+            </a:r>
+            <a:r>
+              <a:rPr lang="fr-FR" sz="2000" dirty="0" err="1">
+                <a:latin typeface="Ubuntu Mono" panose="020B0509030602030204" pitchFamily="49" charset="0"/>
+              </a:rPr>
+              <a:t>ko.observable</a:t>
+            </a:r>
+            <a:r>
+              <a:rPr lang="fr-FR" sz="2000" dirty="0">
+                <a:latin typeface="Ubuntu Mono" panose="020B0509030602030204" pitchFamily="49" charset="0"/>
+              </a:rPr>
+              <a:t>(</a:t>
+            </a:r>
+            <a:r>
+              <a:rPr lang="fr-FR" sz="2000" dirty="0" err="1">
+                <a:latin typeface="Ubuntu Mono" panose="020B0509030602030204" pitchFamily="49" charset="0"/>
+              </a:rPr>
+              <a:t>defaultCustomer</a:t>
+            </a:r>
+            <a:r>
+              <a:rPr lang="fr-FR" sz="2000" dirty="0" smtClean="0">
+                <a:latin typeface="Ubuntu Mono" panose="020B0509030602030204" pitchFamily="49" charset="0"/>
+              </a:rPr>
+              <a:t>)</a:t>
+            </a:r>
+            <a:br>
+              <a:rPr lang="fr-FR" sz="2000" dirty="0" smtClean="0">
+                <a:latin typeface="Ubuntu Mono" panose="020B0509030602030204" pitchFamily="49" charset="0"/>
+              </a:rPr>
+            </a:br>
+            <a:r>
+              <a:rPr lang="fr-FR" sz="2000" dirty="0">
+                <a:latin typeface="Ubuntu Mono" panose="020B0509030602030204" pitchFamily="49" charset="0"/>
+              </a:rPr>
+              <a:t>}</a:t>
+            </a:r>
+            <a:endParaRPr lang="en-GB" sz="2000" dirty="0" smtClean="0">
+              <a:latin typeface="Ubuntu Mono" panose="020B0509030602030204" pitchFamily="49" charset="0"/>
+            </a:endParaRPr>
+          </a:p>
+          <a:p>
+            <a:pPr marL="0" indent="0">
+              <a:buNone/>
+            </a:pPr>
+            <a:endParaRPr lang="en-CA" sz="2400" baseline="0" noProof="0" dirty="0" smtClean="0">
+              <a:latin typeface="Ubuntu Light" panose="020B0304030602030204" pitchFamily="34" charset="0"/>
+            </a:endParaRPr>
+          </a:p>
+          <a:p>
+            <a:pPr marL="0" indent="0">
+              <a:buNone/>
+            </a:pPr>
+            <a:r>
+              <a:rPr lang="en-CA" sz="2400" dirty="0" smtClean="0">
+                <a:latin typeface="Ubuntu Light" panose="020B0304030602030204" pitchFamily="34" charset="0"/>
+              </a:rPr>
+              <a:t>Customer details will become visible only if current customer value will be assign to the view model field</a:t>
+            </a:r>
+            <a:endParaRPr lang="en-CA" sz="2400" baseline="0" noProof="0" dirty="0" smtClean="0">
+              <a:latin typeface="Ubuntu Light" panose="020B0304030602030204" pitchFamily="34" charset="0"/>
+            </a:endParaRPr>
+          </a:p>
+        </p:txBody>
+      </p:sp>
+    </p:spTree>
+    <p:extLst>
+      <p:ext uri="{BB962C8B-B14F-4D97-AF65-F5344CB8AC3E}">
+        <p14:creationId xmlns:p14="http://schemas.microsoft.com/office/powerpoint/2010/main" val="4220660730"/>
+      </p:ext>
+    </p:extLst>
+  </p:cSld>
+  <p:clrMapOvr>
+    <a:masterClrMapping/>
+  </p:clrMapOvr>
+</p:sld>
+</file>
+
+<file path=ppt/slides/slide11.xml><?xml version="1.0" encoding="utf-8"?>
+<p:sld xmlns:a="http://schemas.openxmlformats.org/drawingml/2006/main" xmlns:r="http://schemas.openxmlformats.org/officeDocument/2006/relationships" xmlns:p="http://schemas.openxmlformats.org/presentationml/2006/main">
+  <p:cSld>
+    <p:spTree>
+      <p:nvGrpSpPr>
+        <p:cNvPr id="1" name=""/>
+        <p:cNvGrpSpPr/>
+        <p:nvPr/>
+      </p:nvGrpSpPr>
+      <p:grpSpPr>
+        <a:xfrm>
+          <a:off x="0" y="0"/>
+          <a:ext cx="0" cy="0"/>
+          <a:chOff x="0" y="0"/>
+          <a:chExt cx="0" cy="0"/>
+        </a:xfrm>
+      </p:grpSpPr>
+      <p:sp>
+        <p:nvSpPr>
+          <p:cNvPr id="2" name="Title 1"/>
+          <p:cNvSpPr>
+            <a:spLocks noGrp="1"/>
+          </p:cNvSpPr>
+          <p:nvPr>
+            <p:ph type="title"/>
+          </p:nvPr>
+        </p:nvSpPr>
+        <p:spPr>
+          <a:xfrm>
+            <a:off x="4844143" y="2770868"/>
+            <a:ext cx="2155371" cy="682137"/>
+          </a:xfrm>
+        </p:spPr>
+        <p:txBody>
+          <a:bodyPr>
+            <a:normAutofit fontScale="90000"/>
+          </a:bodyPr>
+          <a:lstStyle/>
+          <a:p>
+            <a:r>
+              <a:rPr lang="en-CA" dirty="0" smtClean="0">
+                <a:latin typeface="Ubuntu Condensed" panose="020B0506030602030204" pitchFamily="34" charset="0"/>
+              </a:rPr>
+              <a:t>Let’s try it</a:t>
+            </a:r>
+            <a:endParaRPr lang="en-CA" dirty="0">
+              <a:latin typeface="Ubuntu Condensed" panose="020B0506030602030204" pitchFamily="34" charset="0"/>
+            </a:endParaRPr>
+          </a:p>
+        </p:txBody>
+      </p:sp>
+    </p:spTree>
+    <p:extLst>
+      <p:ext uri="{BB962C8B-B14F-4D97-AF65-F5344CB8AC3E}">
+        <p14:creationId xmlns:p14="http://schemas.microsoft.com/office/powerpoint/2010/main" val="2416104711"/>
+      </p:ext>
+    </p:extLst>
+  </p:cSld>
+  <p:clrMapOvr>
+    <a:masterClrMapping/>
+  </p:clrMapOvr>
+</p:sld>
+</file>
+
 <file path=ppt/slides/slide2.xml><?xml version="1.0" encoding="utf-8"?>
 <p:sld xmlns:a="http://schemas.openxmlformats.org/drawingml/2006/main" xmlns:r="http://schemas.openxmlformats.org/officeDocument/2006/relationships" xmlns:p="http://schemas.openxmlformats.org/presentationml/2006/main">
   <p:cSld>
@@ -3911,12 +4864,12 @@
           <a:lstStyle/>
           <a:p>
             <a:r>
-              <a:rPr lang="fr-FR" dirty="0" smtClean="0">
+              <a:rPr lang="en-AU" dirty="0" smtClean="0">
                 <a:latin typeface="Ubuntu Condensed" panose="020B0506030602030204" pitchFamily="34" charset="0"/>
               </a:rPr>
-              <a:t>Evolution </a:t>
-            </a:r>
-            <a:endParaRPr lang="fr-FR" dirty="0">
+              <a:t>Era of JQuery</a:t>
+            </a:r>
+            <a:endParaRPr lang="en-AU" dirty="0">
               <a:latin typeface="Ubuntu Condensed" panose="020B0506030602030204" pitchFamily="34" charset="0"/>
             </a:endParaRPr>
           </a:p>
@@ -3934,107 +4887,125 @@
         </p:nvSpPr>
         <p:spPr>
           <a:xfrm>
-            <a:off x="838200" y="2219570"/>
-            <a:ext cx="10515600" cy="1860061"/>
+            <a:off x="838200" y="1242647"/>
+            <a:ext cx="10515600" cy="5099538"/>
           </a:xfrm>
         </p:spPr>
         <p:txBody>
-          <a:bodyPr/>
+          <a:bodyPr>
+            <a:normAutofit/>
+          </a:bodyPr>
           <a:lstStyle/>
           <a:p>
-            <a:r>
-              <a:rPr lang="fr-FR" dirty="0" smtClean="0">
-                <a:latin typeface="Ubuntu Light" panose="020B0304030602030204" pitchFamily="34" charset="0"/>
-              </a:rPr>
-              <a:t>MVC (Model-</a:t>
-            </a:r>
-            <a:r>
-              <a:rPr lang="fr-FR" dirty="0" err="1" smtClean="0">
-                <a:latin typeface="Ubuntu Light" panose="020B0304030602030204" pitchFamily="34" charset="0"/>
-              </a:rPr>
-              <a:t>View</a:t>
-            </a:r>
-            <a:r>
-              <a:rPr lang="fr-FR" dirty="0" smtClean="0">
-                <a:latin typeface="Ubuntu Light" panose="020B0304030602030204" pitchFamily="34" charset="0"/>
-              </a:rPr>
-              <a:t>-Controller)</a:t>
-            </a:r>
-          </a:p>
-          <a:p>
-            <a:r>
-              <a:rPr lang="fr-FR" dirty="0" smtClean="0">
-                <a:latin typeface="Ubuntu Light" panose="020B0304030602030204" pitchFamily="34" charset="0"/>
-              </a:rPr>
-              <a:t>MVP (Model-</a:t>
-            </a:r>
-            <a:r>
-              <a:rPr lang="fr-FR" dirty="0" err="1" smtClean="0">
-                <a:latin typeface="Ubuntu Light" panose="020B0304030602030204" pitchFamily="34" charset="0"/>
-              </a:rPr>
-              <a:t>View</a:t>
-            </a:r>
-            <a:r>
-              <a:rPr lang="fr-FR" dirty="0" smtClean="0">
-                <a:latin typeface="Ubuntu Light" panose="020B0304030602030204" pitchFamily="34" charset="0"/>
-              </a:rPr>
-              <a:t>-</a:t>
-            </a:r>
-            <a:r>
-              <a:rPr lang="fr-FR" dirty="0" err="1" smtClean="0">
-                <a:latin typeface="Ubuntu Light" panose="020B0304030602030204" pitchFamily="34" charset="0"/>
-              </a:rPr>
-              <a:t>Presenter</a:t>
-            </a:r>
-            <a:r>
-              <a:rPr lang="fr-FR" dirty="0" smtClean="0">
-                <a:latin typeface="Ubuntu Light" panose="020B0304030602030204" pitchFamily="34" charset="0"/>
-              </a:rPr>
-              <a:t>)</a:t>
-            </a:r>
-          </a:p>
-          <a:p>
-            <a:r>
-              <a:rPr lang="fr-FR" dirty="0" smtClean="0">
-                <a:latin typeface="Ubuntu Light" panose="020B0304030602030204" pitchFamily="34" charset="0"/>
-              </a:rPr>
-              <a:t>MVVM (Model-</a:t>
-            </a:r>
-            <a:r>
-              <a:rPr lang="fr-FR" dirty="0" err="1" smtClean="0">
-                <a:latin typeface="Ubuntu Light" panose="020B0304030602030204" pitchFamily="34" charset="0"/>
-              </a:rPr>
-              <a:t>View</a:t>
-            </a:r>
-            <a:r>
-              <a:rPr lang="fr-FR" dirty="0" smtClean="0">
-                <a:latin typeface="Ubuntu Light" panose="020B0304030602030204" pitchFamily="34" charset="0"/>
-              </a:rPr>
-              <a:t>-</a:t>
-            </a:r>
-            <a:r>
-              <a:rPr lang="fr-FR" dirty="0" err="1" smtClean="0">
-                <a:latin typeface="Ubuntu Light" panose="020B0304030602030204" pitchFamily="34" charset="0"/>
-              </a:rPr>
-              <a:t>ViewModel</a:t>
-            </a:r>
-            <a:r>
-              <a:rPr lang="fr-FR" dirty="0" smtClean="0">
-                <a:latin typeface="Ubuntu Light" panose="020B0304030602030204" pitchFamily="34" charset="0"/>
-              </a:rPr>
-              <a:t>)</a:t>
-            </a:r>
+            <a:pPr>
+              <a:lnSpc>
+                <a:spcPct val="100000"/>
+              </a:lnSpc>
+            </a:pPr>
+            <a:r>
+              <a:rPr lang="en-AU" dirty="0" smtClean="0">
+                <a:latin typeface="Ubuntu Light" panose="020B0304030602030204" pitchFamily="34" charset="0"/>
+              </a:rPr>
+              <a:t>Everyone knows that </a:t>
+            </a:r>
+            <a:r>
+              <a:rPr lang="en-AU" dirty="0" err="1" smtClean="0">
+                <a:latin typeface="Ubuntu Light" panose="020B0304030602030204" pitchFamily="34" charset="0"/>
+              </a:rPr>
+              <a:t>jquery</a:t>
+            </a:r>
+            <a:r>
+              <a:rPr lang="en-AU" dirty="0" smtClean="0">
+                <a:latin typeface="Ubuntu Light" panose="020B0304030602030204" pitchFamily="34" charset="0"/>
+              </a:rPr>
+              <a:t> was born as a pretty nice alternative of the bloated and inconsistent DOM API</a:t>
+            </a:r>
+          </a:p>
+          <a:p>
+            <a:pPr>
+              <a:lnSpc>
+                <a:spcPct val="100000"/>
+              </a:lnSpc>
+            </a:pPr>
+            <a:r>
+              <a:rPr lang="en-AU" dirty="0" smtClean="0">
+                <a:latin typeface="Ubuntu Light" panose="020B0304030602030204" pitchFamily="34" charset="0"/>
+              </a:rPr>
+              <a:t>In the beginning jQuery was considered such as high level abstraction layer of the DOM API</a:t>
+            </a:r>
+          </a:p>
+          <a:p>
+            <a:pPr>
+              <a:lnSpc>
+                <a:spcPct val="100000"/>
+              </a:lnSpc>
+            </a:pPr>
+            <a:r>
+              <a:rPr lang="en-AU" dirty="0" smtClean="0">
+                <a:latin typeface="Ubuntu Light" panose="020B0304030602030204" pitchFamily="34" charset="0"/>
+              </a:rPr>
+              <a:t>Time pass, Web advance and application richness grow up</a:t>
+            </a:r>
+          </a:p>
+          <a:p>
+            <a:pPr>
+              <a:lnSpc>
+                <a:spcPct val="100000"/>
+              </a:lnSpc>
+            </a:pPr>
+            <a:r>
+              <a:rPr lang="en-AU" dirty="0" smtClean="0">
+                <a:latin typeface="Ubuntu Light" panose="020B0304030602030204" pitchFamily="34" charset="0"/>
+              </a:rPr>
+              <a:t>JQuery becomes an </a:t>
+            </a:r>
+            <a:r>
+              <a:rPr lang="en-AU" dirty="0" err="1" smtClean="0">
+                <a:latin typeface="Ubuntu Light" panose="020B0304030602030204" pitchFamily="34" charset="0"/>
+              </a:rPr>
+              <a:t>exilent</a:t>
+            </a:r>
+            <a:r>
+              <a:rPr lang="en-AU" dirty="0" smtClean="0">
+                <a:latin typeface="Ubuntu Light" panose="020B0304030602030204" pitchFamily="34" charset="0"/>
+              </a:rPr>
+              <a:t> low-level way to manipulate elements and events in a web applications</a:t>
+            </a:r>
+          </a:p>
+          <a:p>
+            <a:pPr>
+              <a:lnSpc>
+                <a:spcPct val="100000"/>
+              </a:lnSpc>
+            </a:pPr>
+            <a:r>
+              <a:rPr lang="en-AU" dirty="0" smtClean="0">
+                <a:latin typeface="Ubuntu Light" panose="020B0304030602030204" pitchFamily="34" charset="0"/>
+              </a:rPr>
+              <a:t>Every time that your applications get more sophisticated, things can get tricky and expensive to maintain if you use JQuery only</a:t>
+            </a:r>
+          </a:p>
+          <a:p>
+            <a:pPr marL="0" indent="0">
+              <a:lnSpc>
+                <a:spcPct val="100000"/>
+              </a:lnSpc>
+              <a:buNone/>
+            </a:pPr>
+            <a:endParaRPr lang="en-AU" dirty="0" smtClean="0">
+              <a:latin typeface="Ubuntu Light" panose="020B0304030602030204" pitchFamily="34" charset="0"/>
+            </a:endParaRPr>
           </a:p>
           <a:p>
             <a:pPr marL="0" indent="0">
               <a:buNone/>
             </a:pPr>
-            <a:endParaRPr lang="fr-FR" dirty="0">
+            <a:endParaRPr lang="en-AU" dirty="0" smtClean="0">
               <a:latin typeface="Ubuntu Light" panose="020B0304030602030204" pitchFamily="34" charset="0"/>
             </a:endParaRPr>
           </a:p>
           <a:p>
-            <a:endParaRPr lang="fr-FR" dirty="0">
+            <a:endParaRPr lang="en-AU" dirty="0">
               <a:latin typeface="Ubuntu Light" panose="020B0304030602030204" pitchFamily="34" charset="0"/>
             </a:endParaRPr>
           </a:p>
@@ -4096,6 +5067,188 @@
               <a:rPr lang="fr-FR" dirty="0" smtClean="0">
                 <a:latin typeface="Ubuntu Condensed" panose="020B0506030602030204" pitchFamily="34" charset="0"/>
               </a:rPr>
+              <a:t>Evolution </a:t>
+            </a:r>
+            <a:endParaRPr lang="fr-FR" dirty="0">
+              <a:latin typeface="Ubuntu Condensed" panose="020B0506030602030204" pitchFamily="34" charset="0"/>
+            </a:endParaRPr>
+          </a:p>
+        </p:txBody>
+      </p:sp>
+      <p:sp>
+        <p:nvSpPr>
+          <p:cNvPr id="3" name="Content Placeholder 2"/>
+          <p:cNvSpPr>
+            <a:spLocks noGrp="1"/>
+          </p:cNvSpPr>
+          <p:nvPr>
+            <p:ph idx="1"/>
+          </p:nvPr>
+        </p:nvSpPr>
+        <p:spPr>
+          <a:xfrm>
+            <a:off x="838200" y="2219570"/>
+            <a:ext cx="10515600" cy="1860061"/>
+          </a:xfrm>
+        </p:spPr>
+        <p:txBody>
+          <a:bodyPr/>
+          <a:lstStyle/>
+          <a:p>
+            <a:r>
+              <a:rPr lang="fr-FR" dirty="0" smtClean="0">
+                <a:latin typeface="Ubuntu Light" panose="020B0304030602030204" pitchFamily="34" charset="0"/>
+              </a:rPr>
+              <a:t>MVC (Model-</a:t>
+            </a:r>
+            <a:r>
+              <a:rPr lang="fr-FR" dirty="0" err="1" smtClean="0">
+                <a:latin typeface="Ubuntu Light" panose="020B0304030602030204" pitchFamily="34" charset="0"/>
+              </a:rPr>
+              <a:t>View</a:t>
+            </a:r>
+            <a:r>
+              <a:rPr lang="fr-FR" dirty="0" smtClean="0">
+                <a:latin typeface="Ubuntu Light" panose="020B0304030602030204" pitchFamily="34" charset="0"/>
+              </a:rPr>
+              <a:t>-Controller)</a:t>
+            </a:r>
+          </a:p>
+          <a:p>
+            <a:r>
+              <a:rPr lang="fr-FR" dirty="0" smtClean="0">
+                <a:latin typeface="Ubuntu Light" panose="020B0304030602030204" pitchFamily="34" charset="0"/>
+              </a:rPr>
+              <a:t>MVP (Model-</a:t>
+            </a:r>
+            <a:r>
+              <a:rPr lang="fr-FR" dirty="0" err="1" smtClean="0">
+                <a:latin typeface="Ubuntu Light" panose="020B0304030602030204" pitchFamily="34" charset="0"/>
+              </a:rPr>
+              <a:t>View</a:t>
+            </a:r>
+            <a:r>
+              <a:rPr lang="fr-FR" dirty="0" smtClean="0">
+                <a:latin typeface="Ubuntu Light" panose="020B0304030602030204" pitchFamily="34" charset="0"/>
+              </a:rPr>
+              <a:t>-</a:t>
+            </a:r>
+            <a:r>
+              <a:rPr lang="fr-FR" dirty="0" err="1" smtClean="0">
+                <a:latin typeface="Ubuntu Light" panose="020B0304030602030204" pitchFamily="34" charset="0"/>
+              </a:rPr>
+              <a:t>Presenter</a:t>
+            </a:r>
+            <a:r>
+              <a:rPr lang="fr-FR" dirty="0" smtClean="0">
+                <a:latin typeface="Ubuntu Light" panose="020B0304030602030204" pitchFamily="34" charset="0"/>
+              </a:rPr>
+              <a:t>)</a:t>
+            </a:r>
+          </a:p>
+          <a:p>
+            <a:r>
+              <a:rPr lang="fr-FR" dirty="0" smtClean="0">
+                <a:latin typeface="Ubuntu Light" panose="020B0304030602030204" pitchFamily="34" charset="0"/>
+              </a:rPr>
+              <a:t>MVVM (Model-</a:t>
+            </a:r>
+            <a:r>
+              <a:rPr lang="fr-FR" dirty="0" err="1" smtClean="0">
+                <a:latin typeface="Ubuntu Light" panose="020B0304030602030204" pitchFamily="34" charset="0"/>
+              </a:rPr>
+              <a:t>View</a:t>
+            </a:r>
+            <a:r>
+              <a:rPr lang="fr-FR" dirty="0" smtClean="0">
+                <a:latin typeface="Ubuntu Light" panose="020B0304030602030204" pitchFamily="34" charset="0"/>
+              </a:rPr>
+              <a:t>-</a:t>
+            </a:r>
+            <a:r>
+              <a:rPr lang="fr-FR" dirty="0" err="1" smtClean="0">
+                <a:latin typeface="Ubuntu Light" panose="020B0304030602030204" pitchFamily="34" charset="0"/>
+              </a:rPr>
+              <a:t>ViewModel</a:t>
+            </a:r>
+            <a:r>
+              <a:rPr lang="fr-FR" dirty="0" smtClean="0">
+                <a:latin typeface="Ubuntu Light" panose="020B0304030602030204" pitchFamily="34" charset="0"/>
+              </a:rPr>
+              <a:t>)</a:t>
+            </a:r>
+          </a:p>
+          <a:p>
+            <a:pPr marL="0" indent="0">
+              <a:buNone/>
+            </a:pPr>
+            <a:endParaRPr lang="fr-FR" dirty="0">
+              <a:latin typeface="Ubuntu Light" panose="020B0304030602030204" pitchFamily="34" charset="0"/>
+            </a:endParaRPr>
+          </a:p>
+          <a:p>
+            <a:endParaRPr lang="fr-FR" dirty="0">
+              <a:latin typeface="Ubuntu Light" panose="020B0304030602030204" pitchFamily="34" charset="0"/>
+            </a:endParaRPr>
+          </a:p>
+        </p:txBody>
+      </p:sp>
+    </p:spTree>
+    <p:extLst>
+      <p:ext uri="{BB962C8B-B14F-4D97-AF65-F5344CB8AC3E}">
+        <p14:creationId xmlns:p14="http://schemas.microsoft.com/office/powerpoint/2010/main" val="444690639"/>
+      </p:ext>
+    </p:extLst>
+  </p:cSld>
+  <p:clrMapOvr>
+    <a:masterClrMapping/>
+  </p:clrMapOvr>
+</p:sld>
+</file>
+
+<file path=ppt/slides/slide4.xml><?xml version="1.0" encoding="utf-8"?>
+<p:sld xmlns:a="http://schemas.openxmlformats.org/drawingml/2006/main" xmlns:r="http://schemas.openxmlformats.org/officeDocument/2006/relationships" xmlns:p="http://schemas.openxmlformats.org/presentationml/2006/main">
+  <p:cSld>
+    <p:spTree>
+      <p:nvGrpSpPr>
+        <p:cNvPr id="1" name=""/>
+        <p:cNvGrpSpPr/>
+        <p:nvPr/>
+      </p:nvGrpSpPr>
+      <p:grpSpPr>
+        <a:xfrm>
+          <a:off x="0" y="0"/>
+          <a:ext cx="0" cy="0"/>
+          <a:chOff x="0" y="0"/>
+          <a:chExt cx="0" cy="0"/>
+        </a:xfrm>
+      </p:grpSpPr>
+      <p:sp>
+        <p:nvSpPr>
+          <p:cNvPr id="2" name="Title 1"/>
+          <p:cNvSpPr>
+            <a:spLocks noGrp="1"/>
+          </p:cNvSpPr>
+          <p:nvPr>
+            <p:ph type="title"/>
+          </p:nvPr>
+        </p:nvSpPr>
+        <p:spPr>
+          <a:xfrm>
+            <a:off x="838200" y="365125"/>
+            <a:ext cx="10515600" cy="682137"/>
+          </a:xfrm>
+        </p:spPr>
+        <p:txBody>
+          <a:bodyPr>
+            <a:normAutofit fontScale="90000"/>
+          </a:bodyPr>
+          <a:lstStyle/>
+          <a:p>
+            <a:r>
+              <a:rPr lang="fr-FR" dirty="0" smtClean="0">
+                <a:latin typeface="Ubuntu Condensed" panose="020B0506030602030204" pitchFamily="34" charset="0"/>
+              </a:rPr>
               <a:t>MVC</a:t>
             </a:r>
             <a:endParaRPr lang="fr-FR" dirty="0">
@@ -4394,7 +5547,7 @@
 </p:sld>
 </file>
 
-<file path=ppt/slides/slide4.xml><?xml version="1.0" encoding="utf-8"?>
+<file path=ppt/slides/slide5.xml><?xml version="1.0" encoding="utf-8"?>
 <p:sld xmlns:a="http://schemas.openxmlformats.org/drawingml/2006/main" xmlns:r="http://schemas.openxmlformats.org/officeDocument/2006/relationships" xmlns:p="http://schemas.openxmlformats.org/presentationml/2006/main">
   <p:cSld>
     <p:spTree>
@@ -4635,13 +5788,7 @@
               <a:rPr lang="en-GB" sz="2400" dirty="0" smtClean="0">
                 <a:latin typeface="Ubuntu Light" panose="020B0304030602030204" pitchFamily="34" charset="0"/>
               </a:rPr>
-              <a:t>Presenter means intermediary that represents view state </a:t>
-            </a:r>
-            <a:r>
-              <a:rPr lang="en-GB" sz="2400" dirty="0" smtClean="0">
-                <a:latin typeface="Ubuntu Light" panose="020B0304030602030204" pitchFamily="34" charset="0"/>
-              </a:rPr>
-              <a:t>(</a:t>
+              <a:t>Presenter means intermediary that represents view state (</a:t>
             </a:r>
             <a:r>
               <a:rPr lang="en-GB" sz="2400" dirty="0" err="1" smtClean="0">
@@ -4761,7 +5908,7 @@
 </p:sld>
 </file>
 
-<file path=ppt/slides/slide5.xml><?xml version="1.0" encoding="utf-8"?>
+<file path=ppt/slides/slide6.xml><?xml version="1.0" encoding="utf-8"?>
 <p:sld xmlns:a="http://schemas.openxmlformats.org/drawingml/2006/main" xmlns:r="http://schemas.openxmlformats.org/officeDocument/2006/relationships" xmlns:p="http://schemas.openxmlformats.org/presentationml/2006/main">
   <p:cSld>
     <p:spTree>
@@ -4822,8 +5969,8 @@
         </p:nvSpPr>
         <p:spPr>
           <a:xfrm>
-            <a:off x="838200" y="2923189"/>
-            <a:ext cx="10515600" cy="1720374"/>
+            <a:off x="838199" y="3554996"/>
+            <a:ext cx="10515600" cy="2965547"/>
           </a:xfrm>
           <a:prstGeom prst="rect">
             <a:avLst/>
@@ -4831,7 +5978,7 @@
         </p:spPr>
         <p:txBody>
           <a:bodyPr vert="horz" lIns="91440" tIns="45720" rIns="91440" bIns="45720" rtlCol="0">
-            <a:normAutofit fontScale="92500"/>
+            <a:normAutofit/>
           </a:bodyPr>
           <a:lstStyle>
             <a:lvl1pPr marL="228600" indent="-228600" algn="l" defTabSz="914400" rtl="0" eaLnBrk="1" latinLnBrk="0" hangingPunct="1">
@@ -4999,16 +6146,36 @@
           </a:lstStyle>
           <a:p>
             <a:r>
+              <a:rPr lang="en-GB" sz="2400" dirty="0" smtClean="0">
+                <a:latin typeface="Ubuntu Light" panose="020B0304030602030204" pitchFamily="34" charset="0"/>
+              </a:rPr>
+              <a:t>Model – Application stored data (server side via </a:t>
+            </a:r>
+            <a:r>
               <a:rPr lang="en-GB" sz="2400" dirty="0" err="1" smtClean="0">
                 <a:latin typeface="Ubuntu Light" panose="020B0304030602030204" pitchFamily="34" charset="0"/>
               </a:rPr>
+              <a:t>ajax</a:t>
+            </a:r>
+            <a:r>
+              <a:rPr lang="en-GB" sz="2400" dirty="0" smtClean="0">
+                <a:latin typeface="Ubuntu Light" panose="020B0304030602030204" pitchFamily="34" charset="0"/>
+              </a:rPr>
+              <a:t>)</a:t>
+            </a:r>
+          </a:p>
+          <a:p>
+            <a:r>
+              <a:rPr lang="en-GB" sz="2400" dirty="0" err="1" smtClean="0">
+                <a:latin typeface="Ubuntu Light" panose="020B0304030602030204" pitchFamily="34" charset="0"/>
+              </a:rPr>
               <a:t>ViewModel</a:t>
             </a:r>
             <a:r>
               <a:rPr lang="en-GB" sz="2400" dirty="0" smtClean="0">
                 <a:latin typeface="Ubuntu Light" panose="020B0304030602030204" pitchFamily="34" charset="0"/>
               </a:rPr>
-              <a:t> represents view state</a:t>
+              <a:t> – Pure representation of the data and operations on a UI</a:t>
             </a:r>
           </a:p>
           <a:p>
@@ -5016,6 +6183,17 @@
               <a:rPr lang="en-GB" sz="2400" dirty="0" smtClean="0">
                 <a:latin typeface="Ubuntu Light" panose="020B0304030602030204" pitchFamily="34" charset="0"/>
               </a:rPr>
+              <a:t>View – Visible, interactive UI representing the state of the view model</a:t>
+            </a:r>
+            <a:endParaRPr lang="en-GB" sz="2400" dirty="0" smtClean="0">
+              <a:latin typeface="Ubuntu Light" panose="020B0304030602030204" pitchFamily="34" charset="0"/>
+            </a:endParaRPr>
+          </a:p>
+          <a:p>
+            <a:r>
+              <a:rPr lang="en-GB" sz="2400" dirty="0" smtClean="0">
+                <a:latin typeface="Ubuntu Light" panose="020B0304030602030204" pitchFamily="34" charset="0"/>
+              </a:rPr>
               <a:t>All communication between View and </a:t>
             </a:r>
             <a:r>
@@ -5028,7 +6206,19 @@
               <a:rPr lang="en-GB" sz="2400" dirty="0" smtClean="0">
                 <a:latin typeface="Ubuntu Light" panose="020B0304030602030204" pitchFamily="34" charset="0"/>
               </a:rPr>
-              <a:t> pass by data binding events</a:t>
+              <a:t> pass </a:t>
+            </a:r>
+            <a:r>
+              <a:rPr lang="en-GB" sz="2400" dirty="0" smtClean="0">
+                <a:latin typeface="Ubuntu Light" panose="020B0304030602030204" pitchFamily="34" charset="0"/>
+              </a:rPr>
+              <a:t>trough </a:t>
+            </a:r>
+            <a:r>
+              <a:rPr lang="en-GB" sz="2400" dirty="0" smtClean="0">
+                <a:latin typeface="Ubuntu Light" panose="020B0304030602030204" pitchFamily="34" charset="0"/>
+              </a:rPr>
+              <a:t>data binding events</a:t>
             </a:r>
           </a:p>
           <a:p>
@@ -5118,7 +6308,7 @@
         </p:blipFill>
         <p:spPr bwMode="auto">
           <a:xfrm>
-            <a:off x="3348037" y="1513737"/>
+            <a:off x="3348036" y="2335643"/>
             <a:ext cx="5495925" cy="942976"/>
           </a:xfrm>
           <a:prstGeom prst="rect">
@@ -5136,321 +6326,64 @@
           </a:extLst>
         </p:spPr>
       </p:pic>
-    </p:spTree>
-    <p:extLst>
-      <p:ext uri="{BB962C8B-B14F-4D97-AF65-F5344CB8AC3E}">
-        <p14:creationId xmlns:p14="http://schemas.microsoft.com/office/powerpoint/2010/main" val="1587402421"/>
-      </p:ext>
-    </p:extLst>
-  </p:cSld>
-  <p:clrMapOvr>
-    <a:masterClrMapping/>
-  </p:clrMapOvr>
-</p:sld>
-</file>
-
-<file path=ppt/slides/slide6.xml><?xml version="1.0" encoding="utf-8"?>
-<p:sld xmlns:a="http://schemas.openxmlformats.org/drawingml/2006/main" xmlns:r="http://schemas.openxmlformats.org/officeDocument/2006/relationships" xmlns:p="http://schemas.openxmlformats.org/presentationml/2006/main">
-  <p:cSld>
-    <p:spTree>
-      <p:nvGrpSpPr>
-        <p:cNvPr id="1" name=""/>
-        <p:cNvGrpSpPr/>
-        <p:nvPr/>
-      </p:nvGrpSpPr>
-      <p:grpSpPr>
-        <a:xfrm>
-          <a:off x="0" y="0"/>
-          <a:ext cx="0" cy="0"/>
-          <a:chOff x="0" y="0"/>
-          <a:chExt cx="0" cy="0"/>
-        </a:xfrm>
-      </p:grpSpPr>
-      <p:sp>
-        <p:nvSpPr>
-          <p:cNvPr id="2" name="Title 1"/>
-          <p:cNvSpPr>
-            <a:spLocks noGrp="1"/>
-          </p:cNvSpPr>
-          <p:nvPr>
-            <p:ph type="title"/>
-          </p:nvPr>
+      <p:sp>
+        <p:nvSpPr>
+          <p:cNvPr id="3" name="Rectangle 2"/>
+          <p:cNvSpPr/>
+          <p:nvPr/>
         </p:nvSpPr>
         <p:spPr>
           <a:xfrm>
-            <a:off x="838200" y="365125"/>
-            <a:ext cx="10515600" cy="682137"/>
-          </a:xfrm>
-        </p:spPr>
-        <p:txBody>
-          <a:bodyPr>
-            <a:normAutofit fontScale="90000"/>
-          </a:bodyPr>
-          <a:lstStyle/>
-          <a:p>
-            <a:r>
-              <a:rPr lang="en-CA" dirty="0" smtClean="0">
-                <a:latin typeface="Ubuntu Condensed" panose="020B0506030602030204" pitchFamily="34" charset="0"/>
-              </a:rPr>
-              <a:t>What is Knockout.js</a:t>
-            </a:r>
-            <a:endParaRPr lang="en-CA" dirty="0">
-              <a:latin typeface="Ubuntu Condensed" panose="020B0506030602030204" pitchFamily="34" charset="0"/>
-            </a:endParaRPr>
-          </a:p>
-        </p:txBody>
-      </p:sp>
-      <p:sp>
-        <p:nvSpPr>
-          <p:cNvPr id="5" name="Content Placeholder 2"/>
-          <p:cNvSpPr txBox="1">
-            <a:spLocks/>
-          </p:cNvSpPr>
-          <p:nvPr/>
-        </p:nvSpPr>
-        <p:spPr>
-          <a:xfrm>
-            <a:off x="838200" y="2501769"/>
-            <a:ext cx="10515600" cy="2038426"/>
+            <a:off x="838199" y="1140722"/>
+            <a:ext cx="10515600" cy="1200329"/>
           </a:xfrm>
           <a:prstGeom prst="rect">
             <a:avLst/>
           </a:prstGeom>
         </p:spPr>
         <p:txBody>
-          <a:bodyPr vert="horz" lIns="91440" tIns="45720" rIns="91440" bIns="45720" rtlCol="0">
-            <a:normAutofit/>
+          <a:bodyPr wrap="square">
+            <a:spAutoFit/>
           </a:bodyPr>
-          <a:lstStyle>
-            <a:lvl1pPr marL="228600" indent="-228600" algn="l" defTabSz="914400" rtl="0" eaLnBrk="1" latinLnBrk="0" hangingPunct="1">
-              <a:lnSpc>
-                <a:spcPct val="90000"/>
-              </a:lnSpc>
-              <a:spcBef>
-                <a:spcPts val="1000"/>
-              </a:spcBef>
-              <a:buFont typeface="Arial" panose="020B0604020202020204" pitchFamily="34" charset="0"/>
-              <a:buChar char="•"/>
-              <a:defRPr sz="2800" kern="1200">
-                <a:solidFill>
-                  <a:schemeClr val="tx1"/>
-                </a:solidFill>
-                <a:latin typeface="+mn-lt"/>
-                <a:ea typeface="+mn-ea"/>
-                <a:cs typeface="+mn-cs"/>
-              </a:defRPr>
-            </a:lvl1pPr>
-            <a:lvl2pPr marL="685800" indent="-228600" algn="l" defTabSz="914400" rtl="0" eaLnBrk="1" latinLnBrk="0" hangingPunct="1">
-              <a:lnSpc>
-                <a:spcPct val="90000"/>
-              </a:lnSpc>
-              <a:spcBef>
-                <a:spcPts val="500"/>
-              </a:spcBef>
-              <a:buFont typeface="Arial" panose="020B0604020202020204" pitchFamily="34" charset="0"/>
-              <a:buChar char="•"/>
-              <a:defRPr sz="2400" kern="1200">
-                <a:solidFill>
-                  <a:schemeClr val="tx1"/>
-                </a:solidFill>
-                <a:latin typeface="+mn-lt"/>
-                <a:ea typeface="+mn-ea"/>
-                <a:cs typeface="+mn-cs"/>
-              </a:defRPr>
-            </a:lvl2pPr>
-            <a:lvl3pPr marL="1143000" indent="-228600" algn="l" defTabSz="914400" rtl="0" eaLnBrk="1" latinLnBrk="0" hangingPunct="1">
-              <a:lnSpc>
-                <a:spcPct val="90000"/>
-              </a:lnSpc>
-              <a:spcBef>
-                <a:spcPts val="500"/>
-              </a:spcBef>
-              <a:buFont typeface="Arial" panose="020B0604020202020204" pitchFamily="34" charset="0"/>
-              <a:buChar char="•"/>
-              <a:defRPr sz="2000" kern="1200">
-                <a:solidFill>
-                  <a:schemeClr val="tx1"/>
-                </a:solidFill>
-                <a:latin typeface="+mn-lt"/>
-                <a:ea typeface="+mn-ea"/>
-                <a:cs typeface="+mn-cs"/>
-              </a:defRPr>
-            </a:lvl3pPr>
-            <a:lvl4pPr marL="1600200" indent="-228600" algn="l" defTabSz="914400" rtl="0" eaLnBrk="1" latinLnBrk="0" hangingPunct="1">
-              <a:lnSpc>
-                <a:spcPct val="90000"/>
-              </a:lnSpc>
-              <a:spcBef>
-                <a:spcPts val="500"/>
-              </a:spcBef>
-              <a:buFont typeface="Arial" panose="020B0604020202020204" pitchFamily="34" charset="0"/>
-              <a:buChar char="•"/>
-              <a:defRPr sz="1800" kern="1200">
-                <a:solidFill>
-                  <a:schemeClr val="tx1"/>
-                </a:solidFill>
-                <a:latin typeface="+mn-lt"/>
-                <a:ea typeface="+mn-ea"/>
-                <a:cs typeface="+mn-cs"/>
-              </a:defRPr>
-            </a:lvl4pPr>
-            <a:lvl5pPr marL="2057400" indent="-228600" algn="l" defTabSz="914400" rtl="0" eaLnBrk="1" latinLnBrk="0" hangingPunct="1">
-              <a:lnSpc>
-                <a:spcPct val="90000"/>
-              </a:lnSpc>
-              <a:spcBef>
-                <a:spcPts val="500"/>
-              </a:spcBef>
-              <a:buFont typeface="Arial" panose="020B0604020202020204" pitchFamily="34" charset="0"/>
-              <a:buChar char="•"/>
-              <a:defRPr sz="1800" kern="1200">
-                <a:solidFill>
-                  <a:schemeClr val="tx1"/>
-                </a:solidFill>
-                <a:latin typeface="+mn-lt"/>
-                <a:ea typeface="+mn-ea"/>
-                <a:cs typeface="+mn-cs"/>
-              </a:defRPr>
-            </a:lvl5pPr>
-            <a:lvl6pPr marL="2514600" indent="-228600" algn="l" defTabSz="914400" rtl="0" eaLnBrk="1" latinLnBrk="0" hangingPunct="1">
-              <a:lnSpc>
-                <a:spcPct val="90000"/>
-              </a:lnSpc>
-              <a:spcBef>
-                <a:spcPts val="500"/>
-              </a:spcBef>
-              <a:buFont typeface="Arial" panose="020B0604020202020204" pitchFamily="34" charset="0"/>
-              <a:buChar char="•"/>
-              <a:defRPr sz="1800" kern="1200">
-                <a:solidFill>
-                  <a:schemeClr val="tx1"/>
-                </a:solidFill>
-                <a:latin typeface="+mn-lt"/>
-                <a:ea typeface="+mn-ea"/>
-                <a:cs typeface="+mn-cs"/>
-              </a:defRPr>
-            </a:lvl6pPr>
-            <a:lvl7pPr marL="2971800" indent="-228600" algn="l" defTabSz="914400" rtl="0" eaLnBrk="1" latinLnBrk="0" hangingPunct="1">
-              <a:lnSpc>
-                <a:spcPct val="90000"/>
-              </a:lnSpc>
-              <a:spcBef>
-                <a:spcPts val="500"/>
-              </a:spcBef>
-              <a:buFont typeface="Arial" panose="020B0604020202020204" pitchFamily="34" charset="0"/>
-              <a:buChar char="•"/>
-              <a:defRPr sz="1800" kern="1200">
-                <a:solidFill>
-                  <a:schemeClr val="tx1"/>
-                </a:solidFill>
-                <a:latin typeface="+mn-lt"/>
-                <a:ea typeface="+mn-ea"/>
-                <a:cs typeface="+mn-cs"/>
-              </a:defRPr>
-            </a:lvl7pPr>
-            <a:lvl8pPr marL="3429000" indent="-228600" algn="l" defTabSz="914400" rtl="0" eaLnBrk="1" latinLnBrk="0" hangingPunct="1">
-              <a:lnSpc>
-                <a:spcPct val="90000"/>
-              </a:lnSpc>
-              <a:spcBef>
-                <a:spcPts val="500"/>
-              </a:spcBef>
-              <a:buFont typeface="Arial" panose="020B0604020202020204" pitchFamily="34" charset="0"/>
-              <a:buChar char="•"/>
-              <a:defRPr sz="1800" kern="1200">
-                <a:solidFill>
-                  <a:schemeClr val="tx1"/>
-                </a:solidFill>
-                <a:latin typeface="+mn-lt"/>
-                <a:ea typeface="+mn-ea"/>
-                <a:cs typeface="+mn-cs"/>
-              </a:defRPr>
-            </a:lvl8pPr>
-            <a:lvl9pPr marL="3886200" indent="-228600" algn="l" defTabSz="914400" rtl="0" eaLnBrk="1" latinLnBrk="0" hangingPunct="1">
-              <a:lnSpc>
-                <a:spcPct val="90000"/>
-              </a:lnSpc>
-              <a:spcBef>
-                <a:spcPts val="500"/>
-              </a:spcBef>
-              <a:buFont typeface="Arial" panose="020B0604020202020204" pitchFamily="34" charset="0"/>
-              <a:buChar char="•"/>
-              <a:defRPr sz="1800" kern="1200">
-                <a:solidFill>
-                  <a:schemeClr val="tx1"/>
-                </a:solidFill>
-                <a:latin typeface="+mn-lt"/>
-                <a:ea typeface="+mn-ea"/>
-                <a:cs typeface="+mn-cs"/>
-              </a:defRPr>
-            </a:lvl9pPr>
-          </a:lstStyle>
-          <a:p>
-            <a:r>
-              <a:rPr lang="en-GB" sz="2400" dirty="0" smtClean="0">
-                <a:latin typeface="Ubuntu Light" panose="020B0304030602030204" pitchFamily="34" charset="0"/>
-              </a:rPr>
-              <a:t>Implements MVVM pattern</a:t>
-            </a:r>
-          </a:p>
-          <a:p>
-            <a:r>
-              <a:rPr lang="en-CA" sz="2400" dirty="0" smtClean="0">
-                <a:latin typeface="Ubuntu Light" panose="020B0304030602030204" pitchFamily="34" charset="0"/>
-              </a:rPr>
-              <a:t>Uses transparent binding mechanism to offer interaction between DOM elements and </a:t>
-            </a:r>
-            <a:r>
-              <a:rPr lang="en-CA" sz="2400" dirty="0" err="1" smtClean="0">
-                <a:latin typeface="Ubuntu Light" panose="020B0304030602030204" pitchFamily="34" charset="0"/>
-              </a:rPr>
-              <a:t>ViewModels</a:t>
-            </a:r>
-            <a:endParaRPr lang="en-CA" sz="2400" dirty="0" smtClean="0">
-              <a:latin typeface="Ubuntu Light" panose="020B0304030602030204" pitchFamily="34" charset="0"/>
-            </a:endParaRPr>
-          </a:p>
-          <a:p>
-            <a:r>
-              <a:rPr lang="en-CA" sz="2400" noProof="0" dirty="0" smtClean="0">
-                <a:latin typeface="Ubuntu Light" panose="020B0304030602030204" pitchFamily="34" charset="0"/>
-              </a:rPr>
-              <a:t>Uses HTML5 data attributes to realize </a:t>
-            </a:r>
-            <a:r>
-              <a:rPr lang="en-CA" sz="2400" noProof="0" dirty="0" err="1" smtClean="0">
-                <a:latin typeface="Ubuntu Light" panose="020B0304030602030204" pitchFamily="34" charset="0"/>
-              </a:rPr>
-              <a:t>intereaction</a:t>
-            </a:r>
-            <a:r>
-              <a:rPr lang="en-CA" sz="2400" noProof="0" dirty="0" smtClean="0">
-                <a:latin typeface="Ubuntu Light" panose="020B0304030602030204" pitchFamily="34" charset="0"/>
-              </a:rPr>
-              <a:t> View-</a:t>
-            </a:r>
-            <a:r>
-              <a:rPr lang="en-CA" sz="2400" noProof="0" dirty="0" err="1" smtClean="0">
-                <a:latin typeface="Ubuntu Light" panose="020B0304030602030204" pitchFamily="34" charset="0"/>
-              </a:rPr>
-              <a:t>ViewModel</a:t>
-            </a:r>
-            <a:endParaRPr lang="en-CA" sz="2400" noProof="0" dirty="0" smtClean="0">
-              <a:latin typeface="Ubuntu Light" panose="020B0304030602030204" pitchFamily="34" charset="0"/>
-            </a:endParaRPr>
-          </a:p>
-          <a:p>
-            <a:endParaRPr lang="en-CA" sz="2400" noProof="0" dirty="0" smtClean="0">
-              <a:latin typeface="Ubuntu Light" panose="020B0304030602030204" pitchFamily="34" charset="0"/>
-            </a:endParaRPr>
-          </a:p>
-          <a:p>
-            <a:endParaRPr lang="en-GB" sz="2400" dirty="0" smtClean="0">
-              <a:latin typeface="Ubuntu Light" panose="020B0304030602030204" pitchFamily="34" charset="0"/>
-            </a:endParaRPr>
-          </a:p>
-          <a:p>
-            <a:endParaRPr lang="en-CA" sz="2400" baseline="0" noProof="0" dirty="0" smtClean="0">
+          <a:lstStyle/>
+          <a:p>
+            <a:r>
+              <a:rPr lang="en-US" sz="2400" i="1" dirty="0">
+                <a:solidFill>
+                  <a:srgbClr val="000000"/>
+                </a:solidFill>
+                <a:latin typeface="Ubuntu Light" panose="020B0304030602030204" pitchFamily="34" charset="0"/>
+              </a:rPr>
+              <a:t>Model-View-View Model </a:t>
+            </a:r>
+            <a:r>
+              <a:rPr lang="en-US" sz="2400" dirty="0" smtClean="0">
+                <a:solidFill>
+                  <a:srgbClr val="000000"/>
+                </a:solidFill>
+                <a:latin typeface="Ubuntu Light" panose="020B0304030602030204" pitchFamily="34" charset="0"/>
+              </a:rPr>
+              <a:t>is </a:t>
+            </a:r>
+            <a:r>
+              <a:rPr lang="en-US" sz="2400" dirty="0">
+                <a:solidFill>
+                  <a:srgbClr val="000000"/>
+                </a:solidFill>
+                <a:latin typeface="Ubuntu Light" panose="020B0304030602030204" pitchFamily="34" charset="0"/>
+              </a:rPr>
+              <a:t>a design pattern for building user interfaces. It describes how you can keep a potentially sophisticated UI simple by splitting it into three </a:t>
+            </a:r>
+            <a:r>
+              <a:rPr lang="en-US" sz="2400" dirty="0" smtClean="0">
+                <a:solidFill>
+                  <a:srgbClr val="000000"/>
+                </a:solidFill>
+                <a:latin typeface="Ubuntu Light" panose="020B0304030602030204" pitchFamily="34" charset="0"/>
+              </a:rPr>
+              <a:t>parts:</a:t>
+            </a:r>
+            <a:endParaRPr lang="fr-FR" sz="2400" dirty="0">
               <a:latin typeface="Ubuntu Light" panose="020B0304030602030204" pitchFamily="34" charset="0"/>
             </a:endParaRPr>
           </a:p>
@@ -5459,7 +6392,7 @@
     </p:spTree>
     <p:extLst>
       <p:ext uri="{BB962C8B-B14F-4D97-AF65-F5344CB8AC3E}">
-        <p14:creationId xmlns:p14="http://schemas.microsoft.com/office/powerpoint/2010/main" val="467821554"/>
+        <p14:creationId xmlns:p14="http://schemas.microsoft.com/office/powerpoint/2010/main" val="1587402421"/>
       </p:ext>
     </p:extLst>
   </p:cSld>
@@ -5512,7 +6445,7 @@
               <a:rPr lang="en-CA" dirty="0" smtClean="0">
                 <a:latin typeface="Ubuntu Condensed" panose="020B0506030602030204" pitchFamily="34" charset="0"/>
               </a:rPr>
-              <a:t>Main concepts</a:t>
+              <a:t>What is Knockout.js</a:t>
             </a:r>
             <a:endParaRPr lang="en-CA" dirty="0">
               <a:latin typeface="Ubuntu Condensed" panose="020B0506030602030204" pitchFamily="34" charset="0"/>
@@ -5530,8 +6463,8 @@
         </p:nvSpPr>
         <p:spPr>
           <a:xfrm>
-            <a:off x="838200" y="1463040"/>
-            <a:ext cx="10515600" cy="4699221"/>
+            <a:off x="838200" y="1652954"/>
+            <a:ext cx="10515600" cy="3892061"/>
           </a:xfrm>
           <a:prstGeom prst="rect">
             <a:avLst/>
@@ -5706,222 +6639,371 @@
             </a:lvl9pPr>
           </a:lstStyle>
           <a:p>
-            <a:pPr marL="0" indent="0">
-              <a:buNone/>
-            </a:pPr>
             <a:r>
               <a:rPr lang="en-GB" sz="2400" dirty="0" smtClean="0">
                 <a:latin typeface="Ubuntu Light" panose="020B0304030602030204" pitchFamily="34" charset="0"/>
               </a:rPr>
-              <a:t>View</a:t>
-            </a:r>
-            <a:r>
-              <a:rPr lang="en-GB" sz="2000" dirty="0" smtClean="0">
-                <a:latin typeface="Ubuntu Light" panose="020B0304030602030204" pitchFamily="34" charset="0"/>
-              </a:rPr>
-              <a:t>:</a:t>
-            </a:r>
-          </a:p>
-          <a:p>
-            <a:pPr marL="0" indent="0">
-              <a:buNone/>
-            </a:pPr>
-            <a:r>
-              <a:rPr lang="en-US" sz="2000" dirty="0" smtClean="0">
-                <a:latin typeface="Ubuntu Mono" panose="020B0509030602030204" pitchFamily="49" charset="0"/>
-              </a:rPr>
-              <a:t>&lt;</a:t>
-            </a:r>
-            <a:r>
-              <a:rPr lang="en-US" sz="2000" dirty="0">
-                <a:latin typeface="Ubuntu Mono" panose="020B0509030602030204" pitchFamily="49" charset="0"/>
-              </a:rPr>
-              <a:t>div id=”</a:t>
-            </a:r>
-            <a:r>
-              <a:rPr lang="en-US" sz="2000" dirty="0" err="1">
-                <a:latin typeface="Ubuntu Mono" panose="020B0509030602030204" pitchFamily="49" charset="0"/>
-              </a:rPr>
-              <a:t>customerDetails</a:t>
-            </a:r>
-            <a:r>
-              <a:rPr lang="en-US" sz="2000" dirty="0">
-                <a:latin typeface="Ubuntu Mono" panose="020B0509030602030204" pitchFamily="49" charset="0"/>
-              </a:rPr>
-              <a:t>” </a:t>
-            </a:r>
-            <a:endParaRPr lang="en-US" sz="2000" dirty="0" smtClean="0">
-              <a:latin typeface="Ubuntu Mono" panose="020B0509030602030204" pitchFamily="49" charset="0"/>
+              <a:t>Implements MVVM pattern</a:t>
+            </a:r>
+          </a:p>
+          <a:p>
+            <a:r>
+              <a:rPr lang="en-GB" sz="2400" dirty="0" smtClean="0">
+                <a:latin typeface="Ubuntu Light" panose="020B0304030602030204" pitchFamily="34" charset="0"/>
+              </a:rPr>
+              <a:t>Represents easy way to scale up in complexity without fear of introducing inconsistencies</a:t>
+            </a:r>
+          </a:p>
+          <a:p>
+            <a:r>
+              <a:rPr lang="en-CA" sz="2400" dirty="0" smtClean="0">
+                <a:latin typeface="Ubuntu Light" panose="020B0304030602030204" pitchFamily="34" charset="0"/>
+              </a:rPr>
+              <a:t>Uses transparent binding mechanism to offer interaction between DOM elements and </a:t>
+            </a:r>
+            <a:r>
+              <a:rPr lang="en-CA" sz="2400" dirty="0" err="1" smtClean="0">
+                <a:latin typeface="Ubuntu Light" panose="020B0304030602030204" pitchFamily="34" charset="0"/>
+              </a:rPr>
+              <a:t>ViewModels</a:t>
+            </a:r>
+            <a:endParaRPr lang="en-CA" sz="2400" dirty="0" smtClean="0">
+              <a:latin typeface="Ubuntu Light" panose="020B0304030602030204" pitchFamily="34" charset="0"/>
             </a:endParaRPr>
           </a:p>
           <a:p>
-            <a:pPr marL="0" indent="0">
-              <a:buNone/>
-            </a:pPr>
-            <a:r>
-              <a:rPr lang="en-US" sz="2000" dirty="0" smtClean="0">
-                <a:latin typeface="Ubuntu Mono" panose="020B0509030602030204" pitchFamily="49" charset="0"/>
-              </a:rPr>
-              <a:t>     data-bind</a:t>
-            </a:r>
-            <a:r>
-              <a:rPr lang="en-US" sz="2000" dirty="0">
-                <a:latin typeface="Ubuntu Mono" panose="020B0509030602030204" pitchFamily="49" charset="0"/>
-              </a:rPr>
-              <a:t>=”visible: </a:t>
-            </a:r>
-            <a:r>
-              <a:rPr lang="en-US" sz="2000" dirty="0" err="1">
-                <a:latin typeface="Ubuntu Mono" panose="020B0509030602030204" pitchFamily="49" charset="0"/>
-              </a:rPr>
-              <a:t>currentCustomer</a:t>
-            </a:r>
-            <a:r>
-              <a:rPr lang="en-US" sz="2000" dirty="0">
-                <a:latin typeface="Ubuntu Mono" panose="020B0509030602030204" pitchFamily="49" charset="0"/>
-              </a:rPr>
-              <a:t>() !== null</a:t>
-            </a:r>
-            <a:r>
-              <a:rPr lang="en-US" sz="2000" dirty="0" smtClean="0">
-                <a:latin typeface="Ubuntu Mono" panose="020B0509030602030204" pitchFamily="49" charset="0"/>
-              </a:rPr>
-              <a:t>”&gt;</a:t>
-            </a:r>
-          </a:p>
-          <a:p>
-            <a:pPr marL="0" indent="0">
-              <a:buNone/>
-            </a:pPr>
+            <a:r>
+              <a:rPr lang="en-CA" sz="2400" noProof="0" dirty="0" smtClean="0">
+                <a:latin typeface="Ubuntu Light" panose="020B0304030602030204" pitchFamily="34" charset="0"/>
+              </a:rPr>
+              <a:t>Uses HTML5 data attributes to realize </a:t>
+            </a:r>
+            <a:r>
+              <a:rPr lang="en-CA" sz="2400" noProof="0" dirty="0" err="1" smtClean="0">
+                <a:latin typeface="Ubuntu Light" panose="020B0304030602030204" pitchFamily="34" charset="0"/>
+              </a:rPr>
+              <a:t>intereaction</a:t>
+            </a:r>
+            <a:r>
+              <a:rPr lang="en-CA" sz="2400" noProof="0" dirty="0" smtClean="0">
+                <a:latin typeface="Ubuntu Light" panose="020B0304030602030204" pitchFamily="34" charset="0"/>
+              </a:rPr>
+              <a:t> View-</a:t>
+            </a:r>
+            <a:r>
+              <a:rPr lang="en-CA" sz="2400" noProof="0" dirty="0" err="1" smtClean="0">
+                <a:latin typeface="Ubuntu Light" panose="020B0304030602030204" pitchFamily="34" charset="0"/>
+              </a:rPr>
+              <a:t>ViewModel</a:t>
+            </a:r>
+            <a:endParaRPr lang="en-CA" sz="2400" noProof="0" dirty="0" smtClean="0">
+              <a:latin typeface="Ubuntu Light" panose="020B0304030602030204" pitchFamily="34" charset="0"/>
+            </a:endParaRPr>
+          </a:p>
+          <a:p>
+            <a:r>
+              <a:rPr lang="en-CA" sz="2400" dirty="0" smtClean="0">
+                <a:latin typeface="Ubuntu Light" panose="020B0304030602030204" pitchFamily="34" charset="0"/>
+              </a:rPr>
+              <a:t>Helps you to create rich, responsive user interface with a clean underlying data model</a:t>
+            </a:r>
+            <a:endParaRPr lang="en-CA" sz="2400" noProof="0" dirty="0" smtClean="0">
+              <a:latin typeface="Ubuntu Light" panose="020B0304030602030204" pitchFamily="34" charset="0"/>
+            </a:endParaRPr>
+          </a:p>
+          <a:p>
+            <a:endParaRPr lang="en-CA" sz="2400" noProof="0" dirty="0" smtClean="0">
+              <a:latin typeface="Ubuntu Light" panose="020B0304030602030204" pitchFamily="34" charset="0"/>
+            </a:endParaRPr>
+          </a:p>
+          <a:p>
             <a:endParaRPr lang="en-GB" sz="2400" dirty="0" smtClean="0">
               <a:latin typeface="Ubuntu Light" panose="020B0304030602030204" pitchFamily="34" charset="0"/>
             </a:endParaRPr>
           </a:p>
           <a:p>
-            <a:pPr marL="0" indent="0">
-              <a:buNone/>
-            </a:pPr>
-            <a:r>
-              <a:rPr lang="en-GB" sz="2400" dirty="0" err="1" smtClean="0">
-                <a:latin typeface="Ubuntu Light" panose="020B0304030602030204" pitchFamily="34" charset="0"/>
-              </a:rPr>
-              <a:t>ViewModel</a:t>
-            </a:r>
-            <a:r>
-              <a:rPr lang="en-GB" sz="2400" dirty="0" smtClean="0">
-                <a:latin typeface="Ubuntu Light" panose="020B0304030602030204" pitchFamily="34" charset="0"/>
-              </a:rPr>
-              <a:t>:</a:t>
-            </a:r>
-          </a:p>
-          <a:p>
-            <a:pPr marL="0" indent="0">
-              <a:buNone/>
-            </a:pPr>
-            <a:r>
-              <a:rPr lang="fr-FR" sz="2000" dirty="0">
-                <a:latin typeface="Ubuntu Mono" panose="020B0509030602030204" pitchFamily="49" charset="0"/>
-              </a:rPr>
-              <a:t>var </a:t>
-            </a:r>
-            <a:r>
-              <a:rPr lang="fr-FR" sz="2000" dirty="0" err="1">
-                <a:latin typeface="Ubuntu Mono" panose="020B0509030602030204" pitchFamily="49" charset="0"/>
-              </a:rPr>
-              <a:t>vewModel</a:t>
-            </a:r>
-            <a:r>
-              <a:rPr lang="fr-FR" sz="2000" dirty="0">
-                <a:latin typeface="Ubuntu Mono" panose="020B0509030602030204" pitchFamily="49" charset="0"/>
-              </a:rPr>
-              <a:t> = {</a:t>
-            </a:r>
-            <a:r>
-              <a:rPr lang="fr-FR" sz="2000" dirty="0" smtClean="0">
-                <a:latin typeface="Ubuntu Mono" panose="020B0509030602030204" pitchFamily="49" charset="0"/>
-              </a:rPr>
-              <a:t/>
-            </a:r>
-            <a:br>
-              <a:rPr lang="fr-FR" sz="2000" dirty="0" smtClean="0">
-                <a:latin typeface="Ubuntu Mono" panose="020B0509030602030204" pitchFamily="49" charset="0"/>
-              </a:rPr>
-            </a:br>
-            <a:r>
-              <a:rPr lang="fr-FR" sz="2000" dirty="0">
-                <a:latin typeface="Ubuntu Mono" panose="020B0509030602030204" pitchFamily="49" charset="0"/>
-              </a:rPr>
-              <a:t>  </a:t>
-            </a:r>
-            <a:r>
-              <a:rPr lang="fr-FR" sz="2000" dirty="0" err="1">
-                <a:latin typeface="Ubuntu Mono" panose="020B0509030602030204" pitchFamily="49" charset="0"/>
-              </a:rPr>
-              <a:t>currentCustomer</a:t>
-            </a:r>
-            <a:r>
-              <a:rPr lang="fr-FR" sz="2000" dirty="0">
-                <a:latin typeface="Ubuntu Mono" panose="020B0509030602030204" pitchFamily="49" charset="0"/>
-              </a:rPr>
-              <a:t>: </a:t>
-            </a:r>
-            <a:r>
-              <a:rPr lang="fr-FR" sz="2000" dirty="0" err="1">
-                <a:latin typeface="Ubuntu Mono" panose="020B0509030602030204" pitchFamily="49" charset="0"/>
-              </a:rPr>
-              <a:t>ko.observable</a:t>
-            </a:r>
-            <a:r>
-              <a:rPr lang="fr-FR" sz="2000" dirty="0">
-                <a:latin typeface="Ubuntu Mono" panose="020B0509030602030204" pitchFamily="49" charset="0"/>
-              </a:rPr>
-              <a:t>(</a:t>
-            </a:r>
-            <a:r>
-              <a:rPr lang="fr-FR" sz="2000" dirty="0" err="1">
-                <a:latin typeface="Ubuntu Mono" panose="020B0509030602030204" pitchFamily="49" charset="0"/>
-              </a:rPr>
-              <a:t>defaultCustomer</a:t>
-            </a:r>
-            <a:r>
-              <a:rPr lang="fr-FR" sz="2000" dirty="0" smtClean="0">
-                <a:latin typeface="Ubuntu Mono" panose="020B0509030602030204" pitchFamily="49" charset="0"/>
-              </a:rPr>
-              <a:t>)</a:t>
-            </a:r>
-            <a:br>
-              <a:rPr lang="fr-FR" sz="2000" dirty="0" smtClean="0">
-                <a:latin typeface="Ubuntu Mono" panose="020B0509030602030204" pitchFamily="49" charset="0"/>
-              </a:rPr>
-            </a:br>
-            <a:r>
-              <a:rPr lang="fr-FR" sz="2000" dirty="0">
-                <a:latin typeface="Ubuntu Mono" panose="020B0509030602030204" pitchFamily="49" charset="0"/>
-              </a:rPr>
-              <a:t>}</a:t>
-            </a:r>
-            <a:endParaRPr lang="en-GB" sz="2000" dirty="0" smtClean="0">
-              <a:latin typeface="Ubuntu Mono" panose="020B0509030602030204" pitchFamily="49" charset="0"/>
-            </a:endParaRPr>
-          </a:p>
-          <a:p>
-            <a:pPr marL="0" indent="0">
-              <a:buNone/>
-            </a:pPr>
             <a:endParaRPr lang="en-CA" sz="2400" baseline="0" noProof="0" dirty="0" smtClean="0">
               <a:latin typeface="Ubuntu Light" panose="020B0304030602030204" pitchFamily="34" charset="0"/>
             </a:endParaRPr>
           </a:p>
-          <a:p>
-            <a:pPr marL="0" indent="0">
-              <a:buNone/>
-            </a:pPr>
+        </p:txBody>
+      </p:sp>
+    </p:spTree>
+    <p:extLst>
+      <p:ext uri="{BB962C8B-B14F-4D97-AF65-F5344CB8AC3E}">
+        <p14:creationId xmlns:p14="http://schemas.microsoft.com/office/powerpoint/2010/main" val="467821554"/>
+      </p:ext>
+    </p:extLst>
+  </p:cSld>
+  <p:clrMapOvr>
+    <a:masterClrMapping/>
+  </p:clrMapOvr>
+</p:sld>
+</file>
+
+<file path=ppt/slides/slide8.xml><?xml version="1.0" encoding="utf-8"?>
+<p:sld xmlns:a="http://schemas.openxmlformats.org/drawingml/2006/main" xmlns:r="http://schemas.openxmlformats.org/officeDocument/2006/relationships" xmlns:p="http://schemas.openxmlformats.org/presentationml/2006/main">
+  <p:cSld>
+    <p:spTree>
+      <p:nvGrpSpPr>
+        <p:cNvPr id="1" name=""/>
+        <p:cNvGrpSpPr/>
+        <p:nvPr/>
+      </p:nvGrpSpPr>
+      <p:grpSpPr>
+        <a:xfrm>
+          <a:off x="0" y="0"/>
+          <a:ext cx="0" cy="0"/>
+          <a:chOff x="0" y="0"/>
+          <a:chExt cx="0" cy="0"/>
+        </a:xfrm>
+      </p:grpSpPr>
+      <p:sp>
+        <p:nvSpPr>
+          <p:cNvPr id="2" name="Title 1"/>
+          <p:cNvSpPr>
+            <a:spLocks noGrp="1"/>
+          </p:cNvSpPr>
+          <p:nvPr>
+            <p:ph type="title"/>
+          </p:nvPr>
+        </p:nvSpPr>
+        <p:spPr>
+          <a:xfrm>
+            <a:off x="838200" y="365125"/>
+            <a:ext cx="10515600" cy="682137"/>
+          </a:xfrm>
+        </p:spPr>
+        <p:txBody>
+          <a:bodyPr>
+            <a:normAutofit fontScale="90000"/>
+          </a:bodyPr>
+          <a:lstStyle/>
+          <a:p>
+            <a:r>
+              <a:rPr lang="en-CA" dirty="0" smtClean="0">
+                <a:latin typeface="Ubuntu Condensed" panose="020B0506030602030204" pitchFamily="34" charset="0"/>
+              </a:rPr>
+              <a:t>What Knockout.js isn’t</a:t>
+            </a:r>
+            <a:endParaRPr lang="en-CA" dirty="0">
+              <a:latin typeface="Ubuntu Condensed" panose="020B0506030602030204" pitchFamily="34" charset="0"/>
+            </a:endParaRPr>
+          </a:p>
+        </p:txBody>
+      </p:sp>
+      <p:sp>
+        <p:nvSpPr>
+          <p:cNvPr id="5" name="Content Placeholder 2"/>
+          <p:cNvSpPr txBox="1">
+            <a:spLocks/>
+          </p:cNvSpPr>
+          <p:nvPr/>
+        </p:nvSpPr>
+        <p:spPr>
+          <a:xfrm>
+            <a:off x="838200" y="2954216"/>
+            <a:ext cx="10515600" cy="1055077"/>
+          </a:xfrm>
+          <a:prstGeom prst="rect">
+            <a:avLst/>
+          </a:prstGeom>
+        </p:spPr>
+        <p:txBody>
+          <a:bodyPr vert="horz" lIns="91440" tIns="45720" rIns="91440" bIns="45720" rtlCol="0">
+            <a:normAutofit/>
+          </a:bodyPr>
+          <a:lstStyle>
+            <a:lvl1pPr marL="228600" indent="-228600" algn="l" defTabSz="914400" rtl="0" eaLnBrk="1" latinLnBrk="0" hangingPunct="1">
+              <a:lnSpc>
+                <a:spcPct val="90000"/>
+              </a:lnSpc>
+              <a:spcBef>
+                <a:spcPts val="1000"/>
+              </a:spcBef>
+              <a:buFont typeface="Arial" panose="020B0604020202020204" pitchFamily="34" charset="0"/>
+              <a:buChar char="•"/>
+              <a:defRPr sz="2800" kern="1200">
+                <a:solidFill>
+                  <a:schemeClr val="tx1"/>
+                </a:solidFill>
+                <a:latin typeface="+mn-lt"/>
+                <a:ea typeface="+mn-ea"/>
+                <a:cs typeface="+mn-cs"/>
+              </a:defRPr>
+            </a:lvl1pPr>
+            <a:lvl2pPr marL="685800" indent="-228600" algn="l" defTabSz="914400" rtl="0" eaLnBrk="1" latinLnBrk="0" hangingPunct="1">
+              <a:lnSpc>
+                <a:spcPct val="90000"/>
+              </a:lnSpc>
+              <a:spcBef>
+                <a:spcPts val="500"/>
+              </a:spcBef>
+              <a:buFont typeface="Arial" panose="020B0604020202020204" pitchFamily="34" charset="0"/>
+              <a:buChar char="•"/>
+              <a:defRPr sz="2400" kern="1200">
+                <a:solidFill>
+                  <a:schemeClr val="tx1"/>
+                </a:solidFill>
+                <a:latin typeface="+mn-lt"/>
+                <a:ea typeface="+mn-ea"/>
+                <a:cs typeface="+mn-cs"/>
+              </a:defRPr>
+            </a:lvl2pPr>
+            <a:lvl3pPr marL="1143000" indent="-228600" algn="l" defTabSz="914400" rtl="0" eaLnBrk="1" latinLnBrk="0" hangingPunct="1">
+              <a:lnSpc>
+                <a:spcPct val="90000"/>
+              </a:lnSpc>
+              <a:spcBef>
+                <a:spcPts val="500"/>
+              </a:spcBef>
+              <a:buFont typeface="Arial" panose="020B0604020202020204" pitchFamily="34" charset="0"/>
+              <a:buChar char="•"/>
+              <a:defRPr sz="2000" kern="1200">
+                <a:solidFill>
+                  <a:schemeClr val="tx1"/>
+                </a:solidFill>
+                <a:latin typeface="+mn-lt"/>
+                <a:ea typeface="+mn-ea"/>
+                <a:cs typeface="+mn-cs"/>
+              </a:defRPr>
+            </a:lvl3pPr>
+            <a:lvl4pPr marL="1600200" indent="-228600" algn="l" defTabSz="914400" rtl="0" eaLnBrk="1" latinLnBrk="0" hangingPunct="1">
+              <a:lnSpc>
+                <a:spcPct val="90000"/>
+              </a:lnSpc>
+              <a:spcBef>
+                <a:spcPts val="500"/>
+              </a:spcBef>
+              <a:buFont typeface="Arial" panose="020B0604020202020204" pitchFamily="34" charset="0"/>
+              <a:buChar char="•"/>
+              <a:defRPr sz="1800" kern="1200">
+                <a:solidFill>
+                  <a:schemeClr val="tx1"/>
+                </a:solidFill>
+                <a:latin typeface="+mn-lt"/>
+                <a:ea typeface="+mn-ea"/>
+                <a:cs typeface="+mn-cs"/>
+              </a:defRPr>
+            </a:lvl4pPr>
+            <a:lvl5pPr marL="2057400" indent="-228600" algn="l" defTabSz="914400" rtl="0" eaLnBrk="1" latinLnBrk="0" hangingPunct="1">
+              <a:lnSpc>
+                <a:spcPct val="90000"/>
+              </a:lnSpc>
+              <a:spcBef>
+                <a:spcPts val="500"/>
+              </a:spcBef>
+              <a:buFont typeface="Arial" panose="020B0604020202020204" pitchFamily="34" charset="0"/>
+              <a:buChar char="•"/>
+              <a:defRPr sz="1800" kern="1200">
+                <a:solidFill>
+                  <a:schemeClr val="tx1"/>
+                </a:solidFill>
+                <a:latin typeface="+mn-lt"/>
+                <a:ea typeface="+mn-ea"/>
+                <a:cs typeface="+mn-cs"/>
+              </a:defRPr>
+            </a:lvl5pPr>
+            <a:lvl6pPr marL="2514600" indent="-228600" algn="l" defTabSz="914400" rtl="0" eaLnBrk="1" latinLnBrk="0" hangingPunct="1">
+              <a:lnSpc>
+                <a:spcPct val="90000"/>
+              </a:lnSpc>
+              <a:spcBef>
+                <a:spcPts val="500"/>
+              </a:spcBef>
+              <a:buFont typeface="Arial" panose="020B0604020202020204" pitchFamily="34" charset="0"/>
+              <a:buChar char="•"/>
+              <a:defRPr sz="1800" kern="1200">
+                <a:solidFill>
+                  <a:schemeClr val="tx1"/>
+                </a:solidFill>
+                <a:latin typeface="+mn-lt"/>
+                <a:ea typeface="+mn-ea"/>
+                <a:cs typeface="+mn-cs"/>
+              </a:defRPr>
+            </a:lvl6pPr>
+            <a:lvl7pPr marL="2971800" indent="-228600" algn="l" defTabSz="914400" rtl="0" eaLnBrk="1" latinLnBrk="0" hangingPunct="1">
+              <a:lnSpc>
+                <a:spcPct val="90000"/>
+              </a:lnSpc>
+              <a:spcBef>
+                <a:spcPts val="500"/>
+              </a:spcBef>
+              <a:buFont typeface="Arial" panose="020B0604020202020204" pitchFamily="34" charset="0"/>
+              <a:buChar char="•"/>
+              <a:defRPr sz="1800" kern="1200">
+                <a:solidFill>
+                  <a:schemeClr val="tx1"/>
+                </a:solidFill>
+                <a:latin typeface="+mn-lt"/>
+                <a:ea typeface="+mn-ea"/>
+                <a:cs typeface="+mn-cs"/>
+              </a:defRPr>
+            </a:lvl7pPr>
+            <a:lvl8pPr marL="3429000" indent="-228600" algn="l" defTabSz="914400" rtl="0" eaLnBrk="1" latinLnBrk="0" hangingPunct="1">
+              <a:lnSpc>
+                <a:spcPct val="90000"/>
+              </a:lnSpc>
+              <a:spcBef>
+                <a:spcPts val="500"/>
+              </a:spcBef>
+              <a:buFont typeface="Arial" panose="020B0604020202020204" pitchFamily="34" charset="0"/>
+              <a:buChar char="•"/>
+              <a:defRPr sz="1800" kern="1200">
+                <a:solidFill>
+                  <a:schemeClr val="tx1"/>
+                </a:solidFill>
+                <a:latin typeface="+mn-lt"/>
+                <a:ea typeface="+mn-ea"/>
+                <a:cs typeface="+mn-cs"/>
+              </a:defRPr>
+            </a:lvl8pPr>
+            <a:lvl9pPr marL="3886200" indent="-228600" algn="l" defTabSz="914400" rtl="0" eaLnBrk="1" latinLnBrk="0" hangingPunct="1">
+              <a:lnSpc>
+                <a:spcPct val="90000"/>
+              </a:lnSpc>
+              <a:spcBef>
+                <a:spcPts val="500"/>
+              </a:spcBef>
+              <a:buFont typeface="Arial" panose="020B0604020202020204" pitchFamily="34" charset="0"/>
+              <a:buChar char="•"/>
+              <a:defRPr sz="1800" kern="1200">
+                <a:solidFill>
+                  <a:schemeClr val="tx1"/>
+                </a:solidFill>
+                <a:latin typeface="+mn-lt"/>
+                <a:ea typeface="+mn-ea"/>
+                <a:cs typeface="+mn-cs"/>
+              </a:defRPr>
+            </a:lvl9pPr>
+          </a:lstStyle>
+          <a:p>
+            <a:r>
+              <a:rPr lang="en-GB" sz="2400" dirty="0" smtClean="0">
+                <a:latin typeface="Ubuntu Light" panose="020B0304030602030204" pitchFamily="34" charset="0"/>
+              </a:rPr>
+              <a:t>It’s not a DOM manipulation library that aims to replace jQuery</a:t>
+            </a:r>
+          </a:p>
+          <a:p>
             <a:r>
               <a:rPr lang="en-CA" sz="2400" dirty="0" smtClean="0">
                 <a:latin typeface="Ubuntu Light" panose="020B0304030602030204" pitchFamily="34" charset="0"/>
               </a:rPr>
-              <a:t>Customer details will become visible only if current customer value will be assign to the view model field</a:t>
-            </a:r>
+              <a:t>It’s not a JQuery extension or dependency</a:t>
+            </a:r>
+          </a:p>
+          <a:p>
+            <a:endParaRPr lang="en-CA" sz="2400" noProof="0" dirty="0" smtClean="0">
+              <a:latin typeface="Ubuntu Light" panose="020B0304030602030204" pitchFamily="34" charset="0"/>
+            </a:endParaRPr>
+          </a:p>
+          <a:p>
+            <a:endParaRPr lang="en-GB" sz="2400" dirty="0" smtClean="0">
+              <a:latin typeface="Ubuntu Light" panose="020B0304030602030204" pitchFamily="34" charset="0"/>
+            </a:endParaRPr>
+          </a:p>
+          <a:p>
             <a:endParaRPr lang="en-CA" sz="2400" baseline="0" noProof="0" dirty="0" smtClean="0">
               <a:latin typeface="Ubuntu Light" panose="020B0304030602030204" pitchFamily="34" charset="0"/>
             </a:endParaRPr>
@@ -5931,7 +7013,412 @@
     </p:spTree>
     <p:extLst>
       <p:ext uri="{BB962C8B-B14F-4D97-AF65-F5344CB8AC3E}">
-        <p14:creationId xmlns:p14="http://schemas.microsoft.com/office/powerpoint/2010/main" val="4220660730"/>
+        <p14:creationId xmlns:p14="http://schemas.microsoft.com/office/powerpoint/2010/main" val="4172342774"/>
+      </p:ext>
+    </p:extLst>
+  </p:cSld>
+  <p:clrMapOvr>
+    <a:masterClrMapping/>
+  </p:clrMapOvr>
+</p:sld>
+</file>
+
+<file path=ppt/slides/slide9.xml><?xml version="1.0" encoding="utf-8"?>
+<p:sld xmlns:a="http://schemas.openxmlformats.org/drawingml/2006/main" xmlns:r="http://schemas.openxmlformats.org/officeDocument/2006/relationships" xmlns:p="http://schemas.openxmlformats.org/presentationml/2006/main">
+  <p:cSld>
+    <p:spTree>
+      <p:nvGrpSpPr>
+        <p:cNvPr id="1" name=""/>
+        <p:cNvGrpSpPr/>
+        <p:nvPr/>
+      </p:nvGrpSpPr>
+      <p:grpSpPr>
+        <a:xfrm>
+          <a:off x="0" y="0"/>
+          <a:ext cx="0" cy="0"/>
+          <a:chOff x="0" y="0"/>
+          <a:chExt cx="0" cy="0"/>
+        </a:xfrm>
+      </p:grpSpPr>
+      <p:sp>
+        <p:nvSpPr>
+          <p:cNvPr id="2" name="Title 1"/>
+          <p:cNvSpPr>
+            <a:spLocks noGrp="1"/>
+          </p:cNvSpPr>
+          <p:nvPr>
+            <p:ph type="title"/>
+          </p:nvPr>
+        </p:nvSpPr>
+        <p:spPr>
+          <a:xfrm>
+            <a:off x="838200" y="365125"/>
+            <a:ext cx="10515600" cy="682137"/>
+          </a:xfrm>
+        </p:spPr>
+        <p:txBody>
+          <a:bodyPr>
+            <a:normAutofit fontScale="90000"/>
+          </a:bodyPr>
+          <a:lstStyle/>
+          <a:p>
+            <a:r>
+              <a:rPr lang="en-CA" dirty="0" smtClean="0">
+                <a:latin typeface="Ubuntu Condensed" panose="020B0506030602030204" pitchFamily="34" charset="0"/>
+              </a:rPr>
+              <a:t>KO’s features</a:t>
+            </a:r>
+            <a:endParaRPr lang="en-CA" dirty="0">
+              <a:latin typeface="Ubuntu Condensed" panose="020B0506030602030204" pitchFamily="34" charset="0"/>
+            </a:endParaRPr>
+          </a:p>
+        </p:txBody>
+      </p:sp>
+      <p:sp>
+        <p:nvSpPr>
+          <p:cNvPr id="5" name="Content Placeholder 2"/>
+          <p:cNvSpPr txBox="1">
+            <a:spLocks/>
+          </p:cNvSpPr>
+          <p:nvPr/>
+        </p:nvSpPr>
+        <p:spPr>
+          <a:xfrm>
+            <a:off x="838200" y="1554125"/>
+            <a:ext cx="10515600" cy="4348964"/>
+          </a:xfrm>
+          <a:prstGeom prst="rect">
+            <a:avLst/>
+          </a:prstGeom>
+        </p:spPr>
+        <p:txBody>
+          <a:bodyPr vert="horz" lIns="91440" tIns="45720" rIns="91440" bIns="45720" rtlCol="0">
+            <a:normAutofit/>
+          </a:bodyPr>
+          <a:lstStyle>
+            <a:lvl1pPr marL="228600" indent="-228600" algn="l" defTabSz="914400" rtl="0" eaLnBrk="1" latinLnBrk="0" hangingPunct="1">
+              <a:lnSpc>
+                <a:spcPct val="90000"/>
+              </a:lnSpc>
+              <a:spcBef>
+                <a:spcPts val="1000"/>
+              </a:spcBef>
+              <a:buFont typeface="Arial" panose="020B0604020202020204" pitchFamily="34" charset="0"/>
+              <a:buChar char="•"/>
+              <a:defRPr sz="2800" kern="1200">
+                <a:solidFill>
+                  <a:schemeClr val="tx1"/>
+                </a:solidFill>
+                <a:latin typeface="+mn-lt"/>
+                <a:ea typeface="+mn-ea"/>
+                <a:cs typeface="+mn-cs"/>
+              </a:defRPr>
+            </a:lvl1pPr>
+            <a:lvl2pPr marL="685800" indent="-228600" algn="l" defTabSz="914400" rtl="0" eaLnBrk="1" latinLnBrk="0" hangingPunct="1">
+              <a:lnSpc>
+                <a:spcPct val="90000"/>
+              </a:lnSpc>
+              <a:spcBef>
+                <a:spcPts val="500"/>
+              </a:spcBef>
+              <a:buFont typeface="Arial" panose="020B0604020202020204" pitchFamily="34" charset="0"/>
+              <a:buChar char="•"/>
+              <a:defRPr sz="2400" kern="1200">
+                <a:solidFill>
+                  <a:schemeClr val="tx1"/>
+                </a:solidFill>
+                <a:latin typeface="+mn-lt"/>
+                <a:ea typeface="+mn-ea"/>
+                <a:cs typeface="+mn-cs"/>
+              </a:defRPr>
+            </a:lvl2pPr>
+            <a:lvl3pPr marL="1143000" indent="-228600" algn="l" defTabSz="914400" rtl="0" eaLnBrk="1" latinLnBrk="0" hangingPunct="1">
+              <a:lnSpc>
+                <a:spcPct val="90000"/>
+              </a:lnSpc>
+              <a:spcBef>
+                <a:spcPts val="500"/>
+              </a:spcBef>
+              <a:buFont typeface="Arial" panose="020B0604020202020204" pitchFamily="34" charset="0"/>
+              <a:buChar char="•"/>
+              <a:defRPr sz="2000" kern="1200">
+                <a:solidFill>
+                  <a:schemeClr val="tx1"/>
+                </a:solidFill>
+                <a:latin typeface="+mn-lt"/>
+                <a:ea typeface="+mn-ea"/>
+                <a:cs typeface="+mn-cs"/>
+              </a:defRPr>
+            </a:lvl3pPr>
+            <a:lvl4pPr marL="1600200" indent="-228600" algn="l" defTabSz="914400" rtl="0" eaLnBrk="1" latinLnBrk="0" hangingPunct="1">
+              <a:lnSpc>
+                <a:spcPct val="90000"/>
+              </a:lnSpc>
+              <a:spcBef>
+                <a:spcPts val="500"/>
+              </a:spcBef>
+              <a:buFont typeface="Arial" panose="020B0604020202020204" pitchFamily="34" charset="0"/>
+              <a:buChar char="•"/>
+              <a:defRPr sz="1800" kern="1200">
+                <a:solidFill>
+                  <a:schemeClr val="tx1"/>
+                </a:solidFill>
+                <a:latin typeface="+mn-lt"/>
+                <a:ea typeface="+mn-ea"/>
+                <a:cs typeface="+mn-cs"/>
+              </a:defRPr>
+            </a:lvl4pPr>
+            <a:lvl5pPr marL="2057400" indent="-228600" algn="l" defTabSz="914400" rtl="0" eaLnBrk="1" latinLnBrk="0" hangingPunct="1">
+              <a:lnSpc>
+                <a:spcPct val="90000"/>
+              </a:lnSpc>
+              <a:spcBef>
+                <a:spcPts val="500"/>
+              </a:spcBef>
+              <a:buFont typeface="Arial" panose="020B0604020202020204" pitchFamily="34" charset="0"/>
+              <a:buChar char="•"/>
+              <a:defRPr sz="1800" kern="1200">
+                <a:solidFill>
+                  <a:schemeClr val="tx1"/>
+                </a:solidFill>
+                <a:latin typeface="+mn-lt"/>
+                <a:ea typeface="+mn-ea"/>
+                <a:cs typeface="+mn-cs"/>
+              </a:defRPr>
+            </a:lvl5pPr>
+            <a:lvl6pPr marL="2514600" indent="-228600" algn="l" defTabSz="914400" rtl="0" eaLnBrk="1" latinLnBrk="0" hangingPunct="1">
+              <a:lnSpc>
+                <a:spcPct val="90000"/>
+              </a:lnSpc>
+              <a:spcBef>
+                <a:spcPts val="500"/>
+              </a:spcBef>
+              <a:buFont typeface="Arial" panose="020B0604020202020204" pitchFamily="34" charset="0"/>
+              <a:buChar char="•"/>
+              <a:defRPr sz="1800" kern="1200">
+                <a:solidFill>
+                  <a:schemeClr val="tx1"/>
+                </a:solidFill>
+                <a:latin typeface="+mn-lt"/>
+                <a:ea typeface="+mn-ea"/>
+                <a:cs typeface="+mn-cs"/>
+              </a:defRPr>
+            </a:lvl6pPr>
+            <a:lvl7pPr marL="2971800" indent="-228600" algn="l" defTabSz="914400" rtl="0" eaLnBrk="1" latinLnBrk="0" hangingPunct="1">
+              <a:lnSpc>
+                <a:spcPct val="90000"/>
+              </a:lnSpc>
+              <a:spcBef>
+                <a:spcPts val="500"/>
+              </a:spcBef>
+              <a:buFont typeface="Arial" panose="020B0604020202020204" pitchFamily="34" charset="0"/>
+              <a:buChar char="•"/>
+              <a:defRPr sz="1800" kern="1200">
+                <a:solidFill>
+                  <a:schemeClr val="tx1"/>
+                </a:solidFill>
+                <a:latin typeface="+mn-lt"/>
+                <a:ea typeface="+mn-ea"/>
+                <a:cs typeface="+mn-cs"/>
+              </a:defRPr>
+            </a:lvl7pPr>
+            <a:lvl8pPr marL="3429000" indent="-228600" algn="l" defTabSz="914400" rtl="0" eaLnBrk="1" latinLnBrk="0" hangingPunct="1">
+              <a:lnSpc>
+                <a:spcPct val="90000"/>
+              </a:lnSpc>
+              <a:spcBef>
+                <a:spcPts val="500"/>
+              </a:spcBef>
+              <a:buFont typeface="Arial" panose="020B0604020202020204" pitchFamily="34" charset="0"/>
+              <a:buChar char="•"/>
+              <a:defRPr sz="1800" kern="1200">
+                <a:solidFill>
+                  <a:schemeClr val="tx1"/>
+                </a:solidFill>
+                <a:latin typeface="+mn-lt"/>
+                <a:ea typeface="+mn-ea"/>
+                <a:cs typeface="+mn-cs"/>
+              </a:defRPr>
+            </a:lvl8pPr>
+            <a:lvl9pPr marL="3886200" indent="-228600" algn="l" defTabSz="914400" rtl="0" eaLnBrk="1" latinLnBrk="0" hangingPunct="1">
+              <a:lnSpc>
+                <a:spcPct val="90000"/>
+              </a:lnSpc>
+              <a:spcBef>
+                <a:spcPts val="500"/>
+              </a:spcBef>
+              <a:buFont typeface="Arial" panose="020B0604020202020204" pitchFamily="34" charset="0"/>
+              <a:buChar char="•"/>
+              <a:defRPr sz="1800" kern="1200">
+                <a:solidFill>
+                  <a:schemeClr val="tx1"/>
+                </a:solidFill>
+                <a:latin typeface="+mn-lt"/>
+                <a:ea typeface="+mn-ea"/>
+                <a:cs typeface="+mn-cs"/>
+              </a:defRPr>
+            </a:lvl9pPr>
+          </a:lstStyle>
+          <a:p>
+            <a:r>
+              <a:rPr lang="en-GB" sz="2400" dirty="0" smtClean="0">
+                <a:latin typeface="Ubuntu Light" panose="020B0304030602030204" pitchFamily="34" charset="0"/>
+              </a:rPr>
+              <a:t>Elegant dependency tracking</a:t>
+            </a:r>
+          </a:p>
+          <a:p>
+            <a:r>
+              <a:rPr lang="en-CA" sz="2400" dirty="0" smtClean="0">
+                <a:latin typeface="Ubuntu Light" panose="020B0304030602030204" pitchFamily="34" charset="0"/>
+              </a:rPr>
+              <a:t>Declarative bindings</a:t>
+            </a:r>
+          </a:p>
+          <a:p>
+            <a:r>
+              <a:rPr lang="en-CA" sz="2400" dirty="0" smtClean="0">
+                <a:latin typeface="Ubuntu Light" panose="020B0304030602030204" pitchFamily="34" charset="0"/>
+              </a:rPr>
+              <a:t>Trivially extensible</a:t>
+            </a:r>
+          </a:p>
+          <a:p>
+            <a:r>
+              <a:rPr lang="en-CA" sz="2400" dirty="0" smtClean="0">
+                <a:latin typeface="Ubuntu Light" panose="020B0304030602030204" pitchFamily="34" charset="0"/>
+              </a:rPr>
+              <a:t>Pure </a:t>
+            </a:r>
+            <a:r>
+              <a:rPr lang="en-CA" sz="2400" dirty="0" err="1" smtClean="0">
+                <a:latin typeface="Ubuntu Light" panose="020B0304030602030204" pitchFamily="34" charset="0"/>
+              </a:rPr>
+              <a:t>javascript</a:t>
+            </a:r>
+            <a:r>
+              <a:rPr lang="en-CA" sz="2400" dirty="0" smtClean="0">
+                <a:latin typeface="Ubuntu Light" panose="020B0304030602030204" pitchFamily="34" charset="0"/>
+              </a:rPr>
+              <a:t> library</a:t>
+            </a:r>
+          </a:p>
+          <a:p>
+            <a:r>
+              <a:rPr lang="en-CA" sz="2400" dirty="0" smtClean="0">
+                <a:latin typeface="Ubuntu Light" panose="020B0304030602030204" pitchFamily="34" charset="0"/>
+              </a:rPr>
+              <a:t>Can be added on top of the existing web application</a:t>
+            </a:r>
+          </a:p>
+          <a:p>
+            <a:r>
+              <a:rPr lang="en-CA" sz="2400" dirty="0" smtClean="0">
+                <a:latin typeface="Ubuntu Light" panose="020B0304030602030204" pitchFamily="34" charset="0"/>
+              </a:rPr>
+              <a:t>Compact (~13 kb after </a:t>
+            </a:r>
+            <a:r>
+              <a:rPr lang="en-CA" sz="2400" dirty="0" err="1" smtClean="0">
+                <a:latin typeface="Ubuntu Light" panose="020B0304030602030204" pitchFamily="34" charset="0"/>
+              </a:rPr>
+              <a:t>gzipping</a:t>
+            </a:r>
+            <a:r>
+              <a:rPr lang="en-CA" sz="2400" dirty="0" smtClean="0">
+                <a:latin typeface="Ubuntu Light" panose="020B0304030602030204" pitchFamily="34" charset="0"/>
+              </a:rPr>
+              <a:t>)</a:t>
+            </a:r>
+          </a:p>
+          <a:p>
+            <a:r>
+              <a:rPr lang="en-CA" sz="2400" dirty="0" smtClean="0">
+                <a:latin typeface="Ubuntu Light" panose="020B0304030602030204" pitchFamily="34" charset="0"/>
+              </a:rPr>
+              <a:t>Works on any mainstream browser (</a:t>
+            </a:r>
+            <a:r>
+              <a:rPr lang="en-CA" sz="2400" dirty="0" err="1" smtClean="0">
+                <a:latin typeface="Ubuntu Light" panose="020B0304030602030204" pitchFamily="34" charset="0"/>
+              </a:rPr>
+              <a:t>firefox</a:t>
+            </a:r>
+            <a:r>
+              <a:rPr lang="en-CA" sz="2400" dirty="0" smtClean="0">
+                <a:latin typeface="Ubuntu Light" panose="020B0304030602030204" pitchFamily="34" charset="0"/>
+              </a:rPr>
+              <a:t>, </a:t>
+            </a:r>
+            <a:r>
+              <a:rPr lang="en-CA" sz="2400" dirty="0" err="1" smtClean="0">
+                <a:latin typeface="Ubuntu Light" panose="020B0304030602030204" pitchFamily="34" charset="0"/>
+              </a:rPr>
+              <a:t>webkit</a:t>
+            </a:r>
+            <a:r>
+              <a:rPr lang="en-CA" sz="2400" dirty="0" smtClean="0">
+                <a:latin typeface="Ubuntu Light" panose="020B0304030602030204" pitchFamily="34" charset="0"/>
+              </a:rPr>
+              <a:t>-based, </a:t>
+            </a:r>
+            <a:r>
+              <a:rPr lang="en-CA" sz="2400" dirty="0" err="1" smtClean="0">
+                <a:latin typeface="Ubuntu Light" panose="020B0304030602030204" pitchFamily="34" charset="0"/>
+              </a:rPr>
+              <a:t>etc</a:t>
+            </a:r>
+            <a:r>
+              <a:rPr lang="en-CA" sz="2400" dirty="0" smtClean="0">
+                <a:latin typeface="Ubuntu Light" panose="020B0304030602030204" pitchFamily="34" charset="0"/>
+              </a:rPr>
+              <a:t>)</a:t>
+            </a:r>
+          </a:p>
+          <a:p>
+            <a:r>
+              <a:rPr lang="en-CA" sz="2400" dirty="0" smtClean="0">
+                <a:latin typeface="Ubuntu Light" panose="020B0304030602030204" pitchFamily="34" charset="0"/>
+              </a:rPr>
+              <a:t>Even works with pseudo browsers (</a:t>
+            </a:r>
+            <a:r>
+              <a:rPr lang="en-CA" sz="2400" dirty="0" err="1" smtClean="0">
+                <a:latin typeface="Ubuntu Light" panose="020B0304030602030204" pitchFamily="34" charset="0"/>
+              </a:rPr>
+              <a:t>msie</a:t>
+            </a:r>
+            <a:r>
+              <a:rPr lang="en-CA" sz="2400" dirty="0" smtClean="0">
+                <a:latin typeface="Ubuntu Light" panose="020B0304030602030204" pitchFamily="34" charset="0"/>
+              </a:rPr>
+              <a:t> 6+)</a:t>
+            </a:r>
+          </a:p>
+          <a:p>
+            <a:r>
+              <a:rPr lang="en-CA" sz="2400" noProof="0" dirty="0" smtClean="0">
+                <a:latin typeface="Ubuntu Light" panose="020B0304030602030204" pitchFamily="34" charset="0"/>
+              </a:rPr>
+              <a:t>Comprehensive suite of specifications</a:t>
+            </a:r>
+          </a:p>
+          <a:p>
+            <a:endParaRPr lang="en-GB" sz="2400" dirty="0" smtClean="0">
+              <a:latin typeface="Ubuntu Light" panose="020B0304030602030204" pitchFamily="34" charset="0"/>
+            </a:endParaRPr>
+          </a:p>
+          <a:p>
+            <a:endParaRPr lang="en-CA" sz="2400" baseline="0" noProof="0" dirty="0" smtClean="0">
+              <a:latin typeface="Ubuntu Light" panose="020B0304030602030204" pitchFamily="34" charset="0"/>
+            </a:endParaRPr>
+          </a:p>
+        </p:txBody>
+      </p:sp>
+    </p:spTree>
+    <p:extLst>
+      <p:ext uri="{BB962C8B-B14F-4D97-AF65-F5344CB8AC3E}">
+        <p14:creationId xmlns:p14="http://schemas.microsoft.com/office/powerpoint/2010/main" val="2657705291"/>
       </p:ext>
     </p:extLst>
   </p:cSld>

</xml_diff>

<commit_message>
[Knockout.js] Finalize the presentation
</commit_message>
<xml_diff>
--- a/knockout.js/knockout.js.pptx
+++ b/knockout.js/knockout.js.pptx
@@ -5,7 +5,7 @@
     <p:sldMasterId id="2147483648" r:id="rId1"/>
   </p:sldMasterIdLst>
   <p:notesMasterIdLst>
-    <p:notesMasterId r:id="rId13"/>
+    <p:notesMasterId r:id="rId16"/>
   </p:notesMasterIdLst>
   <p:sldIdLst>
     <p:sldId id="256" r:id="rId2"/>
@@ -19,6 +19,9 @@
     <p:sldId id="265" r:id="rId10"/>
     <p:sldId id="262" r:id="rId11"/>
     <p:sldId id="266" r:id="rId12"/>
+    <p:sldId id="267" r:id="rId13"/>
+    <p:sldId id="269" r:id="rId14"/>
+    <p:sldId id="268" r:id="rId15"/>
   </p:sldIdLst>
   <p:sldSz cx="12192000" cy="6858000"/>
   <p:notesSz cx="6858000" cy="9144000"/>
@@ -133,6 +136,9 @@
             <p14:sldId id="265"/>
             <p14:sldId id="262"/>
             <p14:sldId id="266"/>
+            <p14:sldId id="267"/>
+            <p14:sldId id="269"/>
+            <p14:sldId id="268"/>
           </p14:sldIdLst>
         </p14:section>
       </p14:sectionLst>
@@ -226,7 +232,7 @@
           <a:p>
             <a:fld id="{C5154B15-60D3-4535-B029-4D100D89B8DD}" type="datetimeFigureOut">
               <a:rPr lang="fr-FR" smtClean="0"/>
-              <a:t>17/10/2013</a:t>
+              <a:t>21/10/2013</a:t>
             </a:fld>
             <a:endParaRPr lang="fr-FR"/>
           </a:p>
@@ -604,6 +610,94 @@
 </p:notes>
 </file>
 
+<file path=ppt/notesSlides/notesSlide10.xml><?xml version="1.0" encoding="utf-8"?>
+<p:notes xmlns:a="http://schemas.openxmlformats.org/drawingml/2006/main" xmlns:r="http://schemas.openxmlformats.org/officeDocument/2006/relationships" xmlns:p="http://schemas.openxmlformats.org/presentationml/2006/main">
+  <p:cSld>
+    <p:spTree>
+      <p:nvGrpSpPr>
+        <p:cNvPr id="1" name=""/>
+        <p:cNvGrpSpPr/>
+        <p:nvPr/>
+      </p:nvGrpSpPr>
+      <p:grpSpPr>
+        <a:xfrm>
+          <a:off x="0" y="0"/>
+          <a:ext cx="0" cy="0"/>
+          <a:chOff x="0" y="0"/>
+          <a:chExt cx="0" cy="0"/>
+        </a:xfrm>
+      </p:grpSpPr>
+      <p:sp>
+        <p:nvSpPr>
+          <p:cNvPr id="2" name="Slide Image Placeholder 1"/>
+          <p:cNvSpPr>
+            <a:spLocks noGrp="1" noRot="1" noChangeAspect="1"/>
+          </p:cNvSpPr>
+          <p:nvPr>
+            <p:ph type="sldImg"/>
+          </p:nvPr>
+        </p:nvSpPr>
+        <p:spPr/>
+      </p:sp>
+      <p:sp>
+        <p:nvSpPr>
+          <p:cNvPr id="3" name="Notes Placeholder 2"/>
+          <p:cNvSpPr>
+            <a:spLocks noGrp="1"/>
+          </p:cNvSpPr>
+          <p:nvPr>
+            <p:ph type="body" idx="1"/>
+          </p:nvPr>
+        </p:nvSpPr>
+        <p:spPr/>
+        <p:txBody>
+          <a:bodyPr/>
+          <a:lstStyle/>
+          <a:p>
+            <a:pPr marL="0" indent="0">
+              <a:buFontTx/>
+              <a:buNone/>
+            </a:pPr>
+            <a:endParaRPr lang="en-CA" baseline="0" noProof="0" dirty="0" smtClean="0"/>
+          </a:p>
+        </p:txBody>
+      </p:sp>
+      <p:sp>
+        <p:nvSpPr>
+          <p:cNvPr id="4" name="Slide Number Placeholder 3"/>
+          <p:cNvSpPr>
+            <a:spLocks noGrp="1"/>
+          </p:cNvSpPr>
+          <p:nvPr>
+            <p:ph type="sldNum" sz="quarter" idx="10"/>
+          </p:nvPr>
+        </p:nvSpPr>
+        <p:spPr/>
+        <p:txBody>
+          <a:bodyPr/>
+          <a:lstStyle/>
+          <a:p>
+            <a:fld id="{1EBCEF40-0E7B-404D-832C-DC6E08B53B2B}" type="slidenum">
+              <a:rPr lang="fr-FR" smtClean="0"/>
+              <a:t>14</a:t>
+            </a:fld>
+            <a:endParaRPr lang="fr-FR"/>
+          </a:p>
+        </p:txBody>
+      </p:sp>
+    </p:spTree>
+    <p:extLst>
+      <p:ext uri="{BB962C8B-B14F-4D97-AF65-F5344CB8AC3E}">
+        <p14:creationId xmlns:p14="http://schemas.microsoft.com/office/powerpoint/2010/main" val="2880905291"/>
+      </p:ext>
+    </p:extLst>
+  </p:cSld>
+  <p:clrMapOvr>
+    <a:masterClrMapping/>
+  </p:clrMapOvr>
+</p:notes>
+</file>
+
 <file path=ppt/notesSlides/notesSlide2.xml><?xml version="1.0" encoding="utf-8"?>
 <p:notes xmlns:a="http://schemas.openxmlformats.org/drawingml/2006/main" xmlns:r="http://schemas.openxmlformats.org/officeDocument/2006/relationships" xmlns:p="http://schemas.openxmlformats.org/presentationml/2006/main">
   <p:cSld>
@@ -1331,6 +1425,182 @@
     <p:extLst>
       <p:ext uri="{BB962C8B-B14F-4D97-AF65-F5344CB8AC3E}">
         <p14:creationId xmlns:p14="http://schemas.microsoft.com/office/powerpoint/2010/main" val="2393688506"/>
+      </p:ext>
+    </p:extLst>
+  </p:cSld>
+  <p:clrMapOvr>
+    <a:masterClrMapping/>
+  </p:clrMapOvr>
+</p:notes>
+</file>
+
+<file path=ppt/notesSlides/notesSlide8.xml><?xml version="1.0" encoding="utf-8"?>
+<p:notes xmlns:a="http://schemas.openxmlformats.org/drawingml/2006/main" xmlns:r="http://schemas.openxmlformats.org/officeDocument/2006/relationships" xmlns:p="http://schemas.openxmlformats.org/presentationml/2006/main">
+  <p:cSld>
+    <p:spTree>
+      <p:nvGrpSpPr>
+        <p:cNvPr id="1" name=""/>
+        <p:cNvGrpSpPr/>
+        <p:nvPr/>
+      </p:nvGrpSpPr>
+      <p:grpSpPr>
+        <a:xfrm>
+          <a:off x="0" y="0"/>
+          <a:ext cx="0" cy="0"/>
+          <a:chOff x="0" y="0"/>
+          <a:chExt cx="0" cy="0"/>
+        </a:xfrm>
+      </p:grpSpPr>
+      <p:sp>
+        <p:nvSpPr>
+          <p:cNvPr id="2" name="Slide Image Placeholder 1"/>
+          <p:cNvSpPr>
+            <a:spLocks noGrp="1" noRot="1" noChangeAspect="1"/>
+          </p:cNvSpPr>
+          <p:nvPr>
+            <p:ph type="sldImg"/>
+          </p:nvPr>
+        </p:nvSpPr>
+        <p:spPr/>
+      </p:sp>
+      <p:sp>
+        <p:nvSpPr>
+          <p:cNvPr id="3" name="Notes Placeholder 2"/>
+          <p:cNvSpPr>
+            <a:spLocks noGrp="1"/>
+          </p:cNvSpPr>
+          <p:nvPr>
+            <p:ph type="body" idx="1"/>
+          </p:nvPr>
+        </p:nvSpPr>
+        <p:spPr/>
+        <p:txBody>
+          <a:bodyPr/>
+          <a:lstStyle/>
+          <a:p>
+            <a:pPr marL="0" indent="0">
+              <a:buFontTx/>
+              <a:buNone/>
+            </a:pPr>
+            <a:endParaRPr lang="en-CA" baseline="0" noProof="0" dirty="0" smtClean="0"/>
+          </a:p>
+        </p:txBody>
+      </p:sp>
+      <p:sp>
+        <p:nvSpPr>
+          <p:cNvPr id="4" name="Slide Number Placeholder 3"/>
+          <p:cNvSpPr>
+            <a:spLocks noGrp="1"/>
+          </p:cNvSpPr>
+          <p:nvPr>
+            <p:ph type="sldNum" sz="quarter" idx="10"/>
+          </p:nvPr>
+        </p:nvSpPr>
+        <p:spPr/>
+        <p:txBody>
+          <a:bodyPr/>
+          <a:lstStyle/>
+          <a:p>
+            <a:fld id="{1EBCEF40-0E7B-404D-832C-DC6E08B53B2B}" type="slidenum">
+              <a:rPr lang="fr-FR" smtClean="0"/>
+              <a:t>12</a:t>
+            </a:fld>
+            <a:endParaRPr lang="fr-FR"/>
+          </a:p>
+        </p:txBody>
+      </p:sp>
+    </p:spTree>
+    <p:extLst>
+      <p:ext uri="{BB962C8B-B14F-4D97-AF65-F5344CB8AC3E}">
+        <p14:creationId xmlns:p14="http://schemas.microsoft.com/office/powerpoint/2010/main" val="2771676712"/>
+      </p:ext>
+    </p:extLst>
+  </p:cSld>
+  <p:clrMapOvr>
+    <a:masterClrMapping/>
+  </p:clrMapOvr>
+</p:notes>
+</file>
+
+<file path=ppt/notesSlides/notesSlide9.xml><?xml version="1.0" encoding="utf-8"?>
+<p:notes xmlns:a="http://schemas.openxmlformats.org/drawingml/2006/main" xmlns:r="http://schemas.openxmlformats.org/officeDocument/2006/relationships" xmlns:p="http://schemas.openxmlformats.org/presentationml/2006/main">
+  <p:cSld>
+    <p:spTree>
+      <p:nvGrpSpPr>
+        <p:cNvPr id="1" name=""/>
+        <p:cNvGrpSpPr/>
+        <p:nvPr/>
+      </p:nvGrpSpPr>
+      <p:grpSpPr>
+        <a:xfrm>
+          <a:off x="0" y="0"/>
+          <a:ext cx="0" cy="0"/>
+          <a:chOff x="0" y="0"/>
+          <a:chExt cx="0" cy="0"/>
+        </a:xfrm>
+      </p:grpSpPr>
+      <p:sp>
+        <p:nvSpPr>
+          <p:cNvPr id="2" name="Slide Image Placeholder 1"/>
+          <p:cNvSpPr>
+            <a:spLocks noGrp="1" noRot="1" noChangeAspect="1"/>
+          </p:cNvSpPr>
+          <p:nvPr>
+            <p:ph type="sldImg"/>
+          </p:nvPr>
+        </p:nvSpPr>
+        <p:spPr/>
+      </p:sp>
+      <p:sp>
+        <p:nvSpPr>
+          <p:cNvPr id="3" name="Notes Placeholder 2"/>
+          <p:cNvSpPr>
+            <a:spLocks noGrp="1"/>
+          </p:cNvSpPr>
+          <p:nvPr>
+            <p:ph type="body" idx="1"/>
+          </p:nvPr>
+        </p:nvSpPr>
+        <p:spPr/>
+        <p:txBody>
+          <a:bodyPr/>
+          <a:lstStyle/>
+          <a:p>
+            <a:pPr marL="0" indent="0">
+              <a:buFontTx/>
+              <a:buNone/>
+            </a:pPr>
+            <a:endParaRPr lang="en-CA" baseline="0" noProof="0" dirty="0" smtClean="0"/>
+          </a:p>
+        </p:txBody>
+      </p:sp>
+      <p:sp>
+        <p:nvSpPr>
+          <p:cNvPr id="4" name="Slide Number Placeholder 3"/>
+          <p:cNvSpPr>
+            <a:spLocks noGrp="1"/>
+          </p:cNvSpPr>
+          <p:nvPr>
+            <p:ph type="sldNum" sz="quarter" idx="10"/>
+          </p:nvPr>
+        </p:nvSpPr>
+        <p:spPr/>
+        <p:txBody>
+          <a:bodyPr/>
+          <a:lstStyle/>
+          <a:p>
+            <a:fld id="{1EBCEF40-0E7B-404D-832C-DC6E08B53B2B}" type="slidenum">
+              <a:rPr lang="fr-FR" smtClean="0"/>
+              <a:t>13</a:t>
+            </a:fld>
+            <a:endParaRPr lang="fr-FR"/>
+          </a:p>
+        </p:txBody>
+      </p:sp>
+    </p:spTree>
+    <p:extLst>
+      <p:ext uri="{BB962C8B-B14F-4D97-AF65-F5344CB8AC3E}">
+        <p14:creationId xmlns:p14="http://schemas.microsoft.com/office/powerpoint/2010/main" val="2485083290"/>
       </p:ext>
     </p:extLst>
   </p:cSld>
@@ -1471,7 +1741,7 @@
           <a:p>
             <a:fld id="{9B0E7100-CB1C-4906-903B-B0AA84BE9C13}" type="datetimeFigureOut">
               <a:rPr lang="fr-FR" smtClean="0"/>
-              <a:t>17/10/2013</a:t>
+              <a:t>21/10/2013</a:t>
             </a:fld>
             <a:endParaRPr lang="fr-FR"/>
           </a:p>
@@ -1641,7 +1911,7 @@
           <a:p>
             <a:fld id="{9B0E7100-CB1C-4906-903B-B0AA84BE9C13}" type="datetimeFigureOut">
               <a:rPr lang="fr-FR" smtClean="0"/>
-              <a:t>17/10/2013</a:t>
+              <a:t>21/10/2013</a:t>
             </a:fld>
             <a:endParaRPr lang="fr-FR"/>
           </a:p>
@@ -1821,7 +2091,7 @@
           <a:p>
             <a:fld id="{9B0E7100-CB1C-4906-903B-B0AA84BE9C13}" type="datetimeFigureOut">
               <a:rPr lang="fr-FR" smtClean="0"/>
-              <a:t>17/10/2013</a:t>
+              <a:t>21/10/2013</a:t>
             </a:fld>
             <a:endParaRPr lang="fr-FR"/>
           </a:p>
@@ -1991,7 +2261,7 @@
           <a:p>
             <a:fld id="{9B0E7100-CB1C-4906-903B-B0AA84BE9C13}" type="datetimeFigureOut">
               <a:rPr lang="fr-FR" smtClean="0"/>
-              <a:t>17/10/2013</a:t>
+              <a:t>21/10/2013</a:t>
             </a:fld>
             <a:endParaRPr lang="fr-FR"/>
           </a:p>
@@ -2237,7 +2507,7 @@
           <a:p>
             <a:fld id="{9B0E7100-CB1C-4906-903B-B0AA84BE9C13}" type="datetimeFigureOut">
               <a:rPr lang="fr-FR" smtClean="0"/>
-              <a:t>17/10/2013</a:t>
+              <a:t>21/10/2013</a:t>
             </a:fld>
             <a:endParaRPr lang="fr-FR"/>
           </a:p>
@@ -2469,7 +2739,7 @@
           <a:p>
             <a:fld id="{9B0E7100-CB1C-4906-903B-B0AA84BE9C13}" type="datetimeFigureOut">
               <a:rPr lang="fr-FR" smtClean="0"/>
-              <a:t>17/10/2013</a:t>
+              <a:t>21/10/2013</a:t>
             </a:fld>
             <a:endParaRPr lang="fr-FR"/>
           </a:p>
@@ -2836,7 +3106,7 @@
           <a:p>
             <a:fld id="{9B0E7100-CB1C-4906-903B-B0AA84BE9C13}" type="datetimeFigureOut">
               <a:rPr lang="fr-FR" smtClean="0"/>
-              <a:t>17/10/2013</a:t>
+              <a:t>21/10/2013</a:t>
             </a:fld>
             <a:endParaRPr lang="fr-FR"/>
           </a:p>
@@ -2954,7 +3224,7 @@
           <a:p>
             <a:fld id="{9B0E7100-CB1C-4906-903B-B0AA84BE9C13}" type="datetimeFigureOut">
               <a:rPr lang="fr-FR" smtClean="0"/>
-              <a:t>17/10/2013</a:t>
+              <a:t>21/10/2013</a:t>
             </a:fld>
             <a:endParaRPr lang="fr-FR"/>
           </a:p>
@@ -3049,7 +3319,7 @@
           <a:p>
             <a:fld id="{9B0E7100-CB1C-4906-903B-B0AA84BE9C13}" type="datetimeFigureOut">
               <a:rPr lang="fr-FR" smtClean="0"/>
-              <a:t>17/10/2013</a:t>
+              <a:t>21/10/2013</a:t>
             </a:fld>
             <a:endParaRPr lang="fr-FR"/>
           </a:p>
@@ -3326,7 +3596,7 @@
           <a:p>
             <a:fld id="{9B0E7100-CB1C-4906-903B-B0AA84BE9C13}" type="datetimeFigureOut">
               <a:rPr lang="fr-FR" smtClean="0"/>
-              <a:t>17/10/2013</a:t>
+              <a:t>21/10/2013</a:t>
             </a:fld>
             <a:endParaRPr lang="fr-FR"/>
           </a:p>
@@ -3579,7 +3849,7 @@
           <a:p>
             <a:fld id="{9B0E7100-CB1C-4906-903B-B0AA84BE9C13}" type="datetimeFigureOut">
               <a:rPr lang="fr-FR" smtClean="0"/>
-              <a:t>17/10/2013</a:t>
+              <a:t>21/10/2013</a:t>
             </a:fld>
             <a:endParaRPr lang="fr-FR"/>
           </a:p>
@@ -3792,7 +4062,7 @@
           <a:p>
             <a:fld id="{9B0E7100-CB1C-4906-903B-B0AA84BE9C13}" type="datetimeFigureOut">
               <a:rPr lang="fr-FR" smtClean="0"/>
-              <a:t>17/10/2013</a:t>
+              <a:t>21/10/2013</a:t>
             </a:fld>
             <a:endParaRPr lang="fr-FR"/>
           </a:p>
@@ -4779,18 +5049,345 @@
       </p:grpSpPr>
       <p:sp>
         <p:nvSpPr>
-          <p:cNvPr id="2" name="Title 1"/>
-          <p:cNvSpPr>
-            <a:spLocks noGrp="1"/>
-          </p:cNvSpPr>
-          <p:nvPr>
-            <p:ph type="title"/>
-          </p:nvPr>
+          <p:cNvPr id="3" name="Title 1"/>
+          <p:cNvSpPr txBox="1">
+            <a:spLocks/>
+          </p:cNvSpPr>
+          <p:nvPr/>
         </p:nvSpPr>
         <p:spPr>
           <a:xfrm>
-            <a:off x="4844143" y="2770868"/>
-            <a:ext cx="2155371" cy="682137"/>
+            <a:off x="838200" y="365125"/>
+            <a:ext cx="10515600" cy="682137"/>
+          </a:xfrm>
+          <a:prstGeom prst="rect">
+            <a:avLst/>
+          </a:prstGeom>
+        </p:spPr>
+        <p:txBody>
+          <a:bodyPr vert="horz" lIns="91440" tIns="45720" rIns="91440" bIns="45720" rtlCol="0" anchor="ctr">
+            <a:normAutofit fontScale="97500"/>
+          </a:bodyPr>
+          <a:lstStyle>
+            <a:lvl1pPr algn="l" defTabSz="914400" rtl="0" eaLnBrk="1" latinLnBrk="0" hangingPunct="1">
+              <a:lnSpc>
+                <a:spcPct val="90000"/>
+              </a:lnSpc>
+              <a:spcBef>
+                <a:spcPct val="0"/>
+              </a:spcBef>
+              <a:buNone/>
+              <a:defRPr sz="4400" kern="1200">
+                <a:solidFill>
+                  <a:schemeClr val="tx1"/>
+                </a:solidFill>
+                <a:latin typeface="+mj-lt"/>
+                <a:ea typeface="+mj-ea"/>
+                <a:cs typeface="+mj-cs"/>
+              </a:defRPr>
+            </a:lvl1pPr>
+          </a:lstStyle>
+          <a:p>
+            <a:r>
+              <a:rPr lang="en-CA" dirty="0">
+                <a:latin typeface="Ubuntu Condensed" panose="020B0506030602030204" pitchFamily="34" charset="0"/>
+              </a:rPr>
+              <a:t>Let’s try it</a:t>
+            </a:r>
+          </a:p>
+        </p:txBody>
+      </p:sp>
+      <p:sp>
+        <p:nvSpPr>
+          <p:cNvPr id="5" name="Content Placeholder 2"/>
+          <p:cNvSpPr txBox="1">
+            <a:spLocks/>
+          </p:cNvSpPr>
+          <p:nvPr/>
+        </p:nvSpPr>
+        <p:spPr>
+          <a:xfrm>
+            <a:off x="838200" y="2329543"/>
+            <a:ext cx="10515600" cy="2471057"/>
+          </a:xfrm>
+          <a:prstGeom prst="rect">
+            <a:avLst/>
+          </a:prstGeom>
+        </p:spPr>
+        <p:txBody>
+          <a:bodyPr vert="horz" lIns="91440" tIns="45720" rIns="91440" bIns="45720" rtlCol="0">
+            <a:normAutofit/>
+          </a:bodyPr>
+          <a:lstStyle>
+            <a:lvl1pPr marL="228600" indent="-228600" algn="l" defTabSz="914400" rtl="0" eaLnBrk="1" latinLnBrk="0" hangingPunct="1">
+              <a:lnSpc>
+                <a:spcPct val="90000"/>
+              </a:lnSpc>
+              <a:spcBef>
+                <a:spcPts val="1000"/>
+              </a:spcBef>
+              <a:buFont typeface="Arial" panose="020B0604020202020204" pitchFamily="34" charset="0"/>
+              <a:buChar char="•"/>
+              <a:defRPr sz="2800" kern="1200">
+                <a:solidFill>
+                  <a:schemeClr val="tx1"/>
+                </a:solidFill>
+                <a:latin typeface="+mn-lt"/>
+                <a:ea typeface="+mn-ea"/>
+                <a:cs typeface="+mn-cs"/>
+              </a:defRPr>
+            </a:lvl1pPr>
+            <a:lvl2pPr marL="685800" indent="-228600" algn="l" defTabSz="914400" rtl="0" eaLnBrk="1" latinLnBrk="0" hangingPunct="1">
+              <a:lnSpc>
+                <a:spcPct val="90000"/>
+              </a:lnSpc>
+              <a:spcBef>
+                <a:spcPts val="500"/>
+              </a:spcBef>
+              <a:buFont typeface="Arial" panose="020B0604020202020204" pitchFamily="34" charset="0"/>
+              <a:buChar char="•"/>
+              <a:defRPr sz="2400" kern="1200">
+                <a:solidFill>
+                  <a:schemeClr val="tx1"/>
+                </a:solidFill>
+                <a:latin typeface="+mn-lt"/>
+                <a:ea typeface="+mn-ea"/>
+                <a:cs typeface="+mn-cs"/>
+              </a:defRPr>
+            </a:lvl2pPr>
+            <a:lvl3pPr marL="1143000" indent="-228600" algn="l" defTabSz="914400" rtl="0" eaLnBrk="1" latinLnBrk="0" hangingPunct="1">
+              <a:lnSpc>
+                <a:spcPct val="90000"/>
+              </a:lnSpc>
+              <a:spcBef>
+                <a:spcPts val="500"/>
+              </a:spcBef>
+              <a:buFont typeface="Arial" panose="020B0604020202020204" pitchFamily="34" charset="0"/>
+              <a:buChar char="•"/>
+              <a:defRPr sz="2000" kern="1200">
+                <a:solidFill>
+                  <a:schemeClr val="tx1"/>
+                </a:solidFill>
+                <a:latin typeface="+mn-lt"/>
+                <a:ea typeface="+mn-ea"/>
+                <a:cs typeface="+mn-cs"/>
+              </a:defRPr>
+            </a:lvl3pPr>
+            <a:lvl4pPr marL="1600200" indent="-228600" algn="l" defTabSz="914400" rtl="0" eaLnBrk="1" latinLnBrk="0" hangingPunct="1">
+              <a:lnSpc>
+                <a:spcPct val="90000"/>
+              </a:lnSpc>
+              <a:spcBef>
+                <a:spcPts val="500"/>
+              </a:spcBef>
+              <a:buFont typeface="Arial" panose="020B0604020202020204" pitchFamily="34" charset="0"/>
+              <a:buChar char="•"/>
+              <a:defRPr sz="1800" kern="1200">
+                <a:solidFill>
+                  <a:schemeClr val="tx1"/>
+                </a:solidFill>
+                <a:latin typeface="+mn-lt"/>
+                <a:ea typeface="+mn-ea"/>
+                <a:cs typeface="+mn-cs"/>
+              </a:defRPr>
+            </a:lvl4pPr>
+            <a:lvl5pPr marL="2057400" indent="-228600" algn="l" defTabSz="914400" rtl="0" eaLnBrk="1" latinLnBrk="0" hangingPunct="1">
+              <a:lnSpc>
+                <a:spcPct val="90000"/>
+              </a:lnSpc>
+              <a:spcBef>
+                <a:spcPts val="500"/>
+              </a:spcBef>
+              <a:buFont typeface="Arial" panose="020B0604020202020204" pitchFamily="34" charset="0"/>
+              <a:buChar char="•"/>
+              <a:defRPr sz="1800" kern="1200">
+                <a:solidFill>
+                  <a:schemeClr val="tx1"/>
+                </a:solidFill>
+                <a:latin typeface="+mn-lt"/>
+                <a:ea typeface="+mn-ea"/>
+                <a:cs typeface="+mn-cs"/>
+              </a:defRPr>
+            </a:lvl5pPr>
+            <a:lvl6pPr marL="2514600" indent="-228600" algn="l" defTabSz="914400" rtl="0" eaLnBrk="1" latinLnBrk="0" hangingPunct="1">
+              <a:lnSpc>
+                <a:spcPct val="90000"/>
+              </a:lnSpc>
+              <a:spcBef>
+                <a:spcPts val="500"/>
+              </a:spcBef>
+              <a:buFont typeface="Arial" panose="020B0604020202020204" pitchFamily="34" charset="0"/>
+              <a:buChar char="•"/>
+              <a:defRPr sz="1800" kern="1200">
+                <a:solidFill>
+                  <a:schemeClr val="tx1"/>
+                </a:solidFill>
+                <a:latin typeface="+mn-lt"/>
+                <a:ea typeface="+mn-ea"/>
+                <a:cs typeface="+mn-cs"/>
+              </a:defRPr>
+            </a:lvl6pPr>
+            <a:lvl7pPr marL="2971800" indent="-228600" algn="l" defTabSz="914400" rtl="0" eaLnBrk="1" latinLnBrk="0" hangingPunct="1">
+              <a:lnSpc>
+                <a:spcPct val="90000"/>
+              </a:lnSpc>
+              <a:spcBef>
+                <a:spcPts val="500"/>
+              </a:spcBef>
+              <a:buFont typeface="Arial" panose="020B0604020202020204" pitchFamily="34" charset="0"/>
+              <a:buChar char="•"/>
+              <a:defRPr sz="1800" kern="1200">
+                <a:solidFill>
+                  <a:schemeClr val="tx1"/>
+                </a:solidFill>
+                <a:latin typeface="+mn-lt"/>
+                <a:ea typeface="+mn-ea"/>
+                <a:cs typeface="+mn-cs"/>
+              </a:defRPr>
+            </a:lvl7pPr>
+            <a:lvl8pPr marL="3429000" indent="-228600" algn="l" defTabSz="914400" rtl="0" eaLnBrk="1" latinLnBrk="0" hangingPunct="1">
+              <a:lnSpc>
+                <a:spcPct val="90000"/>
+              </a:lnSpc>
+              <a:spcBef>
+                <a:spcPts val="500"/>
+              </a:spcBef>
+              <a:buFont typeface="Arial" panose="020B0604020202020204" pitchFamily="34" charset="0"/>
+              <a:buChar char="•"/>
+              <a:defRPr sz="1800" kern="1200">
+                <a:solidFill>
+                  <a:schemeClr val="tx1"/>
+                </a:solidFill>
+                <a:latin typeface="+mn-lt"/>
+                <a:ea typeface="+mn-ea"/>
+                <a:cs typeface="+mn-cs"/>
+              </a:defRPr>
+            </a:lvl8pPr>
+            <a:lvl9pPr marL="3886200" indent="-228600" algn="l" defTabSz="914400" rtl="0" eaLnBrk="1" latinLnBrk="0" hangingPunct="1">
+              <a:lnSpc>
+                <a:spcPct val="90000"/>
+              </a:lnSpc>
+              <a:spcBef>
+                <a:spcPts val="500"/>
+              </a:spcBef>
+              <a:buFont typeface="Arial" panose="020B0604020202020204" pitchFamily="34" charset="0"/>
+              <a:buChar char="•"/>
+              <a:defRPr sz="1800" kern="1200">
+                <a:solidFill>
+                  <a:schemeClr val="tx1"/>
+                </a:solidFill>
+                <a:latin typeface="+mn-lt"/>
+                <a:ea typeface="+mn-ea"/>
+                <a:cs typeface="+mn-cs"/>
+              </a:defRPr>
+            </a:lvl9pPr>
+          </a:lstStyle>
+          <a:p>
+            <a:r>
+              <a:rPr lang="en-GB" sz="2400" dirty="0" smtClean="0">
+                <a:latin typeface="Ubuntu Light" panose="020B0304030602030204" pitchFamily="34" charset="0"/>
+              </a:rPr>
+              <a:t>Low level manipulation </a:t>
+            </a:r>
+            <a:r>
+              <a:rPr lang="en-GB" sz="2400" dirty="0" err="1" smtClean="0">
+                <a:latin typeface="Ubuntu Light" panose="020B0304030602030204" pitchFamily="34" charset="0"/>
+              </a:rPr>
+              <a:t>vs</a:t>
+            </a:r>
+            <a:r>
+              <a:rPr lang="en-GB" sz="2400" dirty="0" smtClean="0">
+                <a:latin typeface="Ubuntu Light" panose="020B0304030602030204" pitchFamily="34" charset="0"/>
+              </a:rPr>
+              <a:t> KO</a:t>
+            </a:r>
+          </a:p>
+          <a:p>
+            <a:r>
+              <a:rPr lang="en-GB" sz="2400" dirty="0" smtClean="0">
+                <a:latin typeface="Ubuntu Light" panose="020B0304030602030204" pitchFamily="34" charset="0"/>
+              </a:rPr>
+              <a:t>List data display</a:t>
+            </a:r>
+          </a:p>
+          <a:p>
+            <a:r>
+              <a:rPr lang="en-GB" sz="2400" dirty="0" smtClean="0">
+                <a:latin typeface="Ubuntu Light" panose="020B0304030602030204" pitchFamily="34" charset="0"/>
+              </a:rPr>
+              <a:t>List data manipulation</a:t>
+            </a:r>
+          </a:p>
+          <a:p>
+            <a:r>
+              <a:rPr lang="en-GB" sz="2400" dirty="0" smtClean="0">
+                <a:latin typeface="Ubuntu Light" panose="020B0304030602030204" pitchFamily="34" charset="0"/>
+              </a:rPr>
+              <a:t>Extensibility</a:t>
+            </a:r>
+          </a:p>
+          <a:p>
+            <a:r>
+              <a:rPr lang="en-GB" sz="2400" dirty="0" smtClean="0">
+                <a:latin typeface="Ubuntu Light" panose="020B0304030602030204" pitchFamily="34" charset="0"/>
+              </a:rPr>
+              <a:t>Testability</a:t>
+            </a:r>
+            <a:endParaRPr lang="en-GB" sz="2400" dirty="0" smtClean="0">
+              <a:latin typeface="Ubuntu Light" panose="020B0304030602030204" pitchFamily="34" charset="0"/>
+            </a:endParaRPr>
+          </a:p>
+          <a:p>
+            <a:endParaRPr lang="en-CA" sz="2400" baseline="0" noProof="0" dirty="0" smtClean="0">
+              <a:latin typeface="Ubuntu Light" panose="020B0304030602030204" pitchFamily="34" charset="0"/>
+            </a:endParaRPr>
+          </a:p>
+        </p:txBody>
+      </p:sp>
+    </p:spTree>
+    <p:extLst>
+      <p:ext uri="{BB962C8B-B14F-4D97-AF65-F5344CB8AC3E}">
+        <p14:creationId xmlns:p14="http://schemas.microsoft.com/office/powerpoint/2010/main" val="2416104711"/>
+      </p:ext>
+    </p:extLst>
+  </p:cSld>
+  <p:clrMapOvr>
+    <a:masterClrMapping/>
+  </p:clrMapOvr>
+</p:sld>
+</file>
+
+<file path=ppt/slides/slide12.xml><?xml version="1.0" encoding="utf-8"?>
+<p:sld xmlns:a="http://schemas.openxmlformats.org/drawingml/2006/main" xmlns:r="http://schemas.openxmlformats.org/officeDocument/2006/relationships" xmlns:p="http://schemas.openxmlformats.org/presentationml/2006/main">
+  <p:cSld>
+    <p:spTree>
+      <p:nvGrpSpPr>
+        <p:cNvPr id="1" name=""/>
+        <p:cNvGrpSpPr/>
+        <p:nvPr/>
+      </p:nvGrpSpPr>
+      <p:grpSpPr>
+        <a:xfrm>
+          <a:off x="0" y="0"/>
+          <a:ext cx="0" cy="0"/>
+          <a:chOff x="0" y="0"/>
+          <a:chExt cx="0" cy="0"/>
+        </a:xfrm>
+      </p:grpSpPr>
+      <p:sp>
+        <p:nvSpPr>
+          <p:cNvPr id="2" name="Title 1"/>
+          <p:cNvSpPr>
+            <a:spLocks noGrp="1"/>
+          </p:cNvSpPr>
+          <p:nvPr>
+            <p:ph type="title"/>
+          </p:nvPr>
+        </p:nvSpPr>
+        <p:spPr>
+          <a:xfrm>
+            <a:off x="838200" y="365125"/>
+            <a:ext cx="10515600" cy="682137"/>
           </a:xfrm>
         </p:spPr>
         <p:txBody>
@@ -4803,7 +5400,13 @@
               <a:rPr lang="en-CA" dirty="0" smtClean="0">
                 <a:latin typeface="Ubuntu Condensed" panose="020B0506030602030204" pitchFamily="34" charset="0"/>
               </a:rPr>
-              <a:t>Let’s try it</a:t>
+              <a:t>KO’s </a:t>
+            </a:r>
+            <a:r>
+              <a:rPr lang="en-CA" dirty="0" smtClean="0">
+                <a:latin typeface="Ubuntu Condensed" panose="020B0506030602030204" pitchFamily="34" charset="0"/>
+              </a:rPr>
+              <a:t>performances</a:t>
             </a:r>
             <a:endParaRPr lang="en-CA" dirty="0">
               <a:latin typeface="Ubuntu Condensed" panose="020B0506030602030204" pitchFamily="34" charset="0"/>
@@ -4811,10 +5414,792 @@
           </a:p>
         </p:txBody>
       </p:sp>
+      <p:sp>
+        <p:nvSpPr>
+          <p:cNvPr id="5" name="Content Placeholder 2"/>
+          <p:cNvSpPr txBox="1">
+            <a:spLocks/>
+          </p:cNvSpPr>
+          <p:nvPr/>
+        </p:nvSpPr>
+        <p:spPr>
+          <a:xfrm>
+            <a:off x="838200" y="2479411"/>
+            <a:ext cx="10515600" cy="1341475"/>
+          </a:xfrm>
+          <a:prstGeom prst="rect">
+            <a:avLst/>
+          </a:prstGeom>
+        </p:spPr>
+        <p:txBody>
+          <a:bodyPr vert="horz" lIns="91440" tIns="45720" rIns="91440" bIns="45720" rtlCol="0">
+            <a:normAutofit/>
+          </a:bodyPr>
+          <a:lstStyle>
+            <a:lvl1pPr marL="228600" indent="-228600" algn="l" defTabSz="914400" rtl="0" eaLnBrk="1" latinLnBrk="0" hangingPunct="1">
+              <a:lnSpc>
+                <a:spcPct val="90000"/>
+              </a:lnSpc>
+              <a:spcBef>
+                <a:spcPts val="1000"/>
+              </a:spcBef>
+              <a:buFont typeface="Arial" panose="020B0604020202020204" pitchFamily="34" charset="0"/>
+              <a:buChar char="•"/>
+              <a:defRPr sz="2800" kern="1200">
+                <a:solidFill>
+                  <a:schemeClr val="tx1"/>
+                </a:solidFill>
+                <a:latin typeface="+mn-lt"/>
+                <a:ea typeface="+mn-ea"/>
+                <a:cs typeface="+mn-cs"/>
+              </a:defRPr>
+            </a:lvl1pPr>
+            <a:lvl2pPr marL="685800" indent="-228600" algn="l" defTabSz="914400" rtl="0" eaLnBrk="1" latinLnBrk="0" hangingPunct="1">
+              <a:lnSpc>
+                <a:spcPct val="90000"/>
+              </a:lnSpc>
+              <a:spcBef>
+                <a:spcPts val="500"/>
+              </a:spcBef>
+              <a:buFont typeface="Arial" panose="020B0604020202020204" pitchFamily="34" charset="0"/>
+              <a:buChar char="•"/>
+              <a:defRPr sz="2400" kern="1200">
+                <a:solidFill>
+                  <a:schemeClr val="tx1"/>
+                </a:solidFill>
+                <a:latin typeface="+mn-lt"/>
+                <a:ea typeface="+mn-ea"/>
+                <a:cs typeface="+mn-cs"/>
+              </a:defRPr>
+            </a:lvl2pPr>
+            <a:lvl3pPr marL="1143000" indent="-228600" algn="l" defTabSz="914400" rtl="0" eaLnBrk="1" latinLnBrk="0" hangingPunct="1">
+              <a:lnSpc>
+                <a:spcPct val="90000"/>
+              </a:lnSpc>
+              <a:spcBef>
+                <a:spcPts val="500"/>
+              </a:spcBef>
+              <a:buFont typeface="Arial" panose="020B0604020202020204" pitchFamily="34" charset="0"/>
+              <a:buChar char="•"/>
+              <a:defRPr sz="2000" kern="1200">
+                <a:solidFill>
+                  <a:schemeClr val="tx1"/>
+                </a:solidFill>
+                <a:latin typeface="+mn-lt"/>
+                <a:ea typeface="+mn-ea"/>
+                <a:cs typeface="+mn-cs"/>
+              </a:defRPr>
+            </a:lvl3pPr>
+            <a:lvl4pPr marL="1600200" indent="-228600" algn="l" defTabSz="914400" rtl="0" eaLnBrk="1" latinLnBrk="0" hangingPunct="1">
+              <a:lnSpc>
+                <a:spcPct val="90000"/>
+              </a:lnSpc>
+              <a:spcBef>
+                <a:spcPts val="500"/>
+              </a:spcBef>
+              <a:buFont typeface="Arial" panose="020B0604020202020204" pitchFamily="34" charset="0"/>
+              <a:buChar char="•"/>
+              <a:defRPr sz="1800" kern="1200">
+                <a:solidFill>
+                  <a:schemeClr val="tx1"/>
+                </a:solidFill>
+                <a:latin typeface="+mn-lt"/>
+                <a:ea typeface="+mn-ea"/>
+                <a:cs typeface="+mn-cs"/>
+              </a:defRPr>
+            </a:lvl4pPr>
+            <a:lvl5pPr marL="2057400" indent="-228600" algn="l" defTabSz="914400" rtl="0" eaLnBrk="1" latinLnBrk="0" hangingPunct="1">
+              <a:lnSpc>
+                <a:spcPct val="90000"/>
+              </a:lnSpc>
+              <a:spcBef>
+                <a:spcPts val="500"/>
+              </a:spcBef>
+              <a:buFont typeface="Arial" panose="020B0604020202020204" pitchFamily="34" charset="0"/>
+              <a:buChar char="•"/>
+              <a:defRPr sz="1800" kern="1200">
+                <a:solidFill>
+                  <a:schemeClr val="tx1"/>
+                </a:solidFill>
+                <a:latin typeface="+mn-lt"/>
+                <a:ea typeface="+mn-ea"/>
+                <a:cs typeface="+mn-cs"/>
+              </a:defRPr>
+            </a:lvl5pPr>
+            <a:lvl6pPr marL="2514600" indent="-228600" algn="l" defTabSz="914400" rtl="0" eaLnBrk="1" latinLnBrk="0" hangingPunct="1">
+              <a:lnSpc>
+                <a:spcPct val="90000"/>
+              </a:lnSpc>
+              <a:spcBef>
+                <a:spcPts val="500"/>
+              </a:spcBef>
+              <a:buFont typeface="Arial" panose="020B0604020202020204" pitchFamily="34" charset="0"/>
+              <a:buChar char="•"/>
+              <a:defRPr sz="1800" kern="1200">
+                <a:solidFill>
+                  <a:schemeClr val="tx1"/>
+                </a:solidFill>
+                <a:latin typeface="+mn-lt"/>
+                <a:ea typeface="+mn-ea"/>
+                <a:cs typeface="+mn-cs"/>
+              </a:defRPr>
+            </a:lvl6pPr>
+            <a:lvl7pPr marL="2971800" indent="-228600" algn="l" defTabSz="914400" rtl="0" eaLnBrk="1" latinLnBrk="0" hangingPunct="1">
+              <a:lnSpc>
+                <a:spcPct val="90000"/>
+              </a:lnSpc>
+              <a:spcBef>
+                <a:spcPts val="500"/>
+              </a:spcBef>
+              <a:buFont typeface="Arial" panose="020B0604020202020204" pitchFamily="34" charset="0"/>
+              <a:buChar char="•"/>
+              <a:defRPr sz="1800" kern="1200">
+                <a:solidFill>
+                  <a:schemeClr val="tx1"/>
+                </a:solidFill>
+                <a:latin typeface="+mn-lt"/>
+                <a:ea typeface="+mn-ea"/>
+                <a:cs typeface="+mn-cs"/>
+              </a:defRPr>
+            </a:lvl7pPr>
+            <a:lvl8pPr marL="3429000" indent="-228600" algn="l" defTabSz="914400" rtl="0" eaLnBrk="1" latinLnBrk="0" hangingPunct="1">
+              <a:lnSpc>
+                <a:spcPct val="90000"/>
+              </a:lnSpc>
+              <a:spcBef>
+                <a:spcPts val="500"/>
+              </a:spcBef>
+              <a:buFont typeface="Arial" panose="020B0604020202020204" pitchFamily="34" charset="0"/>
+              <a:buChar char="•"/>
+              <a:defRPr sz="1800" kern="1200">
+                <a:solidFill>
+                  <a:schemeClr val="tx1"/>
+                </a:solidFill>
+                <a:latin typeface="+mn-lt"/>
+                <a:ea typeface="+mn-ea"/>
+                <a:cs typeface="+mn-cs"/>
+              </a:defRPr>
+            </a:lvl8pPr>
+            <a:lvl9pPr marL="3886200" indent="-228600" algn="l" defTabSz="914400" rtl="0" eaLnBrk="1" latinLnBrk="0" hangingPunct="1">
+              <a:lnSpc>
+                <a:spcPct val="90000"/>
+              </a:lnSpc>
+              <a:spcBef>
+                <a:spcPts val="500"/>
+              </a:spcBef>
+              <a:buFont typeface="Arial" panose="020B0604020202020204" pitchFamily="34" charset="0"/>
+              <a:buChar char="•"/>
+              <a:defRPr sz="1800" kern="1200">
+                <a:solidFill>
+                  <a:schemeClr val="tx1"/>
+                </a:solidFill>
+                <a:latin typeface="+mn-lt"/>
+                <a:ea typeface="+mn-ea"/>
+                <a:cs typeface="+mn-cs"/>
+              </a:defRPr>
+            </a:lvl9pPr>
+          </a:lstStyle>
+          <a:p>
+            <a:r>
+              <a:rPr lang="en-GB" sz="2400" dirty="0" smtClean="0">
+                <a:latin typeface="Ubuntu Light" panose="020B0304030602030204" pitchFamily="34" charset="0"/>
+              </a:rPr>
+              <a:t>Observable approach can lose a little again Angular.js or some native DOM APIs</a:t>
+            </a:r>
+          </a:p>
+          <a:p>
+            <a:r>
+              <a:rPr lang="en-GB" sz="2400" dirty="0" smtClean="0">
+                <a:latin typeface="Ubuntu Light" panose="020B0304030602030204" pitchFamily="34" charset="0"/>
+              </a:rPr>
+              <a:t>Multiple tuning scenarios are possible</a:t>
+            </a:r>
+            <a:endParaRPr lang="en-GB" sz="2400" dirty="0" smtClean="0">
+              <a:latin typeface="Ubuntu Light" panose="020B0304030602030204" pitchFamily="34" charset="0"/>
+            </a:endParaRPr>
+          </a:p>
+          <a:p>
+            <a:endParaRPr lang="en-GB" sz="2400" dirty="0" smtClean="0">
+              <a:latin typeface="Ubuntu Light" panose="020B0304030602030204" pitchFamily="34" charset="0"/>
+            </a:endParaRPr>
+          </a:p>
+          <a:p>
+            <a:endParaRPr lang="en-CA" sz="2400" baseline="0" noProof="0" dirty="0" smtClean="0">
+              <a:latin typeface="Ubuntu Light" panose="020B0304030602030204" pitchFamily="34" charset="0"/>
+            </a:endParaRPr>
+          </a:p>
+        </p:txBody>
+      </p:sp>
     </p:spTree>
     <p:extLst>
       <p:ext uri="{BB962C8B-B14F-4D97-AF65-F5344CB8AC3E}">
-        <p14:creationId xmlns:p14="http://schemas.microsoft.com/office/powerpoint/2010/main" val="2416104711"/>
+        <p14:creationId xmlns:p14="http://schemas.microsoft.com/office/powerpoint/2010/main" val="4044269788"/>
+      </p:ext>
+    </p:extLst>
+  </p:cSld>
+  <p:clrMapOvr>
+    <a:masterClrMapping/>
+  </p:clrMapOvr>
+</p:sld>
+</file>
+
+<file path=ppt/slides/slide13.xml><?xml version="1.0" encoding="utf-8"?>
+<p:sld xmlns:a="http://schemas.openxmlformats.org/drawingml/2006/main" xmlns:r="http://schemas.openxmlformats.org/officeDocument/2006/relationships" xmlns:p="http://schemas.openxmlformats.org/presentationml/2006/main">
+  <p:cSld>
+    <p:spTree>
+      <p:nvGrpSpPr>
+        <p:cNvPr id="1" name=""/>
+        <p:cNvGrpSpPr/>
+        <p:nvPr/>
+      </p:nvGrpSpPr>
+      <p:grpSpPr>
+        <a:xfrm>
+          <a:off x="0" y="0"/>
+          <a:ext cx="0" cy="0"/>
+          <a:chOff x="0" y="0"/>
+          <a:chExt cx="0" cy="0"/>
+        </a:xfrm>
+      </p:grpSpPr>
+      <p:sp>
+        <p:nvSpPr>
+          <p:cNvPr id="2" name="Title 1"/>
+          <p:cNvSpPr>
+            <a:spLocks noGrp="1"/>
+          </p:cNvSpPr>
+          <p:nvPr>
+            <p:ph type="title"/>
+          </p:nvPr>
+        </p:nvSpPr>
+        <p:spPr>
+          <a:xfrm>
+            <a:off x="838200" y="365125"/>
+            <a:ext cx="10515600" cy="682137"/>
+          </a:xfrm>
+        </p:spPr>
+        <p:txBody>
+          <a:bodyPr>
+            <a:normAutofit fontScale="90000"/>
+          </a:bodyPr>
+          <a:lstStyle/>
+          <a:p>
+            <a:r>
+              <a:rPr lang="en-CA" dirty="0" smtClean="0">
+                <a:latin typeface="Ubuntu Condensed" panose="020B0506030602030204" pitchFamily="34" charset="0"/>
+              </a:rPr>
+              <a:t>Usage recommendation</a:t>
+            </a:r>
+            <a:endParaRPr lang="en-CA" dirty="0">
+              <a:latin typeface="Ubuntu Condensed" panose="020B0506030602030204" pitchFamily="34" charset="0"/>
+            </a:endParaRPr>
+          </a:p>
+        </p:txBody>
+      </p:sp>
+      <p:sp>
+        <p:nvSpPr>
+          <p:cNvPr id="5" name="Content Placeholder 2"/>
+          <p:cNvSpPr txBox="1">
+            <a:spLocks/>
+          </p:cNvSpPr>
+          <p:nvPr/>
+        </p:nvSpPr>
+        <p:spPr>
+          <a:xfrm>
+            <a:off x="838200" y="2479411"/>
+            <a:ext cx="10515600" cy="1341475"/>
+          </a:xfrm>
+          <a:prstGeom prst="rect">
+            <a:avLst/>
+          </a:prstGeom>
+        </p:spPr>
+        <p:txBody>
+          <a:bodyPr vert="horz" lIns="91440" tIns="45720" rIns="91440" bIns="45720" rtlCol="0">
+            <a:normAutofit/>
+          </a:bodyPr>
+          <a:lstStyle>
+            <a:lvl1pPr marL="228600" indent="-228600" algn="l" defTabSz="914400" rtl="0" eaLnBrk="1" latinLnBrk="0" hangingPunct="1">
+              <a:lnSpc>
+                <a:spcPct val="90000"/>
+              </a:lnSpc>
+              <a:spcBef>
+                <a:spcPts val="1000"/>
+              </a:spcBef>
+              <a:buFont typeface="Arial" panose="020B0604020202020204" pitchFamily="34" charset="0"/>
+              <a:buChar char="•"/>
+              <a:defRPr sz="2800" kern="1200">
+                <a:solidFill>
+                  <a:schemeClr val="tx1"/>
+                </a:solidFill>
+                <a:latin typeface="+mn-lt"/>
+                <a:ea typeface="+mn-ea"/>
+                <a:cs typeface="+mn-cs"/>
+              </a:defRPr>
+            </a:lvl1pPr>
+            <a:lvl2pPr marL="685800" indent="-228600" algn="l" defTabSz="914400" rtl="0" eaLnBrk="1" latinLnBrk="0" hangingPunct="1">
+              <a:lnSpc>
+                <a:spcPct val="90000"/>
+              </a:lnSpc>
+              <a:spcBef>
+                <a:spcPts val="500"/>
+              </a:spcBef>
+              <a:buFont typeface="Arial" panose="020B0604020202020204" pitchFamily="34" charset="0"/>
+              <a:buChar char="•"/>
+              <a:defRPr sz="2400" kern="1200">
+                <a:solidFill>
+                  <a:schemeClr val="tx1"/>
+                </a:solidFill>
+                <a:latin typeface="+mn-lt"/>
+                <a:ea typeface="+mn-ea"/>
+                <a:cs typeface="+mn-cs"/>
+              </a:defRPr>
+            </a:lvl2pPr>
+            <a:lvl3pPr marL="1143000" indent="-228600" algn="l" defTabSz="914400" rtl="0" eaLnBrk="1" latinLnBrk="0" hangingPunct="1">
+              <a:lnSpc>
+                <a:spcPct val="90000"/>
+              </a:lnSpc>
+              <a:spcBef>
+                <a:spcPts val="500"/>
+              </a:spcBef>
+              <a:buFont typeface="Arial" panose="020B0604020202020204" pitchFamily="34" charset="0"/>
+              <a:buChar char="•"/>
+              <a:defRPr sz="2000" kern="1200">
+                <a:solidFill>
+                  <a:schemeClr val="tx1"/>
+                </a:solidFill>
+                <a:latin typeface="+mn-lt"/>
+                <a:ea typeface="+mn-ea"/>
+                <a:cs typeface="+mn-cs"/>
+              </a:defRPr>
+            </a:lvl3pPr>
+            <a:lvl4pPr marL="1600200" indent="-228600" algn="l" defTabSz="914400" rtl="0" eaLnBrk="1" latinLnBrk="0" hangingPunct="1">
+              <a:lnSpc>
+                <a:spcPct val="90000"/>
+              </a:lnSpc>
+              <a:spcBef>
+                <a:spcPts val="500"/>
+              </a:spcBef>
+              <a:buFont typeface="Arial" panose="020B0604020202020204" pitchFamily="34" charset="0"/>
+              <a:buChar char="•"/>
+              <a:defRPr sz="1800" kern="1200">
+                <a:solidFill>
+                  <a:schemeClr val="tx1"/>
+                </a:solidFill>
+                <a:latin typeface="+mn-lt"/>
+                <a:ea typeface="+mn-ea"/>
+                <a:cs typeface="+mn-cs"/>
+              </a:defRPr>
+            </a:lvl4pPr>
+            <a:lvl5pPr marL="2057400" indent="-228600" algn="l" defTabSz="914400" rtl="0" eaLnBrk="1" latinLnBrk="0" hangingPunct="1">
+              <a:lnSpc>
+                <a:spcPct val="90000"/>
+              </a:lnSpc>
+              <a:spcBef>
+                <a:spcPts val="500"/>
+              </a:spcBef>
+              <a:buFont typeface="Arial" panose="020B0604020202020204" pitchFamily="34" charset="0"/>
+              <a:buChar char="•"/>
+              <a:defRPr sz="1800" kern="1200">
+                <a:solidFill>
+                  <a:schemeClr val="tx1"/>
+                </a:solidFill>
+                <a:latin typeface="+mn-lt"/>
+                <a:ea typeface="+mn-ea"/>
+                <a:cs typeface="+mn-cs"/>
+              </a:defRPr>
+            </a:lvl5pPr>
+            <a:lvl6pPr marL="2514600" indent="-228600" algn="l" defTabSz="914400" rtl="0" eaLnBrk="1" latinLnBrk="0" hangingPunct="1">
+              <a:lnSpc>
+                <a:spcPct val="90000"/>
+              </a:lnSpc>
+              <a:spcBef>
+                <a:spcPts val="500"/>
+              </a:spcBef>
+              <a:buFont typeface="Arial" panose="020B0604020202020204" pitchFamily="34" charset="0"/>
+              <a:buChar char="•"/>
+              <a:defRPr sz="1800" kern="1200">
+                <a:solidFill>
+                  <a:schemeClr val="tx1"/>
+                </a:solidFill>
+                <a:latin typeface="+mn-lt"/>
+                <a:ea typeface="+mn-ea"/>
+                <a:cs typeface="+mn-cs"/>
+              </a:defRPr>
+            </a:lvl6pPr>
+            <a:lvl7pPr marL="2971800" indent="-228600" algn="l" defTabSz="914400" rtl="0" eaLnBrk="1" latinLnBrk="0" hangingPunct="1">
+              <a:lnSpc>
+                <a:spcPct val="90000"/>
+              </a:lnSpc>
+              <a:spcBef>
+                <a:spcPts val="500"/>
+              </a:spcBef>
+              <a:buFont typeface="Arial" panose="020B0604020202020204" pitchFamily="34" charset="0"/>
+              <a:buChar char="•"/>
+              <a:defRPr sz="1800" kern="1200">
+                <a:solidFill>
+                  <a:schemeClr val="tx1"/>
+                </a:solidFill>
+                <a:latin typeface="+mn-lt"/>
+                <a:ea typeface="+mn-ea"/>
+                <a:cs typeface="+mn-cs"/>
+              </a:defRPr>
+            </a:lvl7pPr>
+            <a:lvl8pPr marL="3429000" indent="-228600" algn="l" defTabSz="914400" rtl="0" eaLnBrk="1" latinLnBrk="0" hangingPunct="1">
+              <a:lnSpc>
+                <a:spcPct val="90000"/>
+              </a:lnSpc>
+              <a:spcBef>
+                <a:spcPts val="500"/>
+              </a:spcBef>
+              <a:buFont typeface="Arial" panose="020B0604020202020204" pitchFamily="34" charset="0"/>
+              <a:buChar char="•"/>
+              <a:defRPr sz="1800" kern="1200">
+                <a:solidFill>
+                  <a:schemeClr val="tx1"/>
+                </a:solidFill>
+                <a:latin typeface="+mn-lt"/>
+                <a:ea typeface="+mn-ea"/>
+                <a:cs typeface="+mn-cs"/>
+              </a:defRPr>
+            </a:lvl8pPr>
+            <a:lvl9pPr marL="3886200" indent="-228600" algn="l" defTabSz="914400" rtl="0" eaLnBrk="1" latinLnBrk="0" hangingPunct="1">
+              <a:lnSpc>
+                <a:spcPct val="90000"/>
+              </a:lnSpc>
+              <a:spcBef>
+                <a:spcPts val="500"/>
+              </a:spcBef>
+              <a:buFont typeface="Arial" panose="020B0604020202020204" pitchFamily="34" charset="0"/>
+              <a:buChar char="•"/>
+              <a:defRPr sz="1800" kern="1200">
+                <a:solidFill>
+                  <a:schemeClr val="tx1"/>
+                </a:solidFill>
+                <a:latin typeface="+mn-lt"/>
+                <a:ea typeface="+mn-ea"/>
+                <a:cs typeface="+mn-cs"/>
+              </a:defRPr>
+            </a:lvl9pPr>
+          </a:lstStyle>
+          <a:p>
+            <a:r>
+              <a:rPr lang="en-GB" sz="2400" dirty="0" smtClean="0">
+                <a:latin typeface="Ubuntu Light" panose="020B0304030602030204" pitchFamily="34" charset="0"/>
+              </a:rPr>
+              <a:t>KO for server-side mixed applications</a:t>
+            </a:r>
+            <a:endParaRPr lang="en-GB" sz="2400" dirty="0" smtClean="0">
+              <a:latin typeface="Ubuntu Light" panose="020B0304030602030204" pitchFamily="34" charset="0"/>
+            </a:endParaRPr>
+          </a:p>
+          <a:p>
+            <a:r>
+              <a:rPr lang="en-GB" sz="2400" dirty="0" smtClean="0">
+                <a:latin typeface="Ubuntu Light" panose="020B0304030602030204" pitchFamily="34" charset="0"/>
+              </a:rPr>
+              <a:t>Angular.js for real single page applications</a:t>
+            </a:r>
+            <a:endParaRPr lang="en-GB" sz="2400" dirty="0" smtClean="0">
+              <a:latin typeface="Ubuntu Light" panose="020B0304030602030204" pitchFamily="34" charset="0"/>
+            </a:endParaRPr>
+          </a:p>
+          <a:p>
+            <a:endParaRPr lang="en-GB" sz="2400" dirty="0" smtClean="0">
+              <a:latin typeface="Ubuntu Light" panose="020B0304030602030204" pitchFamily="34" charset="0"/>
+            </a:endParaRPr>
+          </a:p>
+          <a:p>
+            <a:endParaRPr lang="en-CA" sz="2400" baseline="0" noProof="0" dirty="0" smtClean="0">
+              <a:latin typeface="Ubuntu Light" panose="020B0304030602030204" pitchFamily="34" charset="0"/>
+            </a:endParaRPr>
+          </a:p>
+        </p:txBody>
+      </p:sp>
+    </p:spTree>
+    <p:extLst>
+      <p:ext uri="{BB962C8B-B14F-4D97-AF65-F5344CB8AC3E}">
+        <p14:creationId xmlns:p14="http://schemas.microsoft.com/office/powerpoint/2010/main" val="1874714405"/>
+      </p:ext>
+    </p:extLst>
+  </p:cSld>
+  <p:clrMapOvr>
+    <a:masterClrMapping/>
+  </p:clrMapOvr>
+</p:sld>
+</file>
+
+<file path=ppt/slides/slide14.xml><?xml version="1.0" encoding="utf-8"?>
+<p:sld xmlns:a="http://schemas.openxmlformats.org/drawingml/2006/main" xmlns:r="http://schemas.openxmlformats.org/officeDocument/2006/relationships" xmlns:p="http://schemas.openxmlformats.org/presentationml/2006/main">
+  <p:cSld>
+    <p:spTree>
+      <p:nvGrpSpPr>
+        <p:cNvPr id="1" name=""/>
+        <p:cNvGrpSpPr/>
+        <p:nvPr/>
+      </p:nvGrpSpPr>
+      <p:grpSpPr>
+        <a:xfrm>
+          <a:off x="0" y="0"/>
+          <a:ext cx="0" cy="0"/>
+          <a:chOff x="0" y="0"/>
+          <a:chExt cx="0" cy="0"/>
+        </a:xfrm>
+      </p:grpSpPr>
+      <p:sp>
+        <p:nvSpPr>
+          <p:cNvPr id="2" name="Title 1"/>
+          <p:cNvSpPr>
+            <a:spLocks noGrp="1"/>
+          </p:cNvSpPr>
+          <p:nvPr>
+            <p:ph type="title"/>
+          </p:nvPr>
+        </p:nvSpPr>
+        <p:spPr>
+          <a:xfrm>
+            <a:off x="838200" y="365125"/>
+            <a:ext cx="10515600" cy="682137"/>
+          </a:xfrm>
+        </p:spPr>
+        <p:txBody>
+          <a:bodyPr>
+            <a:normAutofit fontScale="90000"/>
+          </a:bodyPr>
+          <a:lstStyle/>
+          <a:p>
+            <a:r>
+              <a:rPr lang="en-CA" dirty="0" smtClean="0">
+                <a:latin typeface="Ubuntu Condensed" panose="020B0506030602030204" pitchFamily="34" charset="0"/>
+              </a:rPr>
+              <a:t>Many thanks</a:t>
+            </a:r>
+            <a:endParaRPr lang="en-CA" dirty="0">
+              <a:latin typeface="Ubuntu Condensed" panose="020B0506030602030204" pitchFamily="34" charset="0"/>
+            </a:endParaRPr>
+          </a:p>
+        </p:txBody>
+      </p:sp>
+      <p:sp>
+        <p:nvSpPr>
+          <p:cNvPr id="5" name="Content Placeholder 2"/>
+          <p:cNvSpPr txBox="1">
+            <a:spLocks/>
+          </p:cNvSpPr>
+          <p:nvPr/>
+        </p:nvSpPr>
+        <p:spPr>
+          <a:xfrm>
+            <a:off x="838200" y="2479411"/>
+            <a:ext cx="10515600" cy="1254389"/>
+          </a:xfrm>
+          <a:prstGeom prst="rect">
+            <a:avLst/>
+          </a:prstGeom>
+        </p:spPr>
+        <p:txBody>
+          <a:bodyPr vert="horz" lIns="91440" tIns="45720" rIns="91440" bIns="45720" rtlCol="0">
+            <a:normAutofit/>
+          </a:bodyPr>
+          <a:lstStyle>
+            <a:lvl1pPr marL="228600" indent="-228600" algn="l" defTabSz="914400" rtl="0" eaLnBrk="1" latinLnBrk="0" hangingPunct="1">
+              <a:lnSpc>
+                <a:spcPct val="90000"/>
+              </a:lnSpc>
+              <a:spcBef>
+                <a:spcPts val="1000"/>
+              </a:spcBef>
+              <a:buFont typeface="Arial" panose="020B0604020202020204" pitchFamily="34" charset="0"/>
+              <a:buChar char="•"/>
+              <a:defRPr sz="2800" kern="1200">
+                <a:solidFill>
+                  <a:schemeClr val="tx1"/>
+                </a:solidFill>
+                <a:latin typeface="+mn-lt"/>
+                <a:ea typeface="+mn-ea"/>
+                <a:cs typeface="+mn-cs"/>
+              </a:defRPr>
+            </a:lvl1pPr>
+            <a:lvl2pPr marL="685800" indent="-228600" algn="l" defTabSz="914400" rtl="0" eaLnBrk="1" latinLnBrk="0" hangingPunct="1">
+              <a:lnSpc>
+                <a:spcPct val="90000"/>
+              </a:lnSpc>
+              <a:spcBef>
+                <a:spcPts val="500"/>
+              </a:spcBef>
+              <a:buFont typeface="Arial" panose="020B0604020202020204" pitchFamily="34" charset="0"/>
+              <a:buChar char="•"/>
+              <a:defRPr sz="2400" kern="1200">
+                <a:solidFill>
+                  <a:schemeClr val="tx1"/>
+                </a:solidFill>
+                <a:latin typeface="+mn-lt"/>
+                <a:ea typeface="+mn-ea"/>
+                <a:cs typeface="+mn-cs"/>
+              </a:defRPr>
+            </a:lvl2pPr>
+            <a:lvl3pPr marL="1143000" indent="-228600" algn="l" defTabSz="914400" rtl="0" eaLnBrk="1" latinLnBrk="0" hangingPunct="1">
+              <a:lnSpc>
+                <a:spcPct val="90000"/>
+              </a:lnSpc>
+              <a:spcBef>
+                <a:spcPts val="500"/>
+              </a:spcBef>
+              <a:buFont typeface="Arial" panose="020B0604020202020204" pitchFamily="34" charset="0"/>
+              <a:buChar char="•"/>
+              <a:defRPr sz="2000" kern="1200">
+                <a:solidFill>
+                  <a:schemeClr val="tx1"/>
+                </a:solidFill>
+                <a:latin typeface="+mn-lt"/>
+                <a:ea typeface="+mn-ea"/>
+                <a:cs typeface="+mn-cs"/>
+              </a:defRPr>
+            </a:lvl3pPr>
+            <a:lvl4pPr marL="1600200" indent="-228600" algn="l" defTabSz="914400" rtl="0" eaLnBrk="1" latinLnBrk="0" hangingPunct="1">
+              <a:lnSpc>
+                <a:spcPct val="90000"/>
+              </a:lnSpc>
+              <a:spcBef>
+                <a:spcPts val="500"/>
+              </a:spcBef>
+              <a:buFont typeface="Arial" panose="020B0604020202020204" pitchFamily="34" charset="0"/>
+              <a:buChar char="•"/>
+              <a:defRPr sz="1800" kern="1200">
+                <a:solidFill>
+                  <a:schemeClr val="tx1"/>
+                </a:solidFill>
+                <a:latin typeface="+mn-lt"/>
+                <a:ea typeface="+mn-ea"/>
+                <a:cs typeface="+mn-cs"/>
+              </a:defRPr>
+            </a:lvl4pPr>
+            <a:lvl5pPr marL="2057400" indent="-228600" algn="l" defTabSz="914400" rtl="0" eaLnBrk="1" latinLnBrk="0" hangingPunct="1">
+              <a:lnSpc>
+                <a:spcPct val="90000"/>
+              </a:lnSpc>
+              <a:spcBef>
+                <a:spcPts val="500"/>
+              </a:spcBef>
+              <a:buFont typeface="Arial" panose="020B0604020202020204" pitchFamily="34" charset="0"/>
+              <a:buChar char="•"/>
+              <a:defRPr sz="1800" kern="1200">
+                <a:solidFill>
+                  <a:schemeClr val="tx1"/>
+                </a:solidFill>
+                <a:latin typeface="+mn-lt"/>
+                <a:ea typeface="+mn-ea"/>
+                <a:cs typeface="+mn-cs"/>
+              </a:defRPr>
+            </a:lvl5pPr>
+            <a:lvl6pPr marL="2514600" indent="-228600" algn="l" defTabSz="914400" rtl="0" eaLnBrk="1" latinLnBrk="0" hangingPunct="1">
+              <a:lnSpc>
+                <a:spcPct val="90000"/>
+              </a:lnSpc>
+              <a:spcBef>
+                <a:spcPts val="500"/>
+              </a:spcBef>
+              <a:buFont typeface="Arial" panose="020B0604020202020204" pitchFamily="34" charset="0"/>
+              <a:buChar char="•"/>
+              <a:defRPr sz="1800" kern="1200">
+                <a:solidFill>
+                  <a:schemeClr val="tx1"/>
+                </a:solidFill>
+                <a:latin typeface="+mn-lt"/>
+                <a:ea typeface="+mn-ea"/>
+                <a:cs typeface="+mn-cs"/>
+              </a:defRPr>
+            </a:lvl6pPr>
+            <a:lvl7pPr marL="2971800" indent="-228600" algn="l" defTabSz="914400" rtl="0" eaLnBrk="1" latinLnBrk="0" hangingPunct="1">
+              <a:lnSpc>
+                <a:spcPct val="90000"/>
+              </a:lnSpc>
+              <a:spcBef>
+                <a:spcPts val="500"/>
+              </a:spcBef>
+              <a:buFont typeface="Arial" panose="020B0604020202020204" pitchFamily="34" charset="0"/>
+              <a:buChar char="•"/>
+              <a:defRPr sz="1800" kern="1200">
+                <a:solidFill>
+                  <a:schemeClr val="tx1"/>
+                </a:solidFill>
+                <a:latin typeface="+mn-lt"/>
+                <a:ea typeface="+mn-ea"/>
+                <a:cs typeface="+mn-cs"/>
+              </a:defRPr>
+            </a:lvl7pPr>
+            <a:lvl8pPr marL="3429000" indent="-228600" algn="l" defTabSz="914400" rtl="0" eaLnBrk="1" latinLnBrk="0" hangingPunct="1">
+              <a:lnSpc>
+                <a:spcPct val="90000"/>
+              </a:lnSpc>
+              <a:spcBef>
+                <a:spcPts val="500"/>
+              </a:spcBef>
+              <a:buFont typeface="Arial" panose="020B0604020202020204" pitchFamily="34" charset="0"/>
+              <a:buChar char="•"/>
+              <a:defRPr sz="1800" kern="1200">
+                <a:solidFill>
+                  <a:schemeClr val="tx1"/>
+                </a:solidFill>
+                <a:latin typeface="+mn-lt"/>
+                <a:ea typeface="+mn-ea"/>
+                <a:cs typeface="+mn-cs"/>
+              </a:defRPr>
+            </a:lvl8pPr>
+            <a:lvl9pPr marL="3886200" indent="-228600" algn="l" defTabSz="914400" rtl="0" eaLnBrk="1" latinLnBrk="0" hangingPunct="1">
+              <a:lnSpc>
+                <a:spcPct val="90000"/>
+              </a:lnSpc>
+              <a:spcBef>
+                <a:spcPts val="500"/>
+              </a:spcBef>
+              <a:buFont typeface="Arial" panose="020B0604020202020204" pitchFamily="34" charset="0"/>
+              <a:buChar char="•"/>
+              <a:defRPr sz="1800" kern="1200">
+                <a:solidFill>
+                  <a:schemeClr val="tx1"/>
+                </a:solidFill>
+                <a:latin typeface="+mn-lt"/>
+                <a:ea typeface="+mn-ea"/>
+                <a:cs typeface="+mn-cs"/>
+              </a:defRPr>
+            </a:lvl9pPr>
+          </a:lstStyle>
+          <a:p>
+            <a:r>
+              <a:rPr lang="en-GB" sz="2400" dirty="0">
+                <a:latin typeface="Ubuntu Light" panose="020B0304030602030204" pitchFamily="34" charset="0"/>
+              </a:rPr>
+              <a:t>Flying Spaghetti </a:t>
+            </a:r>
+            <a:r>
+              <a:rPr lang="en-GB" sz="2400" dirty="0" smtClean="0">
+                <a:latin typeface="Ubuntu Light" panose="020B0304030602030204" pitchFamily="34" charset="0"/>
+              </a:rPr>
+              <a:t>Monster</a:t>
+            </a:r>
+          </a:p>
+          <a:p>
+            <a:r>
+              <a:rPr lang="en-GB" sz="2400" dirty="0" smtClean="0">
+                <a:latin typeface="Ubuntu Light" panose="020B0304030602030204" pitchFamily="34" charset="0"/>
+              </a:rPr>
+              <a:t>Obi-Wan Kenobi</a:t>
+            </a:r>
+          </a:p>
+          <a:p>
+            <a:endParaRPr lang="en-GB" sz="2400" dirty="0" smtClean="0">
+              <a:latin typeface="Ubuntu Light" panose="020B0304030602030204" pitchFamily="34" charset="0"/>
+            </a:endParaRPr>
+          </a:p>
+          <a:p>
+            <a:endParaRPr lang="en-CA" sz="2400" baseline="0" noProof="0" dirty="0" smtClean="0">
+              <a:latin typeface="Ubuntu Light" panose="020B0304030602030204" pitchFamily="34" charset="0"/>
+            </a:endParaRPr>
+          </a:p>
+        </p:txBody>
+      </p:sp>
+    </p:spTree>
+    <p:extLst>
+      <p:ext uri="{BB962C8B-B14F-4D97-AF65-F5344CB8AC3E}">
+        <p14:creationId xmlns:p14="http://schemas.microsoft.com/office/powerpoint/2010/main" val="2183375545"/>
       </p:ext>
     </p:extLst>
   </p:cSld>
@@ -6185,9 +7570,6 @@
               </a:rPr>
               <a:t>View – Visible, interactive UI representing the state of the view model</a:t>
             </a:r>
-            <a:endParaRPr lang="en-GB" sz="2400" dirty="0" smtClean="0">
-              <a:latin typeface="Ubuntu Light" panose="020B0304030602030204" pitchFamily="34" charset="0"/>
-            </a:endParaRPr>
           </a:p>
           <a:p>
             <a:r>
@@ -6206,19 +7588,7 @@
               <a:rPr lang="en-GB" sz="2400" dirty="0" smtClean="0">
                 <a:latin typeface="Ubuntu Light" panose="020B0304030602030204" pitchFamily="34" charset="0"/>
               </a:rPr>
-              <a:t> pass </a:t>
-            </a:r>
-            <a:r>
-              <a:rPr lang="en-GB" sz="2400" dirty="0" smtClean="0">
-                <a:latin typeface="Ubuntu Light" panose="020B0304030602030204" pitchFamily="34" charset="0"/>
-              </a:rPr>
-              <a:t>trough </a:t>
-            </a:r>
-            <a:r>
-              <a:rPr lang="en-GB" sz="2400" dirty="0" smtClean="0">
-                <a:latin typeface="Ubuntu Light" panose="020B0304030602030204" pitchFamily="34" charset="0"/>
-              </a:rPr>
-              <a:t>data binding events</a:t>
+              <a:t> pass trough data binding events</a:t>
             </a:r>
           </a:p>
           <a:p>

</xml_diff>

<commit_message>
[Require.js] Modifing after presentation
</commit_message>
<xml_diff>
--- a/knockout.js/knockout.js.pptx
+++ b/knockout.js/knockout.js.pptx
@@ -144,7 +144,7 @@
       </p14:sectionLst>
     </p:ext>
     <p:ext uri="{EFAFB233-063F-42B5-8137-9DF3F51BA10A}">
-      <p15:sldGuideLst xmlns:p15="http://schemas.microsoft.com/office/powerpoint/2012/main"/>
+      <p15:sldGuideLst xmlns:p15="http://schemas.microsoft.com/office/powerpoint/2012/main" xmlns=""/>
     </p:ext>
   </p:extLst>
 </p:presentation>
@@ -232,7 +232,7 @@
           <a:p>
             <a:fld id="{C5154B15-60D3-4535-B029-4D100D89B8DD}" type="datetimeFigureOut">
               <a:rPr lang="fr-FR" smtClean="0"/>
-              <a:t>21/10/2013</a:t>
+              <a:t>10/22/13</a:t>
             </a:fld>
             <a:endParaRPr lang="fr-FR"/>
           </a:p>
@@ -1741,7 +1741,7 @@
           <a:p>
             <a:fld id="{9B0E7100-CB1C-4906-903B-B0AA84BE9C13}" type="datetimeFigureOut">
               <a:rPr lang="fr-FR" smtClean="0"/>
-              <a:t>21/10/2013</a:t>
+              <a:t>10/22/13</a:t>
             </a:fld>
             <a:endParaRPr lang="fr-FR"/>
           </a:p>
@@ -1911,7 +1911,7 @@
           <a:p>
             <a:fld id="{9B0E7100-CB1C-4906-903B-B0AA84BE9C13}" type="datetimeFigureOut">
               <a:rPr lang="fr-FR" smtClean="0"/>
-              <a:t>21/10/2013</a:t>
+              <a:t>10/22/13</a:t>
             </a:fld>
             <a:endParaRPr lang="fr-FR"/>
           </a:p>
@@ -2091,7 +2091,7 @@
           <a:p>
             <a:fld id="{9B0E7100-CB1C-4906-903B-B0AA84BE9C13}" type="datetimeFigureOut">
               <a:rPr lang="fr-FR" smtClean="0"/>
-              <a:t>21/10/2013</a:t>
+              <a:t>10/22/13</a:t>
             </a:fld>
             <a:endParaRPr lang="fr-FR"/>
           </a:p>
@@ -2261,7 +2261,7 @@
           <a:p>
             <a:fld id="{9B0E7100-CB1C-4906-903B-B0AA84BE9C13}" type="datetimeFigureOut">
               <a:rPr lang="fr-FR" smtClean="0"/>
-              <a:t>21/10/2013</a:t>
+              <a:t>10/22/13</a:t>
             </a:fld>
             <a:endParaRPr lang="fr-FR"/>
           </a:p>
@@ -2507,7 +2507,7 @@
           <a:p>
             <a:fld id="{9B0E7100-CB1C-4906-903B-B0AA84BE9C13}" type="datetimeFigureOut">
               <a:rPr lang="fr-FR" smtClean="0"/>
-              <a:t>21/10/2013</a:t>
+              <a:t>10/22/13</a:t>
             </a:fld>
             <a:endParaRPr lang="fr-FR"/>
           </a:p>
@@ -2739,7 +2739,7 @@
           <a:p>
             <a:fld id="{9B0E7100-CB1C-4906-903B-B0AA84BE9C13}" type="datetimeFigureOut">
               <a:rPr lang="fr-FR" smtClean="0"/>
-              <a:t>21/10/2013</a:t>
+              <a:t>10/22/13</a:t>
             </a:fld>
             <a:endParaRPr lang="fr-FR"/>
           </a:p>
@@ -3106,7 +3106,7 @@
           <a:p>
             <a:fld id="{9B0E7100-CB1C-4906-903B-B0AA84BE9C13}" type="datetimeFigureOut">
               <a:rPr lang="fr-FR" smtClean="0"/>
-              <a:t>21/10/2013</a:t>
+              <a:t>10/22/13</a:t>
             </a:fld>
             <a:endParaRPr lang="fr-FR"/>
           </a:p>
@@ -3224,7 +3224,7 @@
           <a:p>
             <a:fld id="{9B0E7100-CB1C-4906-903B-B0AA84BE9C13}" type="datetimeFigureOut">
               <a:rPr lang="fr-FR" smtClean="0"/>
-              <a:t>21/10/2013</a:t>
+              <a:t>10/22/13</a:t>
             </a:fld>
             <a:endParaRPr lang="fr-FR"/>
           </a:p>
@@ -3319,7 +3319,7 @@
           <a:p>
             <a:fld id="{9B0E7100-CB1C-4906-903B-B0AA84BE9C13}" type="datetimeFigureOut">
               <a:rPr lang="fr-FR" smtClean="0"/>
-              <a:t>21/10/2013</a:t>
+              <a:t>10/22/13</a:t>
             </a:fld>
             <a:endParaRPr lang="fr-FR"/>
           </a:p>
@@ -3596,7 +3596,7 @@
           <a:p>
             <a:fld id="{9B0E7100-CB1C-4906-903B-B0AA84BE9C13}" type="datetimeFigureOut">
               <a:rPr lang="fr-FR" smtClean="0"/>
-              <a:t>21/10/2013</a:t>
+              <a:t>10/22/13</a:t>
             </a:fld>
             <a:endParaRPr lang="fr-FR"/>
           </a:p>
@@ -3849,7 +3849,7 @@
           <a:p>
             <a:fld id="{9B0E7100-CB1C-4906-903B-B0AA84BE9C13}" type="datetimeFigureOut">
               <a:rPr lang="fr-FR" smtClean="0"/>
-              <a:t>21/10/2013</a:t>
+              <a:t>10/22/13</a:t>
             </a:fld>
             <a:endParaRPr lang="fr-FR"/>
           </a:p>
@@ -4062,7 +4062,7 @@
           <a:p>
             <a:fld id="{9B0E7100-CB1C-4906-903B-B0AA84BE9C13}" type="datetimeFigureOut">
               <a:rPr lang="fr-FR" smtClean="0"/>
-              <a:t>21/10/2013</a:t>
+              <a:t>10/22/13</a:t>
             </a:fld>
             <a:endParaRPr lang="fr-FR"/>
           </a:p>
@@ -5309,9 +5309,6 @@
               </a:rPr>
               <a:t>Testability</a:t>
             </a:r>
-            <a:endParaRPr lang="en-GB" sz="2400" dirty="0" smtClean="0">
-              <a:latin typeface="Ubuntu Light" panose="020B0304030602030204" pitchFamily="34" charset="0"/>
-            </a:endParaRPr>
           </a:p>
           <a:p>
             <a:endParaRPr lang="en-CA" sz="2400" baseline="0" noProof="0" dirty="0" smtClean="0">
@@ -5376,13 +5373,7 @@
               <a:rPr lang="en-CA" dirty="0" smtClean="0">
                 <a:latin typeface="Ubuntu Condensed" panose="020B0506030602030204" pitchFamily="34" charset="0"/>
               </a:rPr>
-              <a:t>KO’s </a:t>
-            </a:r>
-            <a:r>
-              <a:rPr lang="en-CA" dirty="0" smtClean="0">
-                <a:latin typeface="Ubuntu Condensed" panose="020B0506030602030204" pitchFamily="34" charset="0"/>
-              </a:rPr>
-              <a:t>performances</a:t>
+              <a:t>KO’s performances</a:t>
             </a:r>
             <a:endParaRPr lang="en-CA" dirty="0">
               <a:latin typeface="Ubuntu Condensed" panose="020B0506030602030204" pitchFamily="34" charset="0"/>
@@ -5590,9 +5581,6 @@
               </a:rPr>
               <a:t>Multiple tuning scenarios are possible</a:t>
             </a:r>
-            <a:endParaRPr lang="en-GB" sz="2400" dirty="0" smtClean="0">
-              <a:latin typeface="Ubuntu Light" panose="020B0304030602030204" pitchFamily="34" charset="0"/>
-            </a:endParaRPr>
           </a:p>
           <a:p>
             <a:endParaRPr lang="en-GB" sz="2400" dirty="0" smtClean="0">
@@ -5862,9 +5850,6 @@
               </a:rPr>
               <a:t>KO for server-side mixed applications</a:t>
             </a:r>
-            <a:endParaRPr lang="en-GB" sz="2400" dirty="0" smtClean="0">
-              <a:latin typeface="Ubuntu Light" panose="020B0304030602030204" pitchFamily="34" charset="0"/>
-            </a:endParaRPr>
           </a:p>
           <a:p>
             <a:r>
@@ -5873,9 +5858,6 @@
               </a:rPr>
               <a:t>Angular.js for real single page applications</a:t>
             </a:r>
-            <a:endParaRPr lang="en-GB" sz="2400" dirty="0" smtClean="0">
-              <a:latin typeface="Ubuntu Light" panose="020B0304030602030204" pitchFamily="34" charset="0"/>
-            </a:endParaRPr>
           </a:p>
           <a:p>
             <a:endParaRPr lang="en-GB" sz="2400" dirty="0" smtClean="0">
@@ -6318,19 +6300,25 @@
               <a:rPr lang="en-AU" dirty="0" smtClean="0">
                 <a:latin typeface="Ubuntu Light" panose="020B0304030602030204" pitchFamily="34" charset="0"/>
               </a:rPr>
-              <a:t>JQuery becomes an </a:t>
-            </a:r>
-            <a:r>
-              <a:rPr lang="en-AU" dirty="0" err="1" smtClean="0">
-                <a:latin typeface="Ubuntu Light" panose="020B0304030602030204" pitchFamily="34" charset="0"/>
-              </a:rPr>
-              <a:t>exilent</a:t>
+              <a:t>JQuery becomes </a:t>
+            </a:r>
+            <a:r>
+              <a:rPr lang="en-AU" smtClean="0">
+                <a:latin typeface="Ubuntu Light" panose="020B0304030602030204" pitchFamily="34" charset="0"/>
+              </a:rPr>
+              <a:t>an </a:t>
+            </a:r>
+            <a:r>
+              <a:rPr lang="en-AU" smtClean="0">
+                <a:latin typeface="Ubuntu Light" panose="020B0304030602030204" pitchFamily="34" charset="0"/>
+              </a:rPr>
+              <a:t>excellent </a:t>
             </a:r>
             <a:r>
               <a:rPr lang="en-AU" dirty="0" smtClean="0">
                 <a:latin typeface="Ubuntu Light" panose="020B0304030602030204" pitchFamily="34" charset="0"/>
               </a:rPr>
-              <a:t> low-level way to manipulate elements and events in a web applications</a:t>
+              <a:t>low-level way to manipulate elements and events in a web applications</a:t>
             </a:r>
           </a:p>
           <a:p>
@@ -6651,7 +6639,7 @@
           </a:prstGeom>
           <a:noFill/>
           <a:extLst>
-            <a:ext uri="{909E8E84-426E-40DD-AFC4-6F175D3DCCD1}">
+            <a:ext uri="{909E8E84-426E-40dd-AFC4-6F175D3DCCD1}">
               <a14:hiddenFill xmlns:a14="http://schemas.microsoft.com/office/drawing/2010/main">
                 <a:solidFill>
                   <a:srgbClr val="FFFFFF"/>
@@ -7246,7 +7234,7 @@
           </a:prstGeom>
           <a:noFill/>
           <a:extLst>
-            <a:ext uri="{909E8E84-426E-40DD-AFC4-6F175D3DCCD1}">
+            <a:ext uri="{909E8E84-426E-40dd-AFC4-6F175D3DCCD1}">
               <a14:hiddenFill xmlns:a14="http://schemas.microsoft.com/office/drawing/2010/main">
                 <a:solidFill>
                   <a:srgbClr val="FFFFFF"/>
@@ -7662,7 +7650,7 @@
           </a:prstGeom>
           <a:noFill/>
           <a:extLst>
-            <a:ext uri="{909E8E84-426E-40DD-AFC4-6F175D3DCCD1}">
+            <a:ext uri="{909E8E84-426E-40dd-AFC4-6F175D3DCCD1}">
               <a14:hiddenFill xmlns:a14="http://schemas.microsoft.com/office/drawing/2010/main">
                 <a:solidFill>
                   <a:srgbClr val="FFFFFF"/>
@@ -8817,7 +8805,7 @@
     </a:clrScheme>
     <a:fontScheme name="Office">
       <a:majorFont>
-        <a:latin typeface="Calibri Light" panose="020F0302020204030204"/>
+        <a:latin typeface="Calibri Light"/>
         <a:ea typeface=""/>
         <a:cs typeface=""/>
         <a:font script="Jpan" typeface="ＭＳ Ｐゴシック"/>
@@ -8852,7 +8840,7 @@
         <a:font script="Geor" typeface="Sylfaen"/>
       </a:majorFont>
       <a:minorFont>
-        <a:latin typeface="Calibri" panose="020F0502020204030204"/>
+        <a:latin typeface="Calibri"/>
         <a:ea typeface=""/>
         <a:cs typeface=""/>
         <a:font script="Jpan" typeface="ＭＳ Ｐゴシック"/>
@@ -9029,7 +9017,7 @@
   <a:extraClrSchemeLst/>
   <a:extLst>
     <a:ext uri="{05A4C25C-085E-4340-85A3-A5531E510DB2}">
-      <thm15:themeFamily xmlns:thm15="http://schemas.microsoft.com/office/thememl/2012/main" name="Office Theme" id="{62F939B6-93AF-4DB8-9C6B-D6C7DFDC589F}" vid="{4A3C46E8-61CC-4603-A589-7422A47A8E4A}"/>
+      <thm15:themeFamily xmlns:thm15="http://schemas.microsoft.com/office/thememl/2012/main" xmlns="" name="Office Theme" id="{62F939B6-93AF-4DB8-9C6B-D6C7DFDC589F}" vid="{4A3C46E8-61CC-4603-A589-7422A47A8E4A}"/>
     </a:ext>
   </a:extLst>
 </a:theme>
@@ -9078,7 +9066,7 @@
     </a:clrScheme>
     <a:fontScheme name="Office">
       <a:majorFont>
-        <a:latin typeface="Calibri Light" panose="020F0302020204030204"/>
+        <a:latin typeface="Calibri Light"/>
         <a:ea typeface=""/>
         <a:cs typeface=""/>
         <a:font script="Jpan" typeface="ＭＳ Ｐゴシック"/>
@@ -9113,7 +9101,7 @@
         <a:font script="Geor" typeface="Sylfaen"/>
       </a:majorFont>
       <a:minorFont>
-        <a:latin typeface="Calibri" panose="020F0502020204030204"/>
+        <a:latin typeface="Calibri"/>
         <a:ea typeface=""/>
         <a:cs typeface=""/>
         <a:font script="Jpan" typeface="ＭＳ Ｐゴシック"/>
@@ -9290,7 +9278,7 @@
   <a:extraClrSchemeLst/>
   <a:extLst>
     <a:ext uri="{05A4C25C-085E-4340-85A3-A5531E510DB2}">
-      <thm15:themeFamily xmlns:thm15="http://schemas.microsoft.com/office/thememl/2012/main" name="Office Theme" id="{62F939B6-93AF-4DB8-9C6B-D6C7DFDC589F}" vid="{4A3C46E8-61CC-4603-A589-7422A47A8E4A}"/>
+      <thm15:themeFamily xmlns:thm15="http://schemas.microsoft.com/office/thememl/2012/main" xmlns="" name="Office Theme" id="{62F939B6-93AF-4DB8-9C6B-D6C7DFDC589F}" vid="{4A3C46E8-61CC-4603-A589-7422A47A8E4A}"/>
     </a:ext>
   </a:extLst>
 </a:theme>

</xml_diff>